<commit_message>
Update README.md to enhance battery monitoring section and clarify diagram description
</commit_message>
<xml_diff>
--- a/assets/Diagram.pptx
+++ b/assets/Diagram.pptx
@@ -104,6 +104,11 @@
       </a:defRPr>
     </a:lvl9pPr>
   </p:defaultTextStyle>
+  <p:extLst>
+    <p:ext uri="{EFAFB233-063F-42B5-8137-9DF3F51BA10A}">
+      <p15:sldGuideLst xmlns:p15="http://schemas.microsoft.com/office/powerpoint/2012/main"/>
+    </p:ext>
+  </p:extLst>
 </p:presentation>
 </file>
 
@@ -254,7 +259,7 @@
           <a:p>
             <a:fld id="{7F5102BF-3E1C-4FEC-B8AE-4CD23D8F5F17}" type="datetimeFigureOut">
               <a:rPr lang="en-US" smtClean="0"/>
-              <a:t>4/20/2025</a:t>
+              <a:t>5/26/2025</a:t>
             </a:fld>
             <a:endParaRPr lang="en-US"/>
           </a:p>
@@ -452,7 +457,7 @@
           <a:p>
             <a:fld id="{7F5102BF-3E1C-4FEC-B8AE-4CD23D8F5F17}" type="datetimeFigureOut">
               <a:rPr lang="en-US" smtClean="0"/>
-              <a:t>4/20/2025</a:t>
+              <a:t>5/26/2025</a:t>
             </a:fld>
             <a:endParaRPr lang="en-US"/>
           </a:p>
@@ -660,7 +665,7 @@
           <a:p>
             <a:fld id="{7F5102BF-3E1C-4FEC-B8AE-4CD23D8F5F17}" type="datetimeFigureOut">
               <a:rPr lang="en-US" smtClean="0"/>
-              <a:t>4/20/2025</a:t>
+              <a:t>5/26/2025</a:t>
             </a:fld>
             <a:endParaRPr lang="en-US"/>
           </a:p>
@@ -858,7 +863,7 @@
           <a:p>
             <a:fld id="{7F5102BF-3E1C-4FEC-B8AE-4CD23D8F5F17}" type="datetimeFigureOut">
               <a:rPr lang="en-US" smtClean="0"/>
-              <a:t>4/20/2025</a:t>
+              <a:t>5/26/2025</a:t>
             </a:fld>
             <a:endParaRPr lang="en-US"/>
           </a:p>
@@ -1133,7 +1138,7 @@
           <a:p>
             <a:fld id="{7F5102BF-3E1C-4FEC-B8AE-4CD23D8F5F17}" type="datetimeFigureOut">
               <a:rPr lang="en-US" smtClean="0"/>
-              <a:t>4/20/2025</a:t>
+              <a:t>5/26/2025</a:t>
             </a:fld>
             <a:endParaRPr lang="en-US"/>
           </a:p>
@@ -1398,7 +1403,7 @@
           <a:p>
             <a:fld id="{7F5102BF-3E1C-4FEC-B8AE-4CD23D8F5F17}" type="datetimeFigureOut">
               <a:rPr lang="en-US" smtClean="0"/>
-              <a:t>4/20/2025</a:t>
+              <a:t>5/26/2025</a:t>
             </a:fld>
             <a:endParaRPr lang="en-US"/>
           </a:p>
@@ -1810,7 +1815,7 @@
           <a:p>
             <a:fld id="{7F5102BF-3E1C-4FEC-B8AE-4CD23D8F5F17}" type="datetimeFigureOut">
               <a:rPr lang="en-US" smtClean="0"/>
-              <a:t>4/20/2025</a:t>
+              <a:t>5/26/2025</a:t>
             </a:fld>
             <a:endParaRPr lang="en-US"/>
           </a:p>
@@ -1951,7 +1956,7 @@
           <a:p>
             <a:fld id="{7F5102BF-3E1C-4FEC-B8AE-4CD23D8F5F17}" type="datetimeFigureOut">
               <a:rPr lang="en-US" smtClean="0"/>
-              <a:t>4/20/2025</a:t>
+              <a:t>5/26/2025</a:t>
             </a:fld>
             <a:endParaRPr lang="en-US"/>
           </a:p>
@@ -2064,7 +2069,7 @@
           <a:p>
             <a:fld id="{7F5102BF-3E1C-4FEC-B8AE-4CD23D8F5F17}" type="datetimeFigureOut">
               <a:rPr lang="en-US" smtClean="0"/>
-              <a:t>4/20/2025</a:t>
+              <a:t>5/26/2025</a:t>
             </a:fld>
             <a:endParaRPr lang="en-US"/>
           </a:p>
@@ -2375,7 +2380,7 @@
           <a:p>
             <a:fld id="{7F5102BF-3E1C-4FEC-B8AE-4CD23D8F5F17}" type="datetimeFigureOut">
               <a:rPr lang="en-US" smtClean="0"/>
-              <a:t>4/20/2025</a:t>
+              <a:t>5/26/2025</a:t>
             </a:fld>
             <a:endParaRPr lang="en-US"/>
           </a:p>
@@ -2663,7 +2668,7 @@
           <a:p>
             <a:fld id="{7F5102BF-3E1C-4FEC-B8AE-4CD23D8F5F17}" type="datetimeFigureOut">
               <a:rPr lang="en-US" smtClean="0"/>
-              <a:t>4/20/2025</a:t>
+              <a:t>5/26/2025</a:t>
             </a:fld>
             <a:endParaRPr lang="en-US"/>
           </a:p>
@@ -2904,7 +2909,7 @@
           <a:p>
             <a:fld id="{7F5102BF-3E1C-4FEC-B8AE-4CD23D8F5F17}" type="datetimeFigureOut">
               <a:rPr lang="en-US" smtClean="0"/>
-              <a:t>4/20/2025</a:t>
+              <a:t>5/26/2025</a:t>
             </a:fld>
             <a:endParaRPr lang="en-US"/>
           </a:p>
@@ -4419,7 +4424,7 @@
         <p:spPr>
           <a:xfrm flipV="1">
             <a:off x="11290300" y="514350"/>
-            <a:ext cx="0" cy="1193426"/>
+            <a:ext cx="0" cy="4433843"/>
           </a:xfrm>
           <a:prstGeom prst="line">
             <a:avLst/>
@@ -6027,6 +6032,414 @@
           </a:p>
         </p:txBody>
       </p:sp>
+      <p:sp>
+        <p:nvSpPr>
+          <p:cNvPr id="3" name="Rectangle 2">
+            <a:extLst>
+              <a:ext uri="{FF2B5EF4-FFF2-40B4-BE49-F238E27FC236}">
+                <a16:creationId xmlns:a16="http://schemas.microsoft.com/office/drawing/2014/main" id="{F413E25C-BB02-798B-F4A0-9E0535A9D611}"/>
+              </a:ext>
+            </a:extLst>
+          </p:cNvPr>
+          <p:cNvSpPr/>
+          <p:nvPr/>
+        </p:nvSpPr>
+        <p:spPr>
+          <a:xfrm rot="5400000">
+            <a:off x="8251637" y="3289527"/>
+            <a:ext cx="852849" cy="278945"/>
+          </a:xfrm>
+          <a:prstGeom prst="rect">
+            <a:avLst/>
+          </a:prstGeom>
+        </p:spPr>
+        <p:style>
+          <a:lnRef idx="2">
+            <a:schemeClr val="accent1">
+              <a:shade val="15000"/>
+            </a:schemeClr>
+          </a:lnRef>
+          <a:fillRef idx="1">
+            <a:schemeClr val="accent1"/>
+          </a:fillRef>
+          <a:effectRef idx="0">
+            <a:schemeClr val="accent1"/>
+          </a:effectRef>
+          <a:fontRef idx="minor">
+            <a:schemeClr val="lt1"/>
+          </a:fontRef>
+        </p:style>
+        <p:txBody>
+          <a:bodyPr rtlCol="0" anchor="ctr"/>
+          <a:lstStyle/>
+          <a:p>
+            <a:pPr algn="ctr"/>
+            <a:r>
+              <a:rPr lang="en-US" sz="1200" dirty="0"/>
+              <a:t>43K Ohm</a:t>
+            </a:r>
+          </a:p>
+        </p:txBody>
+      </p:sp>
+      <p:sp>
+        <p:nvSpPr>
+          <p:cNvPr id="4" name="Rectangle 3">
+            <a:extLst>
+              <a:ext uri="{FF2B5EF4-FFF2-40B4-BE49-F238E27FC236}">
+                <a16:creationId xmlns:a16="http://schemas.microsoft.com/office/drawing/2014/main" id="{CCD3484E-49D1-4AFF-08CC-75AFDA4108E4}"/>
+              </a:ext>
+            </a:extLst>
+          </p:cNvPr>
+          <p:cNvSpPr/>
+          <p:nvPr/>
+        </p:nvSpPr>
+        <p:spPr>
+          <a:xfrm rot="5400000">
+            <a:off x="8251636" y="4308511"/>
+            <a:ext cx="852849" cy="278945"/>
+          </a:xfrm>
+          <a:prstGeom prst="rect">
+            <a:avLst/>
+          </a:prstGeom>
+        </p:spPr>
+        <p:style>
+          <a:lnRef idx="2">
+            <a:schemeClr val="accent1">
+              <a:shade val="15000"/>
+            </a:schemeClr>
+          </a:lnRef>
+          <a:fillRef idx="1">
+            <a:schemeClr val="accent1"/>
+          </a:fillRef>
+          <a:effectRef idx="0">
+            <a:schemeClr val="accent1"/>
+          </a:effectRef>
+          <a:fontRef idx="minor">
+            <a:schemeClr val="lt1"/>
+          </a:fontRef>
+        </p:style>
+        <p:txBody>
+          <a:bodyPr rtlCol="0" anchor="ctr"/>
+          <a:lstStyle/>
+          <a:p>
+            <a:pPr algn="ctr"/>
+            <a:r>
+              <a:rPr lang="en-US" sz="1200" dirty="0"/>
+              <a:t>10K Ohm</a:t>
+            </a:r>
+          </a:p>
+        </p:txBody>
+      </p:sp>
+      <p:cxnSp>
+        <p:nvCxnSpPr>
+          <p:cNvPr id="5" name="Straight Connector 4">
+            <a:extLst>
+              <a:ext uri="{FF2B5EF4-FFF2-40B4-BE49-F238E27FC236}">
+                <a16:creationId xmlns:a16="http://schemas.microsoft.com/office/drawing/2014/main" id="{A661912A-03FC-AC3E-BC3B-589263710067}"/>
+              </a:ext>
+            </a:extLst>
+          </p:cNvPr>
+          <p:cNvCxnSpPr>
+            <a:cxnSpLocks/>
+          </p:cNvCxnSpPr>
+          <p:nvPr/>
+        </p:nvCxnSpPr>
+        <p:spPr>
+          <a:xfrm flipV="1">
+            <a:off x="8669469" y="1898650"/>
+            <a:ext cx="0" cy="1106724"/>
+          </a:xfrm>
+          <a:prstGeom prst="line">
+            <a:avLst/>
+          </a:prstGeom>
+          <a:ln w="38100">
+            <a:solidFill>
+              <a:schemeClr val="accent2"/>
+            </a:solidFill>
+          </a:ln>
+        </p:spPr>
+        <p:style>
+          <a:lnRef idx="2">
+            <a:schemeClr val="accent1"/>
+          </a:lnRef>
+          <a:fillRef idx="0">
+            <a:schemeClr val="accent1"/>
+          </a:fillRef>
+          <a:effectRef idx="1">
+            <a:schemeClr val="accent1"/>
+          </a:effectRef>
+          <a:fontRef idx="minor">
+            <a:schemeClr val="tx1"/>
+          </a:fontRef>
+        </p:style>
+      </p:cxnSp>
+      <p:cxnSp>
+        <p:nvCxnSpPr>
+          <p:cNvPr id="7" name="Straight Connector 6">
+            <a:extLst>
+              <a:ext uri="{FF2B5EF4-FFF2-40B4-BE49-F238E27FC236}">
+                <a16:creationId xmlns:a16="http://schemas.microsoft.com/office/drawing/2014/main" id="{401D914E-64B1-7888-D27D-78E77CB27FE0}"/>
+              </a:ext>
+            </a:extLst>
+          </p:cNvPr>
+          <p:cNvCxnSpPr>
+            <a:cxnSpLocks/>
+            <a:stCxn id="4" idx="1"/>
+            <a:endCxn id="3" idx="3"/>
+          </p:cNvCxnSpPr>
+          <p:nvPr/>
+        </p:nvCxnSpPr>
+        <p:spPr>
+          <a:xfrm flipV="1">
+            <a:off x="8678060" y="3855424"/>
+            <a:ext cx="1" cy="166135"/>
+          </a:xfrm>
+          <a:prstGeom prst="line">
+            <a:avLst/>
+          </a:prstGeom>
+          <a:ln w="38100">
+            <a:solidFill>
+              <a:srgbClr val="002060"/>
+            </a:solidFill>
+          </a:ln>
+        </p:spPr>
+        <p:style>
+          <a:lnRef idx="2">
+            <a:schemeClr val="accent1"/>
+          </a:lnRef>
+          <a:fillRef idx="0">
+            <a:schemeClr val="accent1"/>
+          </a:fillRef>
+          <a:effectRef idx="1">
+            <a:schemeClr val="accent1"/>
+          </a:effectRef>
+          <a:fontRef idx="minor">
+            <a:schemeClr val="tx1"/>
+          </a:fontRef>
+        </p:style>
+      </p:cxnSp>
+      <p:cxnSp>
+        <p:nvCxnSpPr>
+          <p:cNvPr id="10" name="Straight Connector 9">
+            <a:extLst>
+              <a:ext uri="{FF2B5EF4-FFF2-40B4-BE49-F238E27FC236}">
+                <a16:creationId xmlns:a16="http://schemas.microsoft.com/office/drawing/2014/main" id="{296FA080-3231-C715-FAFE-53B84DFA3056}"/>
+              </a:ext>
+            </a:extLst>
+          </p:cNvPr>
+          <p:cNvCxnSpPr>
+            <a:cxnSpLocks/>
+          </p:cNvCxnSpPr>
+          <p:nvPr/>
+        </p:nvCxnSpPr>
+        <p:spPr>
+          <a:xfrm flipH="1">
+            <a:off x="8664209" y="4925751"/>
+            <a:ext cx="2626091" cy="0"/>
+          </a:xfrm>
+          <a:prstGeom prst="line">
+            <a:avLst/>
+          </a:prstGeom>
+          <a:ln w="38100">
+            <a:solidFill>
+              <a:schemeClr val="accent3">
+                <a:lumMod val="60000"/>
+                <a:lumOff val="40000"/>
+              </a:schemeClr>
+            </a:solidFill>
+          </a:ln>
+        </p:spPr>
+        <p:style>
+          <a:lnRef idx="2">
+            <a:schemeClr val="accent1"/>
+          </a:lnRef>
+          <a:fillRef idx="0">
+            <a:schemeClr val="accent1"/>
+          </a:fillRef>
+          <a:effectRef idx="1">
+            <a:schemeClr val="accent1"/>
+          </a:effectRef>
+          <a:fontRef idx="minor">
+            <a:schemeClr val="tx1"/>
+          </a:fontRef>
+        </p:style>
+      </p:cxnSp>
+      <p:cxnSp>
+        <p:nvCxnSpPr>
+          <p:cNvPr id="11" name="Straight Connector 10">
+            <a:extLst>
+              <a:ext uri="{FF2B5EF4-FFF2-40B4-BE49-F238E27FC236}">
+                <a16:creationId xmlns:a16="http://schemas.microsoft.com/office/drawing/2014/main" id="{47474095-D42A-AE5C-0574-0315B82E7CCD}"/>
+              </a:ext>
+            </a:extLst>
+          </p:cNvPr>
+          <p:cNvCxnSpPr>
+            <a:cxnSpLocks/>
+            <a:endCxn id="4" idx="3"/>
+          </p:cNvCxnSpPr>
+          <p:nvPr/>
+        </p:nvCxnSpPr>
+        <p:spPr>
+          <a:xfrm flipV="1">
+            <a:off x="8678060" y="4874408"/>
+            <a:ext cx="0" cy="75790"/>
+          </a:xfrm>
+          <a:prstGeom prst="line">
+            <a:avLst/>
+          </a:prstGeom>
+          <a:ln w="38100">
+            <a:solidFill>
+              <a:schemeClr val="accent3">
+                <a:lumMod val="60000"/>
+                <a:lumOff val="40000"/>
+              </a:schemeClr>
+            </a:solidFill>
+          </a:ln>
+        </p:spPr>
+        <p:style>
+          <a:lnRef idx="2">
+            <a:schemeClr val="accent1"/>
+          </a:lnRef>
+          <a:fillRef idx="0">
+            <a:schemeClr val="accent1"/>
+          </a:fillRef>
+          <a:effectRef idx="1">
+            <a:schemeClr val="accent1"/>
+          </a:effectRef>
+          <a:fontRef idx="minor">
+            <a:schemeClr val="tx1"/>
+          </a:fontRef>
+        </p:style>
+      </p:cxnSp>
+      <p:cxnSp>
+        <p:nvCxnSpPr>
+          <p:cNvPr id="20" name="Straight Connector 19">
+            <a:extLst>
+              <a:ext uri="{FF2B5EF4-FFF2-40B4-BE49-F238E27FC236}">
+                <a16:creationId xmlns:a16="http://schemas.microsoft.com/office/drawing/2014/main" id="{7C2E79E2-2807-F45B-8879-7C8A763987CA}"/>
+              </a:ext>
+            </a:extLst>
+          </p:cNvPr>
+          <p:cNvCxnSpPr>
+            <a:cxnSpLocks/>
+          </p:cNvCxnSpPr>
+          <p:nvPr/>
+        </p:nvCxnSpPr>
+        <p:spPr>
+          <a:xfrm flipH="1">
+            <a:off x="6810140" y="5462344"/>
+            <a:ext cx="1287840" cy="0"/>
+          </a:xfrm>
+          <a:prstGeom prst="line">
+            <a:avLst/>
+          </a:prstGeom>
+          <a:ln w="38100">
+            <a:solidFill>
+              <a:srgbClr val="002060"/>
+            </a:solidFill>
+          </a:ln>
+        </p:spPr>
+        <p:style>
+          <a:lnRef idx="2">
+            <a:schemeClr val="accent1"/>
+          </a:lnRef>
+          <a:fillRef idx="0">
+            <a:schemeClr val="accent1"/>
+          </a:fillRef>
+          <a:effectRef idx="1">
+            <a:schemeClr val="accent1"/>
+          </a:effectRef>
+          <a:fontRef idx="minor">
+            <a:schemeClr val="tx1"/>
+          </a:fontRef>
+        </p:style>
+      </p:cxnSp>
+      <p:cxnSp>
+        <p:nvCxnSpPr>
+          <p:cNvPr id="25" name="Straight Connector 24">
+            <a:extLst>
+              <a:ext uri="{FF2B5EF4-FFF2-40B4-BE49-F238E27FC236}">
+                <a16:creationId xmlns:a16="http://schemas.microsoft.com/office/drawing/2014/main" id="{AB6E3896-39F3-6CD7-7AF8-06CC9A89042C}"/>
+              </a:ext>
+            </a:extLst>
+          </p:cNvPr>
+          <p:cNvCxnSpPr>
+            <a:cxnSpLocks/>
+          </p:cNvCxnSpPr>
+          <p:nvPr/>
+        </p:nvCxnSpPr>
+        <p:spPr>
+          <a:xfrm flipH="1" flipV="1">
+            <a:off x="8088681" y="3926363"/>
+            <a:ext cx="9299" cy="1535981"/>
+          </a:xfrm>
+          <a:prstGeom prst="line">
+            <a:avLst/>
+          </a:prstGeom>
+          <a:ln w="38100">
+            <a:solidFill>
+              <a:srgbClr val="002060"/>
+            </a:solidFill>
+          </a:ln>
+        </p:spPr>
+        <p:style>
+          <a:lnRef idx="2">
+            <a:schemeClr val="accent1"/>
+          </a:lnRef>
+          <a:fillRef idx="0">
+            <a:schemeClr val="accent1"/>
+          </a:fillRef>
+          <a:effectRef idx="1">
+            <a:schemeClr val="accent1"/>
+          </a:effectRef>
+          <a:fontRef idx="minor">
+            <a:schemeClr val="tx1"/>
+          </a:fontRef>
+        </p:style>
+      </p:cxnSp>
+      <p:cxnSp>
+        <p:nvCxnSpPr>
+          <p:cNvPr id="28" name="Straight Connector 27">
+            <a:extLst>
+              <a:ext uri="{FF2B5EF4-FFF2-40B4-BE49-F238E27FC236}">
+                <a16:creationId xmlns:a16="http://schemas.microsoft.com/office/drawing/2014/main" id="{2B68115F-83F0-D3F0-F082-CE6B32886E42}"/>
+              </a:ext>
+            </a:extLst>
+          </p:cNvPr>
+          <p:cNvCxnSpPr>
+            <a:cxnSpLocks/>
+          </p:cNvCxnSpPr>
+          <p:nvPr/>
+        </p:nvCxnSpPr>
+        <p:spPr>
+          <a:xfrm flipH="1">
+            <a:off x="8087328" y="3938491"/>
+            <a:ext cx="590732" cy="0"/>
+          </a:xfrm>
+          <a:prstGeom prst="line">
+            <a:avLst/>
+          </a:prstGeom>
+          <a:ln w="38100">
+            <a:solidFill>
+              <a:srgbClr val="002060"/>
+            </a:solidFill>
+          </a:ln>
+        </p:spPr>
+        <p:style>
+          <a:lnRef idx="2">
+            <a:schemeClr val="accent1"/>
+          </a:lnRef>
+          <a:fillRef idx="0">
+            <a:schemeClr val="accent1"/>
+          </a:fillRef>
+          <a:effectRef idx="1">
+            <a:schemeClr val="accent1"/>
+          </a:effectRef>
+          <a:fontRef idx="minor">
+            <a:schemeClr val="tx1"/>
+          </a:fontRef>
+        </p:style>
+      </p:cxnSp>
     </p:spTree>
     <p:extLst>
       <p:ext uri="{BB962C8B-B14F-4D97-AF65-F5344CB8AC3E}">

</xml_diff>

<commit_message>
Update README to reflect normalized joystick input range and improve clarity; update binary diagrams
</commit_message>
<xml_diff>
--- a/assets/Diagram.pptx
+++ b/assets/Diagram.pptx
@@ -690,7 +690,7 @@
           <a:p>
             <a:fld id="{7F5102BF-3E1C-4FEC-B8AE-4CD23D8F5F17}" type="datetimeFigureOut">
               <a:rPr lang="en-US" smtClean="0"/>
-              <a:t>5/25/2025</a:t>
+              <a:t>5/26/2025</a:t>
             </a:fld>
             <a:endParaRPr lang="en-US"/>
           </a:p>
@@ -860,7 +860,7 @@
           <a:p>
             <a:fld id="{7F5102BF-3E1C-4FEC-B8AE-4CD23D8F5F17}" type="datetimeFigureOut">
               <a:rPr lang="en-US" smtClean="0"/>
-              <a:t>5/25/2025</a:t>
+              <a:t>5/26/2025</a:t>
             </a:fld>
             <a:endParaRPr lang="en-US"/>
           </a:p>
@@ -1040,7 +1040,7 @@
           <a:p>
             <a:fld id="{7F5102BF-3E1C-4FEC-B8AE-4CD23D8F5F17}" type="datetimeFigureOut">
               <a:rPr lang="en-US" smtClean="0"/>
-              <a:t>5/25/2025</a:t>
+              <a:t>5/26/2025</a:t>
             </a:fld>
             <a:endParaRPr lang="en-US"/>
           </a:p>
@@ -1210,7 +1210,7 @@
           <a:p>
             <a:fld id="{7F5102BF-3E1C-4FEC-B8AE-4CD23D8F5F17}" type="datetimeFigureOut">
               <a:rPr lang="en-US" smtClean="0"/>
-              <a:t>5/25/2025</a:t>
+              <a:t>5/26/2025</a:t>
             </a:fld>
             <a:endParaRPr lang="en-US"/>
           </a:p>
@@ -1456,7 +1456,7 @@
           <a:p>
             <a:fld id="{7F5102BF-3E1C-4FEC-B8AE-4CD23D8F5F17}" type="datetimeFigureOut">
               <a:rPr lang="en-US" smtClean="0"/>
-              <a:t>5/25/2025</a:t>
+              <a:t>5/26/2025</a:t>
             </a:fld>
             <a:endParaRPr lang="en-US"/>
           </a:p>
@@ -1688,7 +1688,7 @@
           <a:p>
             <a:fld id="{7F5102BF-3E1C-4FEC-B8AE-4CD23D8F5F17}" type="datetimeFigureOut">
               <a:rPr lang="en-US" smtClean="0"/>
-              <a:t>5/25/2025</a:t>
+              <a:t>5/26/2025</a:t>
             </a:fld>
             <a:endParaRPr lang="en-US"/>
           </a:p>
@@ -2055,7 +2055,7 @@
           <a:p>
             <a:fld id="{7F5102BF-3E1C-4FEC-B8AE-4CD23D8F5F17}" type="datetimeFigureOut">
               <a:rPr lang="en-US" smtClean="0"/>
-              <a:t>5/25/2025</a:t>
+              <a:t>5/26/2025</a:t>
             </a:fld>
             <a:endParaRPr lang="en-US"/>
           </a:p>
@@ -2173,7 +2173,7 @@
           <a:p>
             <a:fld id="{7F5102BF-3E1C-4FEC-B8AE-4CD23D8F5F17}" type="datetimeFigureOut">
               <a:rPr lang="en-US" smtClean="0"/>
-              <a:t>5/25/2025</a:t>
+              <a:t>5/26/2025</a:t>
             </a:fld>
             <a:endParaRPr lang="en-US"/>
           </a:p>
@@ -2268,7 +2268,7 @@
           <a:p>
             <a:fld id="{7F5102BF-3E1C-4FEC-B8AE-4CD23D8F5F17}" type="datetimeFigureOut">
               <a:rPr lang="en-US" smtClean="0"/>
-              <a:t>5/25/2025</a:t>
+              <a:t>5/26/2025</a:t>
             </a:fld>
             <a:endParaRPr lang="en-US"/>
           </a:p>
@@ -2545,7 +2545,7 @@
           <a:p>
             <a:fld id="{7F5102BF-3E1C-4FEC-B8AE-4CD23D8F5F17}" type="datetimeFigureOut">
               <a:rPr lang="en-US" smtClean="0"/>
-              <a:t>5/25/2025</a:t>
+              <a:t>5/26/2025</a:t>
             </a:fld>
             <a:endParaRPr lang="en-US"/>
           </a:p>
@@ -2802,7 +2802,7 @@
           <a:p>
             <a:fld id="{7F5102BF-3E1C-4FEC-B8AE-4CD23D8F5F17}" type="datetimeFigureOut">
               <a:rPr lang="en-US" smtClean="0"/>
-              <a:t>5/25/2025</a:t>
+              <a:t>5/26/2025</a:t>
             </a:fld>
             <a:endParaRPr lang="en-US"/>
           </a:p>
@@ -3015,7 +3015,7 @@
           <a:p>
             <a:fld id="{7F5102BF-3E1C-4FEC-B8AE-4CD23D8F5F17}" type="datetimeFigureOut">
               <a:rPr lang="en-US" smtClean="0"/>
-              <a:t>5/25/2025</a:t>
+              <a:t>5/26/2025</a:t>
             </a:fld>
             <a:endParaRPr lang="en-US"/>
           </a:p>
@@ -3447,7 +3447,7 @@
         </p:nvCxnSpPr>
         <p:spPr>
           <a:xfrm flipV="1">
-            <a:off x="2833968" y="1708786"/>
+            <a:off x="3395441" y="1692744"/>
             <a:ext cx="0" cy="3071194"/>
           </a:xfrm>
           <a:prstGeom prst="line">
@@ -3490,7 +3490,7 @@
         </p:nvCxnSpPr>
         <p:spPr>
           <a:xfrm flipV="1">
-            <a:off x="3081057" y="1815692"/>
+            <a:off x="3642530" y="1799650"/>
             <a:ext cx="0" cy="3097866"/>
           </a:xfrm>
           <a:prstGeom prst="line">
@@ -3607,7 +3607,7 @@
         </p:blipFill>
         <p:spPr bwMode="auto">
           <a:xfrm rot="10800000">
-            <a:off x="6905245" y="4907387"/>
+            <a:off x="7466718" y="4891345"/>
             <a:ext cx="1083526" cy="1373981"/>
           </a:xfrm>
           <a:prstGeom prst="rect">
@@ -3715,7 +3715,7 @@
         </p:blipFill>
         <p:spPr bwMode="auto">
           <a:xfrm rot="5400000">
-            <a:off x="6181701" y="2814909"/>
+            <a:off x="6743174" y="2798867"/>
             <a:ext cx="2631749" cy="1178298"/>
           </a:xfrm>
           <a:prstGeom prst="rect">
@@ -3749,7 +3749,7 @@
         </p:nvCxnSpPr>
         <p:spPr>
           <a:xfrm>
-            <a:off x="7949956" y="5389833"/>
+            <a:off x="8511429" y="5373791"/>
             <a:ext cx="352258" cy="0"/>
           </a:xfrm>
           <a:prstGeom prst="line">
@@ -3788,7 +3788,7 @@
         </p:nvCxnSpPr>
         <p:spPr>
           <a:xfrm>
-            <a:off x="8035964" y="4397188"/>
+            <a:off x="8597437" y="4381146"/>
             <a:ext cx="266252" cy="0"/>
           </a:xfrm>
           <a:prstGeom prst="line">
@@ -3827,7 +3827,7 @@
         </p:nvCxnSpPr>
         <p:spPr>
           <a:xfrm>
-            <a:off x="8302214" y="4397190"/>
+            <a:off x="8863687" y="4381148"/>
             <a:ext cx="0" cy="992645"/>
           </a:xfrm>
           <a:prstGeom prst="line">
@@ -3866,7 +3866,7 @@
         </p:nvCxnSpPr>
         <p:spPr>
           <a:xfrm>
-            <a:off x="7954248" y="5224433"/>
+            <a:off x="8515721" y="5208391"/>
             <a:ext cx="429566" cy="0"/>
           </a:xfrm>
           <a:prstGeom prst="line">
@@ -3911,7 +3911,7 @@
         </p:nvCxnSpPr>
         <p:spPr>
           <a:xfrm>
-            <a:off x="8035965" y="4280198"/>
+            <a:off x="8597438" y="4264156"/>
             <a:ext cx="347849" cy="0"/>
           </a:xfrm>
           <a:prstGeom prst="line">
@@ -3956,7 +3956,7 @@
         </p:nvCxnSpPr>
         <p:spPr>
           <a:xfrm>
-            <a:off x="8383811" y="4280200"/>
+            <a:off x="8945284" y="4264158"/>
             <a:ext cx="0" cy="944236"/>
           </a:xfrm>
           <a:prstGeom prst="line">
@@ -4001,7 +4001,7 @@
         </p:nvCxnSpPr>
         <p:spPr>
           <a:xfrm flipH="1">
-            <a:off x="6474758" y="5841186"/>
+            <a:off x="7036231" y="5825144"/>
             <a:ext cx="508300" cy="0"/>
           </a:xfrm>
           <a:prstGeom prst="line">
@@ -4044,7 +4044,7 @@
         </p:nvCxnSpPr>
         <p:spPr>
           <a:xfrm>
-            <a:off x="6474758" y="2811782"/>
+            <a:off x="7036231" y="2795740"/>
             <a:ext cx="0" cy="3746183"/>
           </a:xfrm>
           <a:prstGeom prst="line">
@@ -4087,7 +4087,7 @@
         </p:nvCxnSpPr>
         <p:spPr>
           <a:xfrm flipH="1">
-            <a:off x="6474758" y="2811780"/>
+            <a:off x="7036231" y="2795738"/>
             <a:ext cx="508300" cy="0"/>
           </a:xfrm>
           <a:prstGeom prst="line">
@@ -4130,7 +4130,7 @@
         </p:nvCxnSpPr>
         <p:spPr>
           <a:xfrm flipH="1">
-            <a:off x="6691592" y="5991051"/>
+            <a:off x="7253065" y="5975009"/>
             <a:ext cx="291468" cy="0"/>
           </a:xfrm>
           <a:prstGeom prst="line">
@@ -4173,7 +4173,7 @@
         </p:nvCxnSpPr>
         <p:spPr>
           <a:xfrm>
-            <a:off x="6683216" y="2565701"/>
+            <a:off x="7244689" y="2549659"/>
             <a:ext cx="0" cy="3848212"/>
           </a:xfrm>
           <a:prstGeom prst="line">
@@ -4216,7 +4216,7 @@
         </p:nvCxnSpPr>
         <p:spPr>
           <a:xfrm flipH="1">
-            <a:off x="6700452" y="2565698"/>
+            <a:off x="7261925" y="2549656"/>
             <a:ext cx="282608" cy="0"/>
           </a:xfrm>
           <a:prstGeom prst="line">
@@ -4301,7 +4301,7 @@
         </p:blipFill>
         <p:spPr bwMode="auto">
           <a:xfrm>
-            <a:off x="9116983" y="1101314"/>
+            <a:off x="9678456" y="1085272"/>
             <a:ext cx="3070217" cy="2698826"/>
           </a:xfrm>
           <a:prstGeom prst="rect">
@@ -4333,7 +4333,7 @@
         </p:nvCxnSpPr>
         <p:spPr>
           <a:xfrm>
-            <a:off x="8086724" y="2737485"/>
+            <a:off x="8648197" y="2721443"/>
             <a:ext cx="3200403" cy="0"/>
           </a:xfrm>
           <a:prstGeom prst="line">
@@ -4376,7 +4376,7 @@
         </p:nvCxnSpPr>
         <p:spPr>
           <a:xfrm flipV="1">
-            <a:off x="11281073" y="1886287"/>
+            <a:off x="11842546" y="1870245"/>
             <a:ext cx="0" cy="857250"/>
           </a:xfrm>
           <a:prstGeom prst="line">
@@ -4419,7 +4419,7 @@
         </p:nvCxnSpPr>
         <p:spPr>
           <a:xfrm>
-            <a:off x="8086724" y="2565698"/>
+            <a:off x="8648197" y="2549656"/>
             <a:ext cx="3886203" cy="0"/>
           </a:xfrm>
           <a:prstGeom prst="line">
@@ -4465,7 +4465,7 @@
         </p:nvCxnSpPr>
         <p:spPr>
           <a:xfrm flipV="1">
-            <a:off x="11977967" y="1503718"/>
+            <a:off x="12539440" y="1487676"/>
             <a:ext cx="0" cy="1074083"/>
           </a:xfrm>
           <a:prstGeom prst="line">
@@ -4547,7 +4547,7 @@
         </p:blipFill>
         <p:spPr bwMode="auto">
           <a:xfrm rot="20602394" flipH="1" flipV="1">
-            <a:off x="441662" y="2475060"/>
+            <a:off x="1003135" y="2459018"/>
             <a:ext cx="2076782" cy="1659703"/>
           </a:xfrm>
           <a:prstGeom prst="rect">
@@ -4617,7 +4617,7 @@
         </p:blipFill>
         <p:spPr bwMode="auto">
           <a:xfrm rot="20602394" flipH="1" flipV="1">
-            <a:off x="514450" y="4283987"/>
+            <a:off x="1075923" y="4267945"/>
             <a:ext cx="2076782" cy="1659703"/>
           </a:xfrm>
           <a:prstGeom prst="rect">
@@ -4649,7 +4649,7 @@
         </p:nvCxnSpPr>
         <p:spPr>
           <a:xfrm flipV="1">
-            <a:off x="7202245" y="1880236"/>
+            <a:off x="7763718" y="1864194"/>
             <a:ext cx="0" cy="332401"/>
           </a:xfrm>
           <a:prstGeom prst="line">
@@ -4692,7 +4692,7 @@
         </p:nvCxnSpPr>
         <p:spPr>
           <a:xfrm flipH="1">
-            <a:off x="2913873" y="1869292"/>
+            <a:off x="3475346" y="1853250"/>
             <a:ext cx="4312122" cy="26024"/>
           </a:xfrm>
           <a:prstGeom prst="line">
@@ -4735,7 +4735,7 @@
         </p:nvCxnSpPr>
         <p:spPr>
           <a:xfrm flipV="1">
-            <a:off x="2432797" y="1880237"/>
+            <a:off x="2994270" y="1864195"/>
             <a:ext cx="0" cy="1248224"/>
           </a:xfrm>
           <a:prstGeom prst="line">
@@ -4778,7 +4778,7 @@
         </p:nvCxnSpPr>
         <p:spPr>
           <a:xfrm flipV="1">
-            <a:off x="7374367" y="1980860"/>
+            <a:off x="7935840" y="1964818"/>
             <a:ext cx="0" cy="231776"/>
           </a:xfrm>
           <a:prstGeom prst="line">
@@ -4822,7 +4822,7 @@
         </p:nvCxnSpPr>
         <p:spPr>
           <a:xfrm flipH="1">
-            <a:off x="3168859" y="1998333"/>
+            <a:off x="3730332" y="1982291"/>
             <a:ext cx="4221781" cy="59376"/>
           </a:xfrm>
           <a:prstGeom prst="line">
@@ -4865,7 +4865,7 @@
         </p:nvCxnSpPr>
         <p:spPr>
           <a:xfrm flipV="1">
-            <a:off x="2514152" y="2038002"/>
+            <a:off x="3075625" y="2021960"/>
             <a:ext cx="0" cy="1137041"/>
           </a:xfrm>
           <a:prstGeom prst="line">
@@ -4908,7 +4908,7 @@
         </p:nvCxnSpPr>
         <p:spPr>
           <a:xfrm flipV="1">
-            <a:off x="7588175" y="1708786"/>
+            <a:off x="8149648" y="1692744"/>
             <a:ext cx="0" cy="503851"/>
           </a:xfrm>
           <a:prstGeom prst="line">
@@ -4951,7 +4951,7 @@
         </p:nvCxnSpPr>
         <p:spPr>
           <a:xfrm flipH="1">
-            <a:off x="2830323" y="1708785"/>
+            <a:off x="3391796" y="1692743"/>
             <a:ext cx="4755836" cy="0"/>
           </a:xfrm>
           <a:prstGeom prst="line">
@@ -4994,7 +4994,7 @@
         </p:nvCxnSpPr>
         <p:spPr>
           <a:xfrm flipV="1">
-            <a:off x="7760298" y="1815690"/>
+            <a:off x="8321771" y="1799648"/>
             <a:ext cx="0" cy="447449"/>
           </a:xfrm>
           <a:prstGeom prst="line">
@@ -5037,7 +5037,7 @@
         </p:nvCxnSpPr>
         <p:spPr>
           <a:xfrm flipH="1">
-            <a:off x="3078848" y="1815690"/>
+            <a:off x="3640321" y="1799648"/>
             <a:ext cx="4679435" cy="0"/>
           </a:xfrm>
           <a:prstGeom prst="line">
@@ -5080,7 +5080,7 @@
         </p:nvCxnSpPr>
         <p:spPr>
           <a:xfrm flipH="1">
-            <a:off x="2511237" y="4779979"/>
+            <a:off x="3072710" y="4763937"/>
             <a:ext cx="332955" cy="0"/>
           </a:xfrm>
           <a:prstGeom prst="line">
@@ -5123,7 +5123,7 @@
         </p:nvCxnSpPr>
         <p:spPr>
           <a:xfrm flipH="1">
-            <a:off x="2587214" y="4907504"/>
+            <a:off x="3148687" y="4891462"/>
             <a:ext cx="493844" cy="0"/>
           </a:xfrm>
           <a:prstGeom prst="line">
@@ -5166,7 +5166,7 @@
         </p:nvCxnSpPr>
         <p:spPr>
           <a:xfrm flipV="1">
-            <a:off x="2513116" y="4765408"/>
+            <a:off x="3074589" y="4749366"/>
             <a:ext cx="0" cy="129992"/>
           </a:xfrm>
           <a:prstGeom prst="line">
@@ -5209,7 +5209,7 @@
         </p:nvCxnSpPr>
         <p:spPr>
           <a:xfrm flipV="1">
-            <a:off x="2587213" y="4913558"/>
+            <a:off x="3148686" y="4897516"/>
             <a:ext cx="0" cy="66563"/>
           </a:xfrm>
           <a:prstGeom prst="line">
@@ -5250,7 +5250,7 @@
         </p:nvSpPr>
         <p:spPr>
           <a:xfrm>
-            <a:off x="2988837" y="1967698"/>
+            <a:off x="3550310" y="1951656"/>
             <a:ext cx="180022" cy="180022"/>
           </a:xfrm>
           <a:prstGeom prst="arc">
@@ -5305,7 +5305,7 @@
         </p:nvCxnSpPr>
         <p:spPr>
           <a:xfrm flipH="1">
-            <a:off x="2416600" y="1885563"/>
+            <a:off x="2978073" y="1869521"/>
             <a:ext cx="323867" cy="2290"/>
           </a:xfrm>
           <a:prstGeom prst="line">
@@ -5346,7 +5346,7 @@
         </p:nvSpPr>
         <p:spPr>
           <a:xfrm>
-            <a:off x="2740312" y="1800838"/>
+            <a:off x="3301785" y="1784796"/>
             <a:ext cx="180022" cy="180022"/>
           </a:xfrm>
           <a:prstGeom prst="arc">
@@ -5401,7 +5401,7 @@
         </p:nvCxnSpPr>
         <p:spPr>
           <a:xfrm flipH="1">
-            <a:off x="2511237" y="2046419"/>
+            <a:off x="3072710" y="2030377"/>
             <a:ext cx="478310" cy="1576"/>
           </a:xfrm>
           <a:prstGeom prst="line">
@@ -5444,8 +5444,8 @@
         </p:nvCxnSpPr>
         <p:spPr>
           <a:xfrm flipH="1">
-            <a:off x="9334906" y="5647765"/>
-            <a:ext cx="150095" cy="0"/>
+            <a:off x="11171763" y="6638121"/>
+            <a:ext cx="155271" cy="0"/>
           </a:xfrm>
           <a:prstGeom prst="line">
             <a:avLst/>
@@ -5485,7 +5485,7 @@
         </p:nvSpPr>
         <p:spPr>
           <a:xfrm>
-            <a:off x="9441330" y="5482074"/>
+            <a:off x="11284537" y="6481155"/>
             <a:ext cx="524361" cy="313932"/>
           </a:xfrm>
           <a:prstGeom prst="rect">
@@ -5523,8 +5523,8 @@
         </p:nvCxnSpPr>
         <p:spPr>
           <a:xfrm flipH="1">
-            <a:off x="9334906" y="5876447"/>
-            <a:ext cx="150095" cy="0"/>
+            <a:off x="11171763" y="6866803"/>
+            <a:ext cx="155270" cy="0"/>
           </a:xfrm>
           <a:prstGeom prst="line">
             <a:avLst/>
@@ -5564,7 +5564,7 @@
         </p:nvSpPr>
         <p:spPr>
           <a:xfrm>
-            <a:off x="9441329" y="5710756"/>
+            <a:off x="11284537" y="6709837"/>
             <a:ext cx="677584" cy="313932"/>
           </a:xfrm>
           <a:prstGeom prst="rect">
@@ -5602,8 +5602,8 @@
         </p:nvCxnSpPr>
         <p:spPr>
           <a:xfrm flipH="1">
-            <a:off x="9334906" y="6118154"/>
-            <a:ext cx="150095" cy="0"/>
+            <a:off x="11171763" y="7108511"/>
+            <a:ext cx="155448" cy="0"/>
           </a:xfrm>
           <a:prstGeom prst="line">
             <a:avLst/>
@@ -5645,7 +5645,7 @@
         </p:nvSpPr>
         <p:spPr>
           <a:xfrm>
-            <a:off x="9441330" y="5952464"/>
+            <a:off x="11284537" y="6951545"/>
             <a:ext cx="524361" cy="313932"/>
           </a:xfrm>
           <a:prstGeom prst="rect">
@@ -5682,9 +5682,9 @@
           <p:nvPr/>
         </p:nvCxnSpPr>
         <p:spPr>
-          <a:xfrm flipH="1">
-            <a:off x="9334906" y="6346836"/>
-            <a:ext cx="150095" cy="0"/>
+          <a:xfrm flipH="1" flipV="1">
+            <a:off x="11171763" y="7337191"/>
+            <a:ext cx="155270" cy="1"/>
           </a:xfrm>
           <a:prstGeom prst="line">
             <a:avLst/>
@@ -5726,7 +5726,7 @@
         </p:nvSpPr>
         <p:spPr>
           <a:xfrm>
-            <a:off x="9441329" y="6181145"/>
+            <a:off x="11284537" y="7180226"/>
             <a:ext cx="677584" cy="313932"/>
           </a:xfrm>
           <a:prstGeom prst="rect">
@@ -5764,8 +5764,8 @@
         </p:nvCxnSpPr>
         <p:spPr>
           <a:xfrm flipH="1">
-            <a:off x="10343434" y="5647765"/>
-            <a:ext cx="150095" cy="0"/>
+            <a:off x="12231951" y="6638121"/>
+            <a:ext cx="155448" cy="0"/>
           </a:xfrm>
           <a:prstGeom prst="line">
             <a:avLst/>
@@ -5805,7 +5805,7 @@
         </p:nvSpPr>
         <p:spPr>
           <a:xfrm>
-            <a:off x="10449859" y="5482074"/>
+            <a:off x="12338377" y="6481155"/>
             <a:ext cx="1030569" cy="313932"/>
           </a:xfrm>
           <a:prstGeom prst="rect">
@@ -5843,8 +5843,8 @@
         </p:nvCxnSpPr>
         <p:spPr>
           <a:xfrm flipH="1">
-            <a:off x="10343434" y="5876447"/>
-            <a:ext cx="150095" cy="0"/>
+            <a:off x="12231951" y="6866806"/>
+            <a:ext cx="155448" cy="0"/>
           </a:xfrm>
           <a:prstGeom prst="line">
             <a:avLst/>
@@ -5884,8 +5884,8 @@
         </p:nvSpPr>
         <p:spPr>
           <a:xfrm>
-            <a:off x="10449858" y="5710759"/>
-            <a:ext cx="970058" cy="535531"/>
+            <a:off x="12338377" y="6709840"/>
+            <a:ext cx="970058" cy="313932"/>
           </a:xfrm>
           <a:prstGeom prst="rect">
             <a:avLst/>
@@ -5904,9 +5904,6 @@
             </a:r>
             <a:endParaRPr lang="en-US" sz="1440" dirty="0"/>
           </a:p>
-          <a:p>
-            <a:endParaRPr lang="en-US" sz="1440" dirty="0"/>
-          </a:p>
         </p:txBody>
       </p:sp>
       <p:cxnSp>
@@ -5925,8 +5922,8 @@
         </p:nvCxnSpPr>
         <p:spPr>
           <a:xfrm flipH="1">
-            <a:off x="10343434" y="6118154"/>
-            <a:ext cx="150095" cy="0"/>
+            <a:off x="12231951" y="7108511"/>
+            <a:ext cx="155448" cy="0"/>
           </a:xfrm>
           <a:prstGeom prst="line">
             <a:avLst/>
@@ -5966,7 +5963,7 @@
         </p:nvSpPr>
         <p:spPr>
           <a:xfrm>
-            <a:off x="10449859" y="5952464"/>
+            <a:off x="12338377" y="6951545"/>
             <a:ext cx="677584" cy="313932"/>
           </a:xfrm>
           <a:prstGeom prst="rect">
@@ -6004,8 +6001,8 @@
         </p:nvCxnSpPr>
         <p:spPr>
           <a:xfrm flipH="1">
-            <a:off x="10343434" y="6346836"/>
-            <a:ext cx="150095" cy="0"/>
+            <a:off x="12231951" y="7337192"/>
+            <a:ext cx="155448" cy="0"/>
           </a:xfrm>
           <a:prstGeom prst="line">
             <a:avLst/>
@@ -6048,7 +6045,7 @@
         </p:nvSpPr>
         <p:spPr>
           <a:xfrm>
-            <a:off x="10449859" y="6181145"/>
+            <a:off x="12338377" y="7180226"/>
             <a:ext cx="677584" cy="313932"/>
           </a:xfrm>
           <a:prstGeom prst="rect">
@@ -6128,7 +6125,7 @@
         </p:blipFill>
         <p:spPr>
           <a:xfrm rot="10800000">
-            <a:off x="9116310" y="4326592"/>
+            <a:off x="10880933" y="4310550"/>
             <a:ext cx="1239124" cy="711845"/>
           </a:xfrm>
           <a:prstGeom prst="rect">
@@ -6152,7 +6149,7 @@
         </p:nvCxnSpPr>
         <p:spPr>
           <a:xfrm flipV="1">
-            <a:off x="10068820" y="2737486"/>
+            <a:off x="11833443" y="2721444"/>
             <a:ext cx="0" cy="1653651"/>
           </a:xfrm>
           <a:prstGeom prst="line">
@@ -6195,7 +6192,7 @@
         </p:nvCxnSpPr>
         <p:spPr>
           <a:xfrm flipV="1">
-            <a:off x="9965688" y="2565699"/>
+            <a:off x="11730311" y="2549657"/>
             <a:ext cx="0" cy="1813297"/>
           </a:xfrm>
           <a:prstGeom prst="line">
@@ -6241,7 +6238,7 @@
         </p:nvCxnSpPr>
         <p:spPr>
           <a:xfrm flipH="1">
-            <a:off x="8972781" y="4247800"/>
+            <a:off x="10737404" y="4231758"/>
             <a:ext cx="532818" cy="0"/>
           </a:xfrm>
           <a:prstGeom prst="line">
@@ -6284,7 +6281,7 @@
         </p:nvCxnSpPr>
         <p:spPr>
           <a:xfrm>
-            <a:off x="8972781" y="4229772"/>
+            <a:off x="10737404" y="4213730"/>
             <a:ext cx="0" cy="2183465"/>
           </a:xfrm>
           <a:prstGeom prst="line">
@@ -6327,7 +6324,7 @@
         </p:nvCxnSpPr>
         <p:spPr>
           <a:xfrm>
-            <a:off x="9505599" y="4231917"/>
+            <a:off x="11270222" y="4215875"/>
             <a:ext cx="0" cy="149223"/>
           </a:xfrm>
           <a:prstGeom prst="line">
@@ -6370,8 +6367,8 @@
         </p:nvCxnSpPr>
         <p:spPr>
           <a:xfrm flipH="1">
-            <a:off x="6683217" y="6404664"/>
-            <a:ext cx="2293852" cy="0"/>
+            <a:off x="7244690" y="6388622"/>
+            <a:ext cx="3492714" cy="0"/>
           </a:xfrm>
           <a:prstGeom prst="line">
             <a:avLst/>
@@ -6413,7 +6410,7 @@
         </p:nvCxnSpPr>
         <p:spPr>
           <a:xfrm>
-            <a:off x="8768776" y="4310812"/>
+            <a:off x="10533399" y="4294770"/>
             <a:ext cx="0" cy="2247151"/>
           </a:xfrm>
           <a:prstGeom prst="line">
@@ -6456,7 +6453,7 @@
         </p:nvCxnSpPr>
         <p:spPr>
           <a:xfrm flipH="1">
-            <a:off x="8768778" y="4310812"/>
+            <a:off x="10533401" y="4294770"/>
             <a:ext cx="641177" cy="0"/>
           </a:xfrm>
           <a:prstGeom prst="line">
@@ -6499,8 +6496,8 @@
         </p:nvCxnSpPr>
         <p:spPr>
           <a:xfrm flipH="1">
-            <a:off x="6474760" y="6548234"/>
-            <a:ext cx="2302592" cy="0"/>
+            <a:off x="7036233" y="6532192"/>
+            <a:ext cx="3497166" cy="0"/>
           </a:xfrm>
           <a:prstGeom prst="line">
             <a:avLst/>
@@ -6599,7 +6596,7 @@
         </p:blipFill>
         <p:spPr bwMode="auto">
           <a:xfrm rot="5400000">
-            <a:off x="3420300" y="2739883"/>
+            <a:off x="3981773" y="2723841"/>
             <a:ext cx="2804100" cy="2578266"/>
           </a:xfrm>
           <a:prstGeom prst="rect">
@@ -6633,7 +6630,7 @@
         </p:nvCxnSpPr>
         <p:spPr>
           <a:xfrm flipV="1">
-            <a:off x="3834696" y="1509705"/>
+            <a:off x="4396169" y="1493663"/>
             <a:ext cx="0" cy="1227780"/>
           </a:xfrm>
           <a:prstGeom prst="line">
@@ -6676,7 +6673,7 @@
         </p:nvCxnSpPr>
         <p:spPr>
           <a:xfrm flipV="1">
-            <a:off x="3731564" y="1370310"/>
+            <a:off x="4293037" y="1354268"/>
             <a:ext cx="0" cy="1367175"/>
           </a:xfrm>
           <a:prstGeom prst="line">
@@ -6722,7 +6719,7 @@
         </p:nvCxnSpPr>
         <p:spPr>
           <a:xfrm>
-            <a:off x="11150359" y="1503718"/>
+            <a:off x="11711832" y="1487676"/>
             <a:ext cx="0" cy="247929"/>
           </a:xfrm>
           <a:prstGeom prst="line">
@@ -6765,7 +6762,7 @@
         </p:nvCxnSpPr>
         <p:spPr>
           <a:xfrm>
-            <a:off x="3731564" y="1370310"/>
+            <a:off x="4293037" y="1354268"/>
             <a:ext cx="8045340" cy="0"/>
           </a:xfrm>
           <a:prstGeom prst="line">
@@ -6811,7 +6808,7 @@
         </p:nvCxnSpPr>
         <p:spPr>
           <a:xfrm>
-            <a:off x="3834696" y="1521815"/>
+            <a:off x="4396169" y="1505773"/>
             <a:ext cx="7335426" cy="0"/>
           </a:xfrm>
           <a:prstGeom prst="line">
@@ -6854,7 +6851,7 @@
         </p:nvCxnSpPr>
         <p:spPr>
           <a:xfrm flipH="1">
-            <a:off x="4449797" y="5069915"/>
+            <a:off x="5011270" y="5053873"/>
             <a:ext cx="2533261" cy="0"/>
           </a:xfrm>
           <a:prstGeom prst="line">
@@ -6897,7 +6894,7 @@
         </p:nvCxnSpPr>
         <p:spPr>
           <a:xfrm flipV="1">
-            <a:off x="4465672" y="5076265"/>
+            <a:off x="5027145" y="5060223"/>
             <a:ext cx="0" cy="200585"/>
           </a:xfrm>
           <a:prstGeom prst="line">
@@ -6940,7 +6937,7 @@
         </p:nvCxnSpPr>
         <p:spPr>
           <a:xfrm flipV="1">
-            <a:off x="4541872" y="5176557"/>
+            <a:off x="5103345" y="5160515"/>
             <a:ext cx="0" cy="100293"/>
           </a:xfrm>
           <a:prstGeom prst="line">
@@ -6986,7 +6983,7 @@
         </p:nvCxnSpPr>
         <p:spPr>
           <a:xfrm flipH="1">
-            <a:off x="4525997" y="5176557"/>
+            <a:off x="5087470" y="5160515"/>
             <a:ext cx="1706528" cy="0"/>
           </a:xfrm>
           <a:prstGeom prst="line">
@@ -7032,7 +7029,7 @@
         </p:nvCxnSpPr>
         <p:spPr>
           <a:xfrm flipV="1">
-            <a:off x="6237322" y="4806950"/>
+            <a:off x="6798795" y="4790908"/>
             <a:ext cx="0" cy="385483"/>
           </a:xfrm>
           <a:prstGeom prst="line">
@@ -7078,7 +7075,7 @@
         </p:nvCxnSpPr>
         <p:spPr>
           <a:xfrm flipH="1">
-            <a:off x="6222331" y="4830404"/>
+            <a:off x="6783804" y="4814362"/>
             <a:ext cx="1864393" cy="0"/>
           </a:xfrm>
           <a:prstGeom prst="line">
@@ -7124,7 +7121,7 @@
         </p:nvCxnSpPr>
         <p:spPr>
           <a:xfrm flipV="1">
-            <a:off x="8077199" y="4814529"/>
+            <a:off x="8638672" y="4798487"/>
             <a:ext cx="0" cy="269724"/>
           </a:xfrm>
           <a:prstGeom prst="line">
@@ -7170,7 +7167,7 @@
         </p:nvCxnSpPr>
         <p:spPr>
           <a:xfrm flipH="1">
-            <a:off x="7902575" y="5063565"/>
+            <a:off x="8464048" y="5047523"/>
             <a:ext cx="176684" cy="0"/>
           </a:xfrm>
           <a:prstGeom prst="line">
@@ -7216,8 +7213,8 @@
         </p:nvCxnSpPr>
         <p:spPr>
           <a:xfrm flipH="1">
-            <a:off x="9337720" y="6574716"/>
-            <a:ext cx="150095" cy="0"/>
+            <a:off x="11171763" y="7565871"/>
+            <a:ext cx="158084" cy="799"/>
           </a:xfrm>
           <a:prstGeom prst="line">
             <a:avLst/>
@@ -7257,8 +7254,8 @@
         </p:nvSpPr>
         <p:spPr>
           <a:xfrm>
-            <a:off x="9444143" y="6409025"/>
-            <a:ext cx="677584" cy="313932"/>
+            <a:off x="11284537" y="7408905"/>
+            <a:ext cx="512699" cy="313932"/>
           </a:xfrm>
           <a:prstGeom prst="rect">
             <a:avLst/>
@@ -7295,8 +7292,8 @@
         </p:nvCxnSpPr>
         <p:spPr>
           <a:xfrm flipH="1">
-            <a:off x="10346248" y="6574716"/>
-            <a:ext cx="150095" cy="0"/>
+            <a:off x="12231951" y="7565072"/>
+            <a:ext cx="155448" cy="0"/>
           </a:xfrm>
           <a:prstGeom prst="line">
             <a:avLst/>
@@ -7339,7 +7336,7 @@
         </p:nvSpPr>
         <p:spPr>
           <a:xfrm>
-            <a:off x="10452673" y="6409025"/>
+            <a:off x="12338377" y="7408106"/>
             <a:ext cx="677584" cy="313932"/>
           </a:xfrm>
           <a:prstGeom prst="rect">
@@ -7356,6 +7353,500 @@
             <a:r>
               <a:rPr lang="en-GB" sz="1440" dirty="0"/>
               <a:t>TX</a:t>
+            </a:r>
+            <a:endParaRPr lang="en-US" sz="1440" dirty="0"/>
+          </a:p>
+        </p:txBody>
+      </p:sp>
+      <p:sp>
+        <p:nvSpPr>
+          <p:cNvPr id="2" name="Rectangle 1">
+            <a:extLst>
+              <a:ext uri="{FF2B5EF4-FFF2-40B4-BE49-F238E27FC236}">
+                <a16:creationId xmlns:a16="http://schemas.microsoft.com/office/drawing/2014/main" id="{7AAF0CBB-51DC-B8DE-9E52-D69D436511E8}"/>
+              </a:ext>
+            </a:extLst>
+          </p:cNvPr>
+          <p:cNvSpPr/>
+          <p:nvPr/>
+        </p:nvSpPr>
+        <p:spPr>
+          <a:xfrm rot="5400000">
+            <a:off x="9371269" y="5816012"/>
+            <a:ext cx="614372" cy="243711"/>
+          </a:xfrm>
+          <a:prstGeom prst="rect">
+            <a:avLst/>
+          </a:prstGeom>
+        </p:spPr>
+        <p:style>
+          <a:lnRef idx="2">
+            <a:schemeClr val="accent1">
+              <a:shade val="15000"/>
+            </a:schemeClr>
+          </a:lnRef>
+          <a:fillRef idx="1">
+            <a:schemeClr val="accent1"/>
+          </a:fillRef>
+          <a:effectRef idx="0">
+            <a:schemeClr val="accent1"/>
+          </a:effectRef>
+          <a:fontRef idx="minor">
+            <a:schemeClr val="lt1"/>
+          </a:fontRef>
+        </p:style>
+        <p:txBody>
+          <a:bodyPr rtlCol="0" anchor="ctr"/>
+          <a:lstStyle/>
+          <a:p>
+            <a:pPr algn="ctr"/>
+            <a:r>
+              <a:rPr lang="en-US" sz="1200" dirty="0"/>
+              <a:t>10K </a:t>
+            </a:r>
+            <a:r>
+              <a:rPr lang="el-GR" sz="1200" dirty="0"/>
+              <a:t>Ω</a:t>
+            </a:r>
+            <a:endParaRPr lang="en-US" sz="1200" dirty="0"/>
+          </a:p>
+        </p:txBody>
+      </p:sp>
+      <p:sp>
+        <p:nvSpPr>
+          <p:cNvPr id="8" name="Rectangle 7">
+            <a:extLst>
+              <a:ext uri="{FF2B5EF4-FFF2-40B4-BE49-F238E27FC236}">
+                <a16:creationId xmlns:a16="http://schemas.microsoft.com/office/drawing/2014/main" id="{E5B2D43A-9A74-B27C-4F96-C4FABE97AA1C}"/>
+              </a:ext>
+            </a:extLst>
+          </p:cNvPr>
+          <p:cNvSpPr/>
+          <p:nvPr/>
+        </p:nvSpPr>
+        <p:spPr>
+          <a:xfrm rot="5400000">
+            <a:off x="9371269" y="5047032"/>
+            <a:ext cx="614372" cy="243711"/>
+          </a:xfrm>
+          <a:prstGeom prst="rect">
+            <a:avLst/>
+          </a:prstGeom>
+        </p:spPr>
+        <p:style>
+          <a:lnRef idx="2">
+            <a:schemeClr val="accent1">
+              <a:shade val="15000"/>
+            </a:schemeClr>
+          </a:lnRef>
+          <a:fillRef idx="1">
+            <a:schemeClr val="accent1"/>
+          </a:fillRef>
+          <a:effectRef idx="0">
+            <a:schemeClr val="accent1"/>
+          </a:effectRef>
+          <a:fontRef idx="minor">
+            <a:schemeClr val="lt1"/>
+          </a:fontRef>
+        </p:style>
+        <p:txBody>
+          <a:bodyPr rtlCol="0" anchor="ctr"/>
+          <a:lstStyle/>
+          <a:p>
+            <a:pPr algn="ctr"/>
+            <a:r>
+              <a:rPr lang="en-US" sz="1200" dirty="0"/>
+              <a:t>10K </a:t>
+            </a:r>
+            <a:r>
+              <a:rPr lang="el-GR" sz="1200" dirty="0"/>
+              <a:t>Ω</a:t>
+            </a:r>
+            <a:endParaRPr lang="en-US" sz="1200" dirty="0"/>
+          </a:p>
+        </p:txBody>
+      </p:sp>
+      <p:cxnSp>
+        <p:nvCxnSpPr>
+          <p:cNvPr id="11" name="Straight Connector 10">
+            <a:extLst>
+              <a:ext uri="{FF2B5EF4-FFF2-40B4-BE49-F238E27FC236}">
+                <a16:creationId xmlns:a16="http://schemas.microsoft.com/office/drawing/2014/main" id="{DEE70B4A-808B-B4F9-B9BC-A3FF8F3B3475}"/>
+              </a:ext>
+            </a:extLst>
+          </p:cNvPr>
+          <p:cNvCxnSpPr>
+            <a:cxnSpLocks/>
+            <a:stCxn id="8" idx="1"/>
+          </p:cNvCxnSpPr>
+          <p:nvPr/>
+        </p:nvCxnSpPr>
+        <p:spPr>
+          <a:xfrm flipV="1">
+            <a:off x="9678455" y="2721443"/>
+            <a:ext cx="1" cy="2140259"/>
+          </a:xfrm>
+          <a:prstGeom prst="line">
+            <a:avLst/>
+          </a:prstGeom>
+          <a:ln w="38100">
+            <a:solidFill>
+              <a:schemeClr val="accent2"/>
+            </a:solidFill>
+          </a:ln>
+        </p:spPr>
+        <p:style>
+          <a:lnRef idx="2">
+            <a:schemeClr val="accent1"/>
+          </a:lnRef>
+          <a:fillRef idx="0">
+            <a:schemeClr val="accent1"/>
+          </a:fillRef>
+          <a:effectRef idx="1">
+            <a:schemeClr val="accent1"/>
+          </a:effectRef>
+          <a:fontRef idx="minor">
+            <a:schemeClr val="tx1"/>
+          </a:fontRef>
+        </p:style>
+      </p:cxnSp>
+      <p:cxnSp>
+        <p:nvCxnSpPr>
+          <p:cNvPr id="18" name="Straight Connector 17">
+            <a:extLst>
+              <a:ext uri="{FF2B5EF4-FFF2-40B4-BE49-F238E27FC236}">
+                <a16:creationId xmlns:a16="http://schemas.microsoft.com/office/drawing/2014/main" id="{9975AAFA-058D-FC64-BDD5-1D908413B956}"/>
+              </a:ext>
+            </a:extLst>
+          </p:cNvPr>
+          <p:cNvCxnSpPr>
+            <a:cxnSpLocks/>
+          </p:cNvCxnSpPr>
+          <p:nvPr/>
+        </p:nvCxnSpPr>
+        <p:spPr>
+          <a:xfrm>
+            <a:off x="9678456" y="6253162"/>
+            <a:ext cx="0" cy="288759"/>
+          </a:xfrm>
+          <a:prstGeom prst="line">
+            <a:avLst/>
+          </a:prstGeom>
+          <a:ln w="38100">
+            <a:solidFill>
+              <a:srgbClr val="002060"/>
+            </a:solidFill>
+          </a:ln>
+        </p:spPr>
+        <p:style>
+          <a:lnRef idx="2">
+            <a:schemeClr val="accent1"/>
+          </a:lnRef>
+          <a:fillRef idx="0">
+            <a:schemeClr val="accent1"/>
+          </a:fillRef>
+          <a:effectRef idx="1">
+            <a:schemeClr val="accent1"/>
+          </a:effectRef>
+          <a:fontRef idx="minor">
+            <a:schemeClr val="tx1"/>
+          </a:fontRef>
+        </p:style>
+      </p:cxnSp>
+      <p:cxnSp>
+        <p:nvCxnSpPr>
+          <p:cNvPr id="25" name="Straight Connector 24">
+            <a:extLst>
+              <a:ext uri="{FF2B5EF4-FFF2-40B4-BE49-F238E27FC236}">
+                <a16:creationId xmlns:a16="http://schemas.microsoft.com/office/drawing/2014/main" id="{EB087BC7-DC7A-C3F4-2294-95FAA4A6EDE7}"/>
+              </a:ext>
+            </a:extLst>
+          </p:cNvPr>
+          <p:cNvCxnSpPr>
+            <a:cxnSpLocks/>
+            <a:stCxn id="8" idx="3"/>
+            <a:endCxn id="2" idx="1"/>
+          </p:cNvCxnSpPr>
+          <p:nvPr/>
+        </p:nvCxnSpPr>
+        <p:spPr>
+          <a:xfrm>
+            <a:off x="9678455" y="5476074"/>
+            <a:ext cx="0" cy="154608"/>
+          </a:xfrm>
+          <a:prstGeom prst="line">
+            <a:avLst/>
+          </a:prstGeom>
+          <a:ln w="38100">
+            <a:solidFill>
+              <a:srgbClr val="006020"/>
+            </a:solidFill>
+          </a:ln>
+        </p:spPr>
+        <p:style>
+          <a:lnRef idx="2">
+            <a:schemeClr val="accent1"/>
+          </a:lnRef>
+          <a:fillRef idx="0">
+            <a:schemeClr val="accent1"/>
+          </a:fillRef>
+          <a:effectRef idx="1">
+            <a:schemeClr val="accent1"/>
+          </a:effectRef>
+          <a:fontRef idx="minor">
+            <a:schemeClr val="tx1"/>
+          </a:fontRef>
+        </p:style>
+      </p:cxnSp>
+      <p:cxnSp>
+        <p:nvCxnSpPr>
+          <p:cNvPr id="30" name="Straight Connector 29">
+            <a:extLst>
+              <a:ext uri="{FF2B5EF4-FFF2-40B4-BE49-F238E27FC236}">
+                <a16:creationId xmlns:a16="http://schemas.microsoft.com/office/drawing/2014/main" id="{C919562C-33FF-D774-462C-87D1195DA899}"/>
+              </a:ext>
+            </a:extLst>
+          </p:cNvPr>
+          <p:cNvCxnSpPr>
+            <a:cxnSpLocks/>
+          </p:cNvCxnSpPr>
+          <p:nvPr/>
+        </p:nvCxnSpPr>
+        <p:spPr>
+          <a:xfrm>
+            <a:off x="8511429" y="5975009"/>
+            <a:ext cx="822467" cy="0"/>
+          </a:xfrm>
+          <a:prstGeom prst="line">
+            <a:avLst/>
+          </a:prstGeom>
+          <a:ln w="38100">
+            <a:solidFill>
+              <a:srgbClr val="006020"/>
+            </a:solidFill>
+          </a:ln>
+        </p:spPr>
+        <p:style>
+          <a:lnRef idx="2">
+            <a:schemeClr val="accent1"/>
+          </a:lnRef>
+          <a:fillRef idx="0">
+            <a:schemeClr val="accent1"/>
+          </a:fillRef>
+          <a:effectRef idx="1">
+            <a:schemeClr val="accent1"/>
+          </a:effectRef>
+          <a:fontRef idx="minor">
+            <a:schemeClr val="tx1"/>
+          </a:fontRef>
+        </p:style>
+      </p:cxnSp>
+      <p:cxnSp>
+        <p:nvCxnSpPr>
+          <p:cNvPr id="34" name="Straight Connector 33">
+            <a:extLst>
+              <a:ext uri="{FF2B5EF4-FFF2-40B4-BE49-F238E27FC236}">
+                <a16:creationId xmlns:a16="http://schemas.microsoft.com/office/drawing/2014/main" id="{F61F22E3-D9BE-FCE7-601A-CF32546A5855}"/>
+              </a:ext>
+            </a:extLst>
+          </p:cNvPr>
+          <p:cNvCxnSpPr>
+            <a:cxnSpLocks/>
+          </p:cNvCxnSpPr>
+          <p:nvPr/>
+        </p:nvCxnSpPr>
+        <p:spPr>
+          <a:xfrm>
+            <a:off x="9309486" y="5578336"/>
+            <a:ext cx="0" cy="396673"/>
+          </a:xfrm>
+          <a:prstGeom prst="line">
+            <a:avLst/>
+          </a:prstGeom>
+          <a:ln w="38100">
+            <a:solidFill>
+              <a:srgbClr val="006020"/>
+            </a:solidFill>
+          </a:ln>
+        </p:spPr>
+        <p:style>
+          <a:lnRef idx="2">
+            <a:schemeClr val="accent1"/>
+          </a:lnRef>
+          <a:fillRef idx="0">
+            <a:schemeClr val="accent1"/>
+          </a:fillRef>
+          <a:effectRef idx="1">
+            <a:schemeClr val="accent1"/>
+          </a:effectRef>
+          <a:fontRef idx="minor">
+            <a:schemeClr val="tx1"/>
+          </a:fontRef>
+        </p:style>
+      </p:cxnSp>
+      <p:cxnSp>
+        <p:nvCxnSpPr>
+          <p:cNvPr id="36" name="Straight Connector 35">
+            <a:extLst>
+              <a:ext uri="{FF2B5EF4-FFF2-40B4-BE49-F238E27FC236}">
+                <a16:creationId xmlns:a16="http://schemas.microsoft.com/office/drawing/2014/main" id="{F552D576-40A5-7D6C-3CC5-60BC92C6C746}"/>
+              </a:ext>
+            </a:extLst>
+          </p:cNvPr>
+          <p:cNvCxnSpPr>
+            <a:cxnSpLocks/>
+          </p:cNvCxnSpPr>
+          <p:nvPr/>
+        </p:nvCxnSpPr>
+        <p:spPr>
+          <a:xfrm>
+            <a:off x="9312441" y="5578336"/>
+            <a:ext cx="366015" cy="0"/>
+          </a:xfrm>
+          <a:prstGeom prst="line">
+            <a:avLst/>
+          </a:prstGeom>
+          <a:ln w="38100">
+            <a:solidFill>
+              <a:srgbClr val="006020"/>
+            </a:solidFill>
+          </a:ln>
+        </p:spPr>
+        <p:style>
+          <a:lnRef idx="2">
+            <a:schemeClr val="accent1"/>
+          </a:lnRef>
+          <a:fillRef idx="0">
+            <a:schemeClr val="accent1"/>
+          </a:fillRef>
+          <a:effectRef idx="1">
+            <a:schemeClr val="accent1"/>
+          </a:effectRef>
+          <a:fontRef idx="minor">
+            <a:schemeClr val="tx1"/>
+          </a:fontRef>
+        </p:style>
+      </p:cxnSp>
+      <p:cxnSp>
+        <p:nvCxnSpPr>
+          <p:cNvPr id="40" name="Straight Connector 39">
+            <a:extLst>
+              <a:ext uri="{FF2B5EF4-FFF2-40B4-BE49-F238E27FC236}">
+                <a16:creationId xmlns:a16="http://schemas.microsoft.com/office/drawing/2014/main" id="{CE6ABE09-360B-8954-F9A2-25BF55A09EF4}"/>
+              </a:ext>
+            </a:extLst>
+          </p:cNvPr>
+          <p:cNvCxnSpPr>
+            <a:cxnSpLocks/>
+          </p:cNvCxnSpPr>
+          <p:nvPr/>
+        </p:nvCxnSpPr>
+        <p:spPr>
+          <a:xfrm>
+            <a:off x="10015340" y="2549656"/>
+            <a:ext cx="0" cy="3982536"/>
+          </a:xfrm>
+          <a:prstGeom prst="line">
+            <a:avLst/>
+          </a:prstGeom>
+          <a:ln w="38100">
+            <a:solidFill>
+              <a:schemeClr val="accent3">
+                <a:lumMod val="60000"/>
+                <a:lumOff val="40000"/>
+              </a:schemeClr>
+            </a:solidFill>
+          </a:ln>
+        </p:spPr>
+        <p:style>
+          <a:lnRef idx="2">
+            <a:schemeClr val="accent1"/>
+          </a:lnRef>
+          <a:fillRef idx="0">
+            <a:schemeClr val="accent1"/>
+          </a:fillRef>
+          <a:effectRef idx="1">
+            <a:schemeClr val="accent1"/>
+          </a:effectRef>
+          <a:fontRef idx="minor">
+            <a:schemeClr val="tx1"/>
+          </a:fontRef>
+        </p:style>
+      </p:cxnSp>
+      <p:cxnSp>
+        <p:nvCxnSpPr>
+          <p:cNvPr id="42" name="Straight Connector 41">
+            <a:extLst>
+              <a:ext uri="{FF2B5EF4-FFF2-40B4-BE49-F238E27FC236}">
+                <a16:creationId xmlns:a16="http://schemas.microsoft.com/office/drawing/2014/main" id="{965F51CC-6CF3-6ACD-F166-AB8E9B501B2D}"/>
+              </a:ext>
+            </a:extLst>
+          </p:cNvPr>
+          <p:cNvCxnSpPr>
+            <a:cxnSpLocks/>
+          </p:cNvCxnSpPr>
+          <p:nvPr/>
+        </p:nvCxnSpPr>
+        <p:spPr>
+          <a:xfrm flipH="1">
+            <a:off x="11171763" y="7769970"/>
+            <a:ext cx="155448" cy="0"/>
+          </a:xfrm>
+          <a:prstGeom prst="line">
+            <a:avLst/>
+          </a:prstGeom>
+          <a:ln w="38100">
+            <a:solidFill>
+              <a:srgbClr val="006020"/>
+            </a:solidFill>
+          </a:ln>
+        </p:spPr>
+        <p:style>
+          <a:lnRef idx="2">
+            <a:schemeClr val="accent1"/>
+          </a:lnRef>
+          <a:fillRef idx="0">
+            <a:schemeClr val="accent1"/>
+          </a:fillRef>
+          <a:effectRef idx="1">
+            <a:schemeClr val="accent1"/>
+          </a:effectRef>
+          <a:fontRef idx="minor">
+            <a:schemeClr val="tx1"/>
+          </a:fontRef>
+        </p:style>
+      </p:cxnSp>
+      <p:sp>
+        <p:nvSpPr>
+          <p:cNvPr id="43" name="TextBox 42">
+            <a:extLst>
+              <a:ext uri="{FF2B5EF4-FFF2-40B4-BE49-F238E27FC236}">
+                <a16:creationId xmlns:a16="http://schemas.microsoft.com/office/drawing/2014/main" id="{20273975-4220-4DB0-176A-B3AF04923C41}"/>
+              </a:ext>
+            </a:extLst>
+          </p:cNvPr>
+          <p:cNvSpPr txBox="1"/>
+          <p:nvPr/>
+        </p:nvSpPr>
+        <p:spPr>
+          <a:xfrm>
+            <a:off x="11284537" y="7613004"/>
+            <a:ext cx="902105" cy="313932"/>
+          </a:xfrm>
+          <a:prstGeom prst="rect">
+            <a:avLst/>
+          </a:prstGeom>
+          <a:noFill/>
+        </p:spPr>
+        <p:txBody>
+          <a:bodyPr wrap="square" rtlCol="0">
+            <a:spAutoFit/>
+          </a:bodyPr>
+          <a:lstStyle/>
+          <a:p>
+            <a:r>
+              <a:rPr lang="en-GB" sz="1440" dirty="0"/>
+              <a:t>Battery V</a:t>
             </a:r>
             <a:endParaRPr lang="en-US" sz="1440" dirty="0"/>
           </a:p>

</xml_diff>

<commit_message>
fix: correct encoder pin assignments in gpio.h
</commit_message>
<xml_diff>
--- a/assets/Diagram.pptx
+++ b/assets/Diagram.pptx
@@ -208,7 +208,7 @@
           <a:p>
             <a:fld id="{5F4790EC-F85E-4BC9-9E2D-31011507022E}" type="datetimeFigureOut">
               <a:rPr lang="en-US" smtClean="0"/>
-              <a:t>8/31/2025</a:t>
+              <a:t>11/16/2025</a:t>
             </a:fld>
             <a:endParaRPr lang="en-US"/>
           </a:p>
@@ -690,7 +690,7 @@
           <a:p>
             <a:fld id="{7F5102BF-3E1C-4FEC-B8AE-4CD23D8F5F17}" type="datetimeFigureOut">
               <a:rPr lang="en-US" smtClean="0"/>
-              <a:t>8/31/2025</a:t>
+              <a:t>11/16/2025</a:t>
             </a:fld>
             <a:endParaRPr lang="en-US"/>
           </a:p>
@@ -860,7 +860,7 @@
           <a:p>
             <a:fld id="{7F5102BF-3E1C-4FEC-B8AE-4CD23D8F5F17}" type="datetimeFigureOut">
               <a:rPr lang="en-US" smtClean="0"/>
-              <a:t>8/31/2025</a:t>
+              <a:t>11/16/2025</a:t>
             </a:fld>
             <a:endParaRPr lang="en-US"/>
           </a:p>
@@ -1040,7 +1040,7 @@
           <a:p>
             <a:fld id="{7F5102BF-3E1C-4FEC-B8AE-4CD23D8F5F17}" type="datetimeFigureOut">
               <a:rPr lang="en-US" smtClean="0"/>
-              <a:t>8/31/2025</a:t>
+              <a:t>11/16/2025</a:t>
             </a:fld>
             <a:endParaRPr lang="en-US"/>
           </a:p>
@@ -1210,7 +1210,7 @@
           <a:p>
             <a:fld id="{7F5102BF-3E1C-4FEC-B8AE-4CD23D8F5F17}" type="datetimeFigureOut">
               <a:rPr lang="en-US" smtClean="0"/>
-              <a:t>8/31/2025</a:t>
+              <a:t>11/16/2025</a:t>
             </a:fld>
             <a:endParaRPr lang="en-US"/>
           </a:p>
@@ -1456,7 +1456,7 @@
           <a:p>
             <a:fld id="{7F5102BF-3E1C-4FEC-B8AE-4CD23D8F5F17}" type="datetimeFigureOut">
               <a:rPr lang="en-US" smtClean="0"/>
-              <a:t>8/31/2025</a:t>
+              <a:t>11/16/2025</a:t>
             </a:fld>
             <a:endParaRPr lang="en-US"/>
           </a:p>
@@ -1688,7 +1688,7 @@
           <a:p>
             <a:fld id="{7F5102BF-3E1C-4FEC-B8AE-4CD23D8F5F17}" type="datetimeFigureOut">
               <a:rPr lang="en-US" smtClean="0"/>
-              <a:t>8/31/2025</a:t>
+              <a:t>11/16/2025</a:t>
             </a:fld>
             <a:endParaRPr lang="en-US"/>
           </a:p>
@@ -2055,7 +2055,7 @@
           <a:p>
             <a:fld id="{7F5102BF-3E1C-4FEC-B8AE-4CD23D8F5F17}" type="datetimeFigureOut">
               <a:rPr lang="en-US" smtClean="0"/>
-              <a:t>8/31/2025</a:t>
+              <a:t>11/16/2025</a:t>
             </a:fld>
             <a:endParaRPr lang="en-US"/>
           </a:p>
@@ -2173,7 +2173,7 @@
           <a:p>
             <a:fld id="{7F5102BF-3E1C-4FEC-B8AE-4CD23D8F5F17}" type="datetimeFigureOut">
               <a:rPr lang="en-US" smtClean="0"/>
-              <a:t>8/31/2025</a:t>
+              <a:t>11/16/2025</a:t>
             </a:fld>
             <a:endParaRPr lang="en-US"/>
           </a:p>
@@ -2268,7 +2268,7 @@
           <a:p>
             <a:fld id="{7F5102BF-3E1C-4FEC-B8AE-4CD23D8F5F17}" type="datetimeFigureOut">
               <a:rPr lang="en-US" smtClean="0"/>
-              <a:t>8/31/2025</a:t>
+              <a:t>11/16/2025</a:t>
             </a:fld>
             <a:endParaRPr lang="en-US"/>
           </a:p>
@@ -2545,7 +2545,7 @@
           <a:p>
             <a:fld id="{7F5102BF-3E1C-4FEC-B8AE-4CD23D8F5F17}" type="datetimeFigureOut">
               <a:rPr lang="en-US" smtClean="0"/>
-              <a:t>8/31/2025</a:t>
+              <a:t>11/16/2025</a:t>
             </a:fld>
             <a:endParaRPr lang="en-US"/>
           </a:p>
@@ -2802,7 +2802,7 @@
           <a:p>
             <a:fld id="{7F5102BF-3E1C-4FEC-B8AE-4CD23D8F5F17}" type="datetimeFigureOut">
               <a:rPr lang="en-US" smtClean="0"/>
-              <a:t>8/31/2025</a:t>
+              <a:t>11/16/2025</a:t>
             </a:fld>
             <a:endParaRPr lang="en-US"/>
           </a:p>
@@ -3015,7 +3015,7 @@
           <a:p>
             <a:fld id="{7F5102BF-3E1C-4FEC-B8AE-4CD23D8F5F17}" type="datetimeFigureOut">
               <a:rPr lang="en-US" smtClean="0"/>
-              <a:t>8/31/2025</a:t>
+              <a:t>11/16/2025</a:t>
             </a:fld>
             <a:endParaRPr lang="en-US"/>
           </a:p>
@@ -3480,49 +3480,6 @@
       </p:pic>
       <p:cxnSp>
         <p:nvCxnSpPr>
-          <p:cNvPr id="13" name="Straight Connector 12">
-            <a:extLst>
-              <a:ext uri="{FF2B5EF4-FFF2-40B4-BE49-F238E27FC236}">
-                <a16:creationId xmlns:a16="http://schemas.microsoft.com/office/drawing/2014/main" id="{6F2C2124-4E0D-453C-5725-174151235711}"/>
-              </a:ext>
-            </a:extLst>
-          </p:cNvPr>
-          <p:cNvCxnSpPr>
-            <a:cxnSpLocks/>
-          </p:cNvCxnSpPr>
-          <p:nvPr/>
-        </p:nvCxnSpPr>
-        <p:spPr>
-          <a:xfrm flipH="1">
-            <a:off x="7329489" y="4608496"/>
-            <a:ext cx="1104900" cy="0"/>
-          </a:xfrm>
-          <a:prstGeom prst="line">
-            <a:avLst/>
-          </a:prstGeom>
-          <a:ln w="38100">
-            <a:solidFill>
-              <a:srgbClr val="002060"/>
-            </a:solidFill>
-          </a:ln>
-        </p:spPr>
-        <p:style>
-          <a:lnRef idx="2">
-            <a:schemeClr val="accent1"/>
-          </a:lnRef>
-          <a:fillRef idx="0">
-            <a:schemeClr val="accent1"/>
-          </a:fillRef>
-          <a:effectRef idx="1">
-            <a:schemeClr val="accent1"/>
-          </a:effectRef>
-          <a:fontRef idx="minor">
-            <a:schemeClr val="tx1"/>
-          </a:fontRef>
-        </p:style>
-      </p:cxnSp>
-      <p:cxnSp>
-        <p:nvCxnSpPr>
           <p:cNvPr id="6" name="Straight Connector 5">
             <a:extLst>
               <a:ext uri="{FF2B5EF4-FFF2-40B4-BE49-F238E27FC236}">
@@ -3538,7 +3495,7 @@
         <p:spPr>
           <a:xfrm flipH="1">
             <a:off x="7036231" y="4439263"/>
-            <a:ext cx="508300" cy="0"/>
+            <a:ext cx="1402573" cy="0"/>
           </a:xfrm>
           <a:prstGeom prst="line">
             <a:avLst/>
@@ -3818,7 +3775,7 @@
         <p:spPr>
           <a:xfrm>
             <a:off x="7036231" y="3747244"/>
-            <a:ext cx="0" cy="2794679"/>
+            <a:ext cx="0" cy="2077900"/>
           </a:xfrm>
           <a:prstGeom prst="line">
             <a:avLst/>
@@ -3945,9 +3902,9 @@
           <p:nvPr/>
         </p:nvCxnSpPr>
         <p:spPr>
-          <a:xfrm flipH="1">
-            <a:off x="7251469" y="3590925"/>
-            <a:ext cx="3836" cy="2816472"/>
+          <a:xfrm>
+            <a:off x="7255305" y="3590925"/>
+            <a:ext cx="0" cy="2384084"/>
           </a:xfrm>
           <a:prstGeom prst="line">
             <a:avLst/>
@@ -5525,72 +5482,6 @@
           </a:p>
         </p:txBody>
       </p:sp>
-      <p:pic>
-        <p:nvPicPr>
-          <p:cNvPr id="4" name="Picture 3">
-            <a:extLst>
-              <a:ext uri="{FF2B5EF4-FFF2-40B4-BE49-F238E27FC236}">
-                <a16:creationId xmlns:a16="http://schemas.microsoft.com/office/drawing/2014/main" id="{50A1A1C5-5EC5-6E39-4AC6-51176639A8C8}"/>
-              </a:ext>
-            </a:extLst>
-          </p:cNvPr>
-          <p:cNvPicPr>
-            <a:picLocks noChangeAspect="1"/>
-          </p:cNvPicPr>
-          <p:nvPr/>
-        </p:nvPicPr>
-        <p:blipFill>
-          <a:blip r:embed="rId10">
-            <a:extLst>
-              <a:ext uri="{BEBA8EAE-BF5A-486C-A8C5-ECC9F3942E4B}">
-                <a14:imgProps xmlns:a14="http://schemas.microsoft.com/office/drawing/2010/main">
-                  <a14:imgLayer r:embed="rId11">
-                    <a14:imgEffect>
-                      <a14:backgroundRemoval t="9772" b="99349" l="9827" r="92678">
-                        <a14:foregroundMark x1="48362" y1="26384" x2="48362" y2="26384"/>
-                        <a14:foregroundMark x1="56647" y1="21498" x2="46435" y2="24430"/>
-                        <a14:foregroundMark x1="46435" y1="24430" x2="35453" y2="36482"/>
-                        <a14:foregroundMark x1="35453" y1="36482" x2="36802" y2="41042"/>
-                        <a14:foregroundMark x1="37958" y1="43648" x2="39306" y2="45928"/>
-                        <a14:foregroundMark x1="25241" y1="10098" x2="77649" y2="16938"/>
-                        <a14:foregroundMark x1="77649" y1="16938" x2="81503" y2="34202"/>
-                        <a14:foregroundMark x1="81503" y1="34202" x2="79383" y2="78502"/>
-                        <a14:foregroundMark x1="79383" y1="78502" x2="36802" y2="78502"/>
-                        <a14:foregroundMark x1="36802" y1="78502" x2="25241" y2="72964"/>
-                        <a14:foregroundMark x1="25241" y1="72964" x2="22929" y2="56352"/>
-                        <a14:foregroundMark x1="22929" y1="56352" x2="25241" y2="11726"/>
-                        <a14:foregroundMark x1="31792" y1="16612" x2="32948" y2="37134"/>
-                        <a14:foregroundMark x1="32948" y1="37134" x2="40462" y2="45928"/>
-                        <a14:foregroundMark x1="57033" y1="29316" x2="52408" y2="47883"/>
-                        <a14:foregroundMark x1="52408" y1="47883" x2="41426" y2="64821"/>
-                        <a14:foregroundMark x1="41426" y1="64821" x2="41233" y2="64821"/>
-                        <a14:foregroundMark x1="50674" y1="30619" x2="50096" y2="38111"/>
-                        <a14:foregroundMark x1="51060" y1="52769" x2="42967" y2="64169"/>
-                        <a14:foregroundMark x1="47977" y1="62866" x2="60694" y2="63192"/>
-                        <a14:foregroundMark x1="67245" y1="82085" x2="66474" y2="99674"/>
-                        <a14:foregroundMark x1="91522" y1="42345" x2="88439" y2="41368"/>
-                        <a14:foregroundMark x1="92100" y1="57655" x2="89403" y2="57003"/>
-                        <a14:foregroundMark x1="92678" y1="42020" x2="90366" y2="42020"/>
-                      </a14:backgroundRemoval>
-                    </a14:imgEffect>
-                  </a14:imgLayer>
-                </a14:imgProps>
-              </a:ext>
-            </a:extLst>
-          </a:blip>
-          <a:srcRect l="10130" t="7009" r="6710" b="12227"/>
-          <a:stretch/>
-        </p:blipFill>
-        <p:spPr>
-          <a:xfrm rot="10800000">
-            <a:off x="10880933" y="4310550"/>
-            <a:ext cx="1239124" cy="711845"/>
-          </a:xfrm>
-          <a:prstGeom prst="rect">
-            <a:avLst/>
-          </a:prstGeom>
-        </p:spPr>
-      </p:pic>
       <p:cxnSp>
         <p:nvCxnSpPr>
           <p:cNvPr id="5" name="Straight Connector 4">
@@ -5680,307 +5571,6 @@
           </a:fontRef>
         </p:style>
       </p:cxnSp>
-      <p:cxnSp>
-        <p:nvCxnSpPr>
-          <p:cNvPr id="9" name="Straight Connector 8">
-            <a:extLst>
-              <a:ext uri="{FF2B5EF4-FFF2-40B4-BE49-F238E27FC236}">
-                <a16:creationId xmlns:a16="http://schemas.microsoft.com/office/drawing/2014/main" id="{6D1057F5-A32D-21FE-436C-8DE757948A75}"/>
-              </a:ext>
-            </a:extLst>
-          </p:cNvPr>
-          <p:cNvCxnSpPr>
-            <a:cxnSpLocks/>
-          </p:cNvCxnSpPr>
-          <p:nvPr/>
-        </p:nvCxnSpPr>
-        <p:spPr>
-          <a:xfrm flipH="1">
-            <a:off x="10737404" y="4231758"/>
-            <a:ext cx="532818" cy="0"/>
-          </a:xfrm>
-          <a:prstGeom prst="line">
-            <a:avLst/>
-          </a:prstGeom>
-          <a:ln w="38100">
-            <a:solidFill>
-              <a:srgbClr val="FFFF00"/>
-            </a:solidFill>
-          </a:ln>
-        </p:spPr>
-        <p:style>
-          <a:lnRef idx="2">
-            <a:schemeClr val="accent1"/>
-          </a:lnRef>
-          <a:fillRef idx="0">
-            <a:schemeClr val="accent1"/>
-          </a:fillRef>
-          <a:effectRef idx="1">
-            <a:schemeClr val="accent1"/>
-          </a:effectRef>
-          <a:fontRef idx="minor">
-            <a:schemeClr val="tx1"/>
-          </a:fontRef>
-        </p:style>
-      </p:cxnSp>
-      <p:cxnSp>
-        <p:nvCxnSpPr>
-          <p:cNvPr id="10" name="Straight Connector 9">
-            <a:extLst>
-              <a:ext uri="{FF2B5EF4-FFF2-40B4-BE49-F238E27FC236}">
-                <a16:creationId xmlns:a16="http://schemas.microsoft.com/office/drawing/2014/main" id="{5CC36B6A-E8A8-07F2-DC24-6C8B6AFB2B9E}"/>
-              </a:ext>
-            </a:extLst>
-          </p:cNvPr>
-          <p:cNvCxnSpPr>
-            <a:cxnSpLocks/>
-          </p:cNvCxnSpPr>
-          <p:nvPr/>
-        </p:nvCxnSpPr>
-        <p:spPr>
-          <a:xfrm>
-            <a:off x="10737404" y="4213730"/>
-            <a:ext cx="0" cy="2183465"/>
-          </a:xfrm>
-          <a:prstGeom prst="line">
-            <a:avLst/>
-          </a:prstGeom>
-          <a:ln w="38100">
-            <a:solidFill>
-              <a:srgbClr val="FFFF00"/>
-            </a:solidFill>
-          </a:ln>
-        </p:spPr>
-        <p:style>
-          <a:lnRef idx="2">
-            <a:schemeClr val="accent1"/>
-          </a:lnRef>
-          <a:fillRef idx="0">
-            <a:schemeClr val="accent1"/>
-          </a:fillRef>
-          <a:effectRef idx="1">
-            <a:schemeClr val="accent1"/>
-          </a:effectRef>
-          <a:fontRef idx="minor">
-            <a:schemeClr val="tx1"/>
-          </a:fontRef>
-        </p:style>
-      </p:cxnSp>
-      <p:cxnSp>
-        <p:nvCxnSpPr>
-          <p:cNvPr id="15" name="Straight Connector 14">
-            <a:extLst>
-              <a:ext uri="{FF2B5EF4-FFF2-40B4-BE49-F238E27FC236}">
-                <a16:creationId xmlns:a16="http://schemas.microsoft.com/office/drawing/2014/main" id="{C3E29539-09AB-E36B-EDEF-0CAE552FFD70}"/>
-              </a:ext>
-            </a:extLst>
-          </p:cNvPr>
-          <p:cNvCxnSpPr>
-            <a:cxnSpLocks/>
-          </p:cNvCxnSpPr>
-          <p:nvPr/>
-        </p:nvCxnSpPr>
-        <p:spPr>
-          <a:xfrm>
-            <a:off x="11270222" y="4215875"/>
-            <a:ext cx="0" cy="149223"/>
-          </a:xfrm>
-          <a:prstGeom prst="line">
-            <a:avLst/>
-          </a:prstGeom>
-          <a:ln w="38100">
-            <a:solidFill>
-              <a:srgbClr val="FFFF00"/>
-            </a:solidFill>
-          </a:ln>
-        </p:spPr>
-        <p:style>
-          <a:lnRef idx="2">
-            <a:schemeClr val="accent1"/>
-          </a:lnRef>
-          <a:fillRef idx="0">
-            <a:schemeClr val="accent1"/>
-          </a:fillRef>
-          <a:effectRef idx="1">
-            <a:schemeClr val="accent1"/>
-          </a:effectRef>
-          <a:fontRef idx="minor">
-            <a:schemeClr val="tx1"/>
-          </a:fontRef>
-        </p:style>
-      </p:cxnSp>
-      <p:cxnSp>
-        <p:nvCxnSpPr>
-          <p:cNvPr id="21" name="Straight Connector 20">
-            <a:extLst>
-              <a:ext uri="{FF2B5EF4-FFF2-40B4-BE49-F238E27FC236}">
-                <a16:creationId xmlns:a16="http://schemas.microsoft.com/office/drawing/2014/main" id="{4DCF0BD1-8FDA-4E41-C75F-D3AF291653B3}"/>
-              </a:ext>
-            </a:extLst>
-          </p:cNvPr>
-          <p:cNvCxnSpPr>
-            <a:cxnSpLocks/>
-          </p:cNvCxnSpPr>
-          <p:nvPr/>
-        </p:nvCxnSpPr>
-        <p:spPr>
-          <a:xfrm flipH="1">
-            <a:off x="2978073" y="6388622"/>
-            <a:ext cx="7759331" cy="0"/>
-          </a:xfrm>
-          <a:prstGeom prst="line">
-            <a:avLst/>
-          </a:prstGeom>
-          <a:ln w="38100">
-            <a:solidFill>
-              <a:srgbClr val="FFFF00"/>
-            </a:solidFill>
-          </a:ln>
-        </p:spPr>
-        <p:style>
-          <a:lnRef idx="2">
-            <a:schemeClr val="accent1"/>
-          </a:lnRef>
-          <a:fillRef idx="0">
-            <a:schemeClr val="accent1"/>
-          </a:fillRef>
-          <a:effectRef idx="1">
-            <a:schemeClr val="accent1"/>
-          </a:effectRef>
-          <a:fontRef idx="minor">
-            <a:schemeClr val="tx1"/>
-          </a:fontRef>
-        </p:style>
-      </p:cxnSp>
-      <p:cxnSp>
-        <p:nvCxnSpPr>
-          <p:cNvPr id="28" name="Straight Connector 27">
-            <a:extLst>
-              <a:ext uri="{FF2B5EF4-FFF2-40B4-BE49-F238E27FC236}">
-                <a16:creationId xmlns:a16="http://schemas.microsoft.com/office/drawing/2014/main" id="{ED7ABC7B-AA56-990B-A22E-F804760E02C9}"/>
-              </a:ext>
-            </a:extLst>
-          </p:cNvPr>
-          <p:cNvCxnSpPr>
-            <a:cxnSpLocks/>
-          </p:cNvCxnSpPr>
-          <p:nvPr/>
-        </p:nvCxnSpPr>
-        <p:spPr>
-          <a:xfrm>
-            <a:off x="10533399" y="4294770"/>
-            <a:ext cx="0" cy="2247151"/>
-          </a:xfrm>
-          <a:prstGeom prst="line">
-            <a:avLst/>
-          </a:prstGeom>
-          <a:ln w="38100">
-            <a:solidFill>
-              <a:srgbClr val="002060"/>
-            </a:solidFill>
-          </a:ln>
-        </p:spPr>
-        <p:style>
-          <a:lnRef idx="2">
-            <a:schemeClr val="accent1"/>
-          </a:lnRef>
-          <a:fillRef idx="0">
-            <a:schemeClr val="accent1"/>
-          </a:fillRef>
-          <a:effectRef idx="1">
-            <a:schemeClr val="accent1"/>
-          </a:effectRef>
-          <a:fontRef idx="minor">
-            <a:schemeClr val="tx1"/>
-          </a:fontRef>
-        </p:style>
-      </p:cxnSp>
-      <p:cxnSp>
-        <p:nvCxnSpPr>
-          <p:cNvPr id="29" name="Straight Connector 28">
-            <a:extLst>
-              <a:ext uri="{FF2B5EF4-FFF2-40B4-BE49-F238E27FC236}">
-                <a16:creationId xmlns:a16="http://schemas.microsoft.com/office/drawing/2014/main" id="{AE43BEC1-FE1B-9206-9F9A-3A16D1329CB7}"/>
-              </a:ext>
-            </a:extLst>
-          </p:cNvPr>
-          <p:cNvCxnSpPr>
-            <a:cxnSpLocks/>
-          </p:cNvCxnSpPr>
-          <p:nvPr/>
-        </p:nvCxnSpPr>
-        <p:spPr>
-          <a:xfrm flipH="1">
-            <a:off x="10533401" y="4294770"/>
-            <a:ext cx="641177" cy="0"/>
-          </a:xfrm>
-          <a:prstGeom prst="line">
-            <a:avLst/>
-          </a:prstGeom>
-          <a:ln w="38100">
-            <a:solidFill>
-              <a:srgbClr val="002060"/>
-            </a:solidFill>
-          </a:ln>
-        </p:spPr>
-        <p:style>
-          <a:lnRef idx="2">
-            <a:schemeClr val="accent1"/>
-          </a:lnRef>
-          <a:fillRef idx="0">
-            <a:schemeClr val="accent1"/>
-          </a:fillRef>
-          <a:effectRef idx="1">
-            <a:schemeClr val="accent1"/>
-          </a:effectRef>
-          <a:fontRef idx="minor">
-            <a:schemeClr val="tx1"/>
-          </a:fontRef>
-        </p:style>
-      </p:cxnSp>
-      <p:cxnSp>
-        <p:nvCxnSpPr>
-          <p:cNvPr id="32" name="Straight Connector 31">
-            <a:extLst>
-              <a:ext uri="{FF2B5EF4-FFF2-40B4-BE49-F238E27FC236}">
-                <a16:creationId xmlns:a16="http://schemas.microsoft.com/office/drawing/2014/main" id="{7CCAB92B-AB74-3282-4B02-C4F4976F111E}"/>
-              </a:ext>
-            </a:extLst>
-          </p:cNvPr>
-          <p:cNvCxnSpPr>
-            <a:cxnSpLocks/>
-          </p:cNvCxnSpPr>
-          <p:nvPr/>
-        </p:nvCxnSpPr>
-        <p:spPr>
-          <a:xfrm flipH="1">
-            <a:off x="2635250" y="6532192"/>
-            <a:ext cx="7898149" cy="0"/>
-          </a:xfrm>
-          <a:prstGeom prst="line">
-            <a:avLst/>
-          </a:prstGeom>
-          <a:ln w="38100">
-            <a:solidFill>
-              <a:srgbClr val="002060"/>
-            </a:solidFill>
-          </a:ln>
-        </p:spPr>
-        <p:style>
-          <a:lnRef idx="2">
-            <a:schemeClr val="accent1"/>
-          </a:lnRef>
-          <a:fillRef idx="0">
-            <a:schemeClr val="accent1"/>
-          </a:fillRef>
-          <a:effectRef idx="1">
-            <a:schemeClr val="accent1"/>
-          </a:effectRef>
-          <a:fontRef idx="minor">
-            <a:schemeClr val="tx1"/>
-          </a:fontRef>
-        </p:style>
-      </p:cxnSp>
       <p:pic>
         <p:nvPicPr>
           <p:cNvPr id="57" name="Picture 2" descr="NVIDIA Jetson Xavier NX Developer Kit (812674024318), 16 GB">
@@ -5996,11 +5586,11 @@
           <p:nvPr/>
         </p:nvPicPr>
         <p:blipFill>
-          <a:blip r:embed="rId12">
+          <a:blip r:embed="rId10">
             <a:extLst>
               <a:ext uri="{BEBA8EAE-BF5A-486C-A8C5-ECC9F3942E4B}">
                 <a14:imgProps xmlns:a14="http://schemas.microsoft.com/office/drawing/2010/main">
-                  <a14:imgLayer r:embed="rId13">
+                  <a14:imgLayer r:embed="rId11">
                     <a14:imgEffect>
                       <a14:backgroundRemoval t="1217" b="95499" l="1230" r="96421">
                         <a14:foregroundMark x1="83893" y1="85280" x2="36465" y2="84428"/>
@@ -6535,92 +6125,6 @@
       </p:sp>
       <p:cxnSp>
         <p:nvCxnSpPr>
-          <p:cNvPr id="20" name="Straight Connector 19">
-            <a:extLst>
-              <a:ext uri="{FF2B5EF4-FFF2-40B4-BE49-F238E27FC236}">
-                <a16:creationId xmlns:a16="http://schemas.microsoft.com/office/drawing/2014/main" id="{C8E3903D-1604-D498-06E6-8616DECEDF20}"/>
-              </a:ext>
-            </a:extLst>
-          </p:cNvPr>
-          <p:cNvCxnSpPr>
-            <a:cxnSpLocks/>
-          </p:cNvCxnSpPr>
-          <p:nvPr/>
-        </p:nvCxnSpPr>
-        <p:spPr>
-          <a:xfrm>
-            <a:off x="8414084" y="4439263"/>
-            <a:ext cx="0" cy="158207"/>
-          </a:xfrm>
-          <a:prstGeom prst="line">
-            <a:avLst/>
-          </a:prstGeom>
-          <a:ln w="38100">
-            <a:solidFill>
-              <a:srgbClr val="002060"/>
-            </a:solidFill>
-          </a:ln>
-        </p:spPr>
-        <p:style>
-          <a:lnRef idx="2">
-            <a:schemeClr val="accent1"/>
-          </a:lnRef>
-          <a:fillRef idx="0">
-            <a:schemeClr val="accent1"/>
-          </a:fillRef>
-          <a:effectRef idx="1">
-            <a:schemeClr val="accent1"/>
-          </a:effectRef>
-          <a:fontRef idx="minor">
-            <a:schemeClr val="tx1"/>
-          </a:fontRef>
-        </p:style>
-      </p:cxnSp>
-      <p:cxnSp>
-        <p:nvCxnSpPr>
-          <p:cNvPr id="35" name="Straight Connector 34">
-            <a:extLst>
-              <a:ext uri="{FF2B5EF4-FFF2-40B4-BE49-F238E27FC236}">
-                <a16:creationId xmlns:a16="http://schemas.microsoft.com/office/drawing/2014/main" id="{EA35C7FD-A3BD-31AF-4711-E4BF5D9989DF}"/>
-              </a:ext>
-            </a:extLst>
-          </p:cNvPr>
-          <p:cNvCxnSpPr>
-            <a:cxnSpLocks/>
-          </p:cNvCxnSpPr>
-          <p:nvPr/>
-        </p:nvCxnSpPr>
-        <p:spPr>
-          <a:xfrm>
-            <a:off x="7347283" y="4439263"/>
-            <a:ext cx="0" cy="158207"/>
-          </a:xfrm>
-          <a:prstGeom prst="line">
-            <a:avLst/>
-          </a:prstGeom>
-          <a:ln w="38100">
-            <a:solidFill>
-              <a:srgbClr val="002060"/>
-            </a:solidFill>
-          </a:ln>
-        </p:spPr>
-        <p:style>
-          <a:lnRef idx="2">
-            <a:schemeClr val="accent1"/>
-          </a:lnRef>
-          <a:fillRef idx="0">
-            <a:schemeClr val="accent1"/>
-          </a:fillRef>
-          <a:effectRef idx="1">
-            <a:schemeClr val="accent1"/>
-          </a:effectRef>
-          <a:fontRef idx="minor">
-            <a:schemeClr val="tx1"/>
-          </a:fontRef>
-        </p:style>
-      </p:cxnSp>
-      <p:cxnSp>
-        <p:nvCxnSpPr>
           <p:cNvPr id="55" name="Straight Connector 54">
             <a:extLst>
               <a:ext uri="{FF2B5EF4-FFF2-40B4-BE49-F238E27FC236}">
@@ -6943,8 +6447,8 @@
         </p:nvCxnSpPr>
         <p:spPr>
           <a:xfrm flipV="1">
-            <a:off x="8696326" y="3451286"/>
-            <a:ext cx="0" cy="1773177"/>
+            <a:off x="8696326" y="3454461"/>
+            <a:ext cx="0" cy="1603314"/>
           </a:xfrm>
           <a:prstGeom prst="line">
             <a:avLst/>
@@ -6990,7 +6494,7 @@
         </p:nvCxnSpPr>
         <p:spPr>
           <a:xfrm flipH="1">
-            <a:off x="8464235" y="5211717"/>
+            <a:off x="8438804" y="5046617"/>
             <a:ext cx="236853" cy="0"/>
           </a:xfrm>
           <a:prstGeom prst="line">
@@ -7083,7 +6587,7 @@
         <p:spPr>
           <a:xfrm flipV="1">
             <a:off x="8788005" y="3590925"/>
-            <a:ext cx="0" cy="1781175"/>
+            <a:ext cx="0" cy="1628775"/>
           </a:xfrm>
           <a:prstGeom prst="line">
             <a:avLst/>
@@ -7127,7 +6631,7 @@
         </p:nvCxnSpPr>
         <p:spPr>
           <a:xfrm flipH="1">
-            <a:off x="8464231" y="5366075"/>
+            <a:off x="8464231" y="5210500"/>
             <a:ext cx="327344" cy="0"/>
           </a:xfrm>
           <a:prstGeom prst="line">
@@ -7218,7 +6722,7 @@
         <p:spPr>
           <a:xfrm flipV="1">
             <a:off x="8879684" y="3731431"/>
-            <a:ext cx="0" cy="1802594"/>
+            <a:ext cx="0" cy="1659719"/>
           </a:xfrm>
           <a:prstGeom prst="line">
             <a:avLst/>
@@ -7262,7 +6766,7 @@
         </p:nvCxnSpPr>
         <p:spPr>
           <a:xfrm flipH="1">
-            <a:off x="8453438" y="5520434"/>
+            <a:off x="8453438" y="5368034"/>
             <a:ext cx="435769" cy="0"/>
           </a:xfrm>
           <a:prstGeom prst="line">
@@ -7577,7 +7081,7 @@
         </p:nvCxnSpPr>
         <p:spPr>
           <a:xfrm flipH="1">
-            <a:off x="7388795" y="5207955"/>
+            <a:off x="7388795" y="5058730"/>
             <a:ext cx="190258" cy="0"/>
           </a:xfrm>
           <a:prstGeom prst="line">
@@ -7622,8 +7126,8 @@
         </p:nvCxnSpPr>
         <p:spPr>
           <a:xfrm flipV="1">
-            <a:off x="7377078" y="5187950"/>
-            <a:ext cx="0" cy="1920561"/>
+            <a:off x="7377078" y="5051425"/>
+            <a:ext cx="0" cy="2057086"/>
           </a:xfrm>
           <a:prstGeom prst="line">
             <a:avLst/>
@@ -7712,8 +7216,8 @@
         </p:nvCxnSpPr>
         <p:spPr>
           <a:xfrm flipV="1">
-            <a:off x="7152993" y="5349912"/>
-            <a:ext cx="0" cy="1915565"/>
+            <a:off x="7133943" y="5191125"/>
+            <a:ext cx="0" cy="2074352"/>
           </a:xfrm>
           <a:prstGeom prst="line">
             <a:avLst/>
@@ -7757,7 +7261,7 @@
         </p:nvCxnSpPr>
         <p:spPr>
           <a:xfrm flipH="1">
-            <a:off x="7149291" y="5363343"/>
+            <a:off x="7149291" y="5214118"/>
             <a:ext cx="429762" cy="0"/>
           </a:xfrm>
           <a:prstGeom prst="line">
@@ -7892,7 +7396,7 @@
         </p:nvCxnSpPr>
         <p:spPr>
           <a:xfrm flipH="1">
-            <a:off x="6940550" y="5518731"/>
+            <a:off x="6926257" y="5363156"/>
             <a:ext cx="646126" cy="0"/>
           </a:xfrm>
           <a:prstGeom prst="line">
@@ -7937,8 +7441,8 @@
         </p:nvCxnSpPr>
         <p:spPr>
           <a:xfrm flipV="1">
-            <a:off x="6928908" y="5499100"/>
-            <a:ext cx="0" cy="1948891"/>
+            <a:off x="6928908" y="5343525"/>
+            <a:ext cx="0" cy="2114550"/>
           </a:xfrm>
           <a:prstGeom prst="line">
             <a:avLst/>
@@ -7981,9 +7485,9 @@
           <p:nvPr/>
         </p:nvCxnSpPr>
         <p:spPr>
-          <a:xfrm flipH="1">
-            <a:off x="8376695" y="3899127"/>
-            <a:ext cx="1176242" cy="0"/>
+          <a:xfrm>
+            <a:off x="7953375" y="3899127"/>
+            <a:ext cx="423320" cy="0"/>
           </a:xfrm>
           <a:prstGeom prst="line">
             <a:avLst/>
@@ -8027,9 +7531,9 @@
           <p:nvPr/>
         </p:nvCxnSpPr>
         <p:spPr>
-          <a:xfrm flipH="1">
-            <a:off x="6781800" y="5677127"/>
-            <a:ext cx="808987" cy="0"/>
+          <a:xfrm>
+            <a:off x="7558820" y="5518377"/>
+            <a:ext cx="413605" cy="0"/>
           </a:xfrm>
           <a:prstGeom prst="line">
             <a:avLst/>
@@ -8074,8 +7578,8 @@
         </p:nvCxnSpPr>
         <p:spPr>
           <a:xfrm flipV="1">
-            <a:off x="9531350" y="3905547"/>
-            <a:ext cx="0" cy="2889540"/>
+            <a:off x="7972425" y="3890142"/>
+            <a:ext cx="0" cy="1653408"/>
           </a:xfrm>
           <a:prstGeom prst="line">
             <a:avLst/>
@@ -8106,98 +7610,6 @@
       </p:cxnSp>
       <p:cxnSp>
         <p:nvCxnSpPr>
-          <p:cNvPr id="1215" name="Straight Connector 1214">
-            <a:extLst>
-              <a:ext uri="{FF2B5EF4-FFF2-40B4-BE49-F238E27FC236}">
-                <a16:creationId xmlns:a16="http://schemas.microsoft.com/office/drawing/2014/main" id="{E75015D0-58C8-9903-5446-B444FC89BE77}"/>
-              </a:ext>
-            </a:extLst>
-          </p:cNvPr>
-          <p:cNvCxnSpPr>
-            <a:cxnSpLocks/>
-          </p:cNvCxnSpPr>
-          <p:nvPr/>
-        </p:nvCxnSpPr>
-        <p:spPr>
-          <a:xfrm flipH="1">
-            <a:off x="6781800" y="6782387"/>
-            <a:ext cx="2770188" cy="0"/>
-          </a:xfrm>
-          <a:prstGeom prst="line">
-            <a:avLst/>
-          </a:prstGeom>
-          <a:ln w="38100">
-            <a:solidFill>
-              <a:schemeClr val="accent5">
-                <a:lumMod val="60000"/>
-                <a:lumOff val="40000"/>
-              </a:schemeClr>
-            </a:solidFill>
-          </a:ln>
-        </p:spPr>
-        <p:style>
-          <a:lnRef idx="2">
-            <a:schemeClr val="accent1"/>
-          </a:lnRef>
-          <a:fillRef idx="0">
-            <a:schemeClr val="accent1"/>
-          </a:fillRef>
-          <a:effectRef idx="1">
-            <a:schemeClr val="accent1"/>
-          </a:effectRef>
-          <a:fontRef idx="minor">
-            <a:schemeClr val="tx1"/>
-          </a:fontRef>
-        </p:style>
-      </p:cxnSp>
-      <p:cxnSp>
-        <p:nvCxnSpPr>
-          <p:cNvPr id="1217" name="Straight Connector 1216">
-            <a:extLst>
-              <a:ext uri="{FF2B5EF4-FFF2-40B4-BE49-F238E27FC236}">
-                <a16:creationId xmlns:a16="http://schemas.microsoft.com/office/drawing/2014/main" id="{202FF405-D8F0-2430-1201-553313535D4C}"/>
-              </a:ext>
-            </a:extLst>
-          </p:cNvPr>
-          <p:cNvCxnSpPr>
-            <a:cxnSpLocks/>
-          </p:cNvCxnSpPr>
-          <p:nvPr/>
-        </p:nvCxnSpPr>
-        <p:spPr>
-          <a:xfrm flipV="1">
-            <a:off x="6800850" y="5665084"/>
-            <a:ext cx="0" cy="1130003"/>
-          </a:xfrm>
-          <a:prstGeom prst="line">
-            <a:avLst/>
-          </a:prstGeom>
-          <a:ln w="38100">
-            <a:solidFill>
-              <a:schemeClr val="accent5">
-                <a:lumMod val="60000"/>
-                <a:lumOff val="40000"/>
-              </a:schemeClr>
-            </a:solidFill>
-          </a:ln>
-        </p:spPr>
-        <p:style>
-          <a:lnRef idx="2">
-            <a:schemeClr val="accent1"/>
-          </a:lnRef>
-          <a:fillRef idx="0">
-            <a:schemeClr val="accent1"/>
-          </a:fillRef>
-          <a:effectRef idx="1">
-            <a:schemeClr val="accent1"/>
-          </a:effectRef>
-          <a:fontRef idx="minor">
-            <a:schemeClr val="tx1"/>
-          </a:fontRef>
-        </p:style>
-      </p:cxnSp>
-      <p:cxnSp>
-        <p:nvCxnSpPr>
           <p:cNvPr id="1222" name="Straight Connector 1221">
             <a:extLst>
               <a:ext uri="{FF2B5EF4-FFF2-40B4-BE49-F238E27FC236}">
@@ -8388,8 +7800,8 @@
         </p:nvCxnSpPr>
         <p:spPr>
           <a:xfrm flipH="1">
-            <a:off x="6857738" y="5045196"/>
-            <a:ext cx="688380" cy="0"/>
+            <a:off x="7915275" y="5975009"/>
+            <a:ext cx="557943" cy="0"/>
           </a:xfrm>
           <a:prstGeom prst="line">
             <a:avLst/>
@@ -8431,8 +7843,8 @@
         </p:nvCxnSpPr>
         <p:spPr>
           <a:xfrm flipV="1">
-            <a:off x="6856954" y="5026819"/>
-            <a:ext cx="0" cy="592931"/>
+            <a:off x="7926929" y="5954971"/>
+            <a:ext cx="0" cy="235102"/>
           </a:xfrm>
           <a:prstGeom prst="line">
             <a:avLst/>
@@ -8474,8 +7886,8 @@
         </p:nvCxnSpPr>
         <p:spPr>
           <a:xfrm flipH="1">
-            <a:off x="3298031" y="5598441"/>
-            <a:ext cx="3559707" cy="0"/>
+            <a:off x="3298825" y="6190073"/>
+            <a:ext cx="4645091" cy="0"/>
           </a:xfrm>
           <a:prstGeom prst="line">
             <a:avLst/>
@@ -8518,7 +7930,7 @@
         <p:spPr>
           <a:xfrm flipV="1">
             <a:off x="3315188" y="5097796"/>
-            <a:ext cx="0" cy="516296"/>
+            <a:ext cx="0" cy="1092277"/>
           </a:xfrm>
           <a:prstGeom prst="line">
             <a:avLst/>
@@ -8890,49 +8302,6 @@
       </p:cxnSp>
       <p:cxnSp>
         <p:nvCxnSpPr>
-          <p:cNvPr id="1262" name="Straight Connector 1261">
-            <a:extLst>
-              <a:ext uri="{FF2B5EF4-FFF2-40B4-BE49-F238E27FC236}">
-                <a16:creationId xmlns:a16="http://schemas.microsoft.com/office/drawing/2014/main" id="{57A6A912-DD86-87D3-335F-03AA3031A17F}"/>
-              </a:ext>
-            </a:extLst>
-          </p:cNvPr>
-          <p:cNvCxnSpPr>
-            <a:cxnSpLocks/>
-          </p:cNvCxnSpPr>
-          <p:nvPr/>
-        </p:nvCxnSpPr>
-        <p:spPr>
-          <a:xfrm flipH="1">
-            <a:off x="8434389" y="5829945"/>
-            <a:ext cx="214311" cy="0"/>
-          </a:xfrm>
-          <a:prstGeom prst="line">
-            <a:avLst/>
-          </a:prstGeom>
-          <a:ln w="38100">
-            <a:solidFill>
-              <a:srgbClr val="006020"/>
-            </a:solidFill>
-          </a:ln>
-        </p:spPr>
-        <p:style>
-          <a:lnRef idx="2">
-            <a:schemeClr val="accent1"/>
-          </a:lnRef>
-          <a:fillRef idx="0">
-            <a:schemeClr val="accent1"/>
-          </a:fillRef>
-          <a:effectRef idx="1">
-            <a:schemeClr val="accent1"/>
-          </a:effectRef>
-          <a:fontRef idx="minor">
-            <a:schemeClr val="tx1"/>
-          </a:fontRef>
-        </p:style>
-      </p:cxnSp>
-      <p:cxnSp>
-        <p:nvCxnSpPr>
           <p:cNvPr id="1263" name="Straight Connector 1262">
             <a:extLst>
               <a:ext uri="{FF2B5EF4-FFF2-40B4-BE49-F238E27FC236}">
@@ -8947,8 +8316,8 @@
         </p:nvCxnSpPr>
         <p:spPr>
           <a:xfrm flipV="1">
-            <a:off x="8645535" y="5818984"/>
-            <a:ext cx="0" cy="1115216"/>
+            <a:off x="8645535" y="5505450"/>
+            <a:ext cx="0" cy="1428750"/>
           </a:xfrm>
           <a:prstGeom prst="line">
             <a:avLst/>
@@ -9150,10 +8519,10 @@
       </p:cxnSp>
       <p:cxnSp>
         <p:nvCxnSpPr>
-          <p:cNvPr id="1274" name="Straight Connector 1273">
-            <a:extLst>
-              <a:ext uri="{FF2B5EF4-FFF2-40B4-BE49-F238E27FC236}">
-                <a16:creationId xmlns:a16="http://schemas.microsoft.com/office/drawing/2014/main" id="{1EC3C81F-660F-DA7E-9E35-F6F6E7A6E551}"/>
+          <p:cNvPr id="1280" name="Straight Connector 1279">
+            <a:extLst>
+              <a:ext uri="{FF2B5EF4-FFF2-40B4-BE49-F238E27FC236}">
+                <a16:creationId xmlns:a16="http://schemas.microsoft.com/office/drawing/2014/main" id="{65543063-2165-A129-5C62-F5AB20D6B7D4}"/>
               </a:ext>
             </a:extLst>
           </p:cNvPr>
@@ -9164,8 +8533,8 @@
         </p:nvCxnSpPr>
         <p:spPr>
           <a:xfrm flipH="1">
-            <a:off x="8448677" y="5049423"/>
-            <a:ext cx="164304" cy="0"/>
+            <a:off x="7804150" y="5825144"/>
+            <a:ext cx="654050" cy="0"/>
           </a:xfrm>
           <a:prstGeom prst="line">
             <a:avLst/>
@@ -9193,22 +8562,22 @@
       </p:cxnSp>
       <p:cxnSp>
         <p:nvCxnSpPr>
-          <p:cNvPr id="1275" name="Straight Connector 1274">
-            <a:extLst>
-              <a:ext uri="{FF2B5EF4-FFF2-40B4-BE49-F238E27FC236}">
-                <a16:creationId xmlns:a16="http://schemas.microsoft.com/office/drawing/2014/main" id="{A53B163B-44B0-8818-5ABB-33128594FFF1}"/>
-              </a:ext>
-            </a:extLst>
-          </p:cNvPr>
-          <p:cNvCxnSpPr>
-            <a:cxnSpLocks/>
-          </p:cNvCxnSpPr>
-          <p:nvPr/>
-        </p:nvCxnSpPr>
-        <p:spPr>
-          <a:xfrm>
-            <a:off x="8597165" y="4744861"/>
-            <a:ext cx="0" cy="289096"/>
+          <p:cNvPr id="1288" name="Straight Connector 1287">
+            <a:extLst>
+              <a:ext uri="{FF2B5EF4-FFF2-40B4-BE49-F238E27FC236}">
+                <a16:creationId xmlns:a16="http://schemas.microsoft.com/office/drawing/2014/main" id="{A43B25C6-D991-A9EF-FDBE-2CE823EB3EEB}"/>
+              </a:ext>
+            </a:extLst>
+          </p:cNvPr>
+          <p:cNvCxnSpPr>
+            <a:cxnSpLocks/>
+          </p:cNvCxnSpPr>
+          <p:nvPr/>
+        </p:nvCxnSpPr>
+        <p:spPr>
+          <a:xfrm flipV="1">
+            <a:off x="7823742" y="5807444"/>
+            <a:ext cx="0" cy="317131"/>
           </a:xfrm>
           <a:prstGeom prst="line">
             <a:avLst/>
@@ -9236,10 +8605,10 @@
       </p:cxnSp>
       <p:cxnSp>
         <p:nvCxnSpPr>
-          <p:cNvPr id="1279" name="Straight Connector 1278">
-            <a:extLst>
-              <a:ext uri="{FF2B5EF4-FFF2-40B4-BE49-F238E27FC236}">
-                <a16:creationId xmlns:a16="http://schemas.microsoft.com/office/drawing/2014/main" id="{F7570C5D-1477-3F4B-A345-45EC437EE572}"/>
+          <p:cNvPr id="1291" name="Straight Connector 1290">
+            <a:extLst>
+              <a:ext uri="{FF2B5EF4-FFF2-40B4-BE49-F238E27FC236}">
+                <a16:creationId xmlns:a16="http://schemas.microsoft.com/office/drawing/2014/main" id="{B693FCD8-EC36-7F7A-554C-05BE7C7BC87C}"/>
               </a:ext>
             </a:extLst>
           </p:cNvPr>
@@ -9250,137 +8619,8 @@
         </p:nvCxnSpPr>
         <p:spPr>
           <a:xfrm flipH="1">
-            <a:off x="8601077" y="5201823"/>
-            <a:ext cx="164304" cy="0"/>
-          </a:xfrm>
-          <a:prstGeom prst="line">
-            <a:avLst/>
-          </a:prstGeom>
-          <a:ln w="38100">
-            <a:solidFill>
-              <a:srgbClr val="006020"/>
-            </a:solidFill>
-          </a:ln>
-        </p:spPr>
-        <p:style>
-          <a:lnRef idx="2">
-            <a:schemeClr val="accent1"/>
-          </a:lnRef>
-          <a:fillRef idx="0">
-            <a:schemeClr val="accent1"/>
-          </a:fillRef>
-          <a:effectRef idx="1">
-            <a:schemeClr val="accent1"/>
-          </a:effectRef>
-          <a:fontRef idx="minor">
-            <a:schemeClr val="tx1"/>
-          </a:fontRef>
-        </p:style>
-      </p:cxnSp>
-      <p:cxnSp>
-        <p:nvCxnSpPr>
-          <p:cNvPr id="1280" name="Straight Connector 1279">
-            <a:extLst>
-              <a:ext uri="{FF2B5EF4-FFF2-40B4-BE49-F238E27FC236}">
-                <a16:creationId xmlns:a16="http://schemas.microsoft.com/office/drawing/2014/main" id="{65543063-2165-A129-5C62-F5AB20D6B7D4}"/>
-              </a:ext>
-            </a:extLst>
-          </p:cNvPr>
-          <p:cNvCxnSpPr>
-            <a:cxnSpLocks/>
-          </p:cNvCxnSpPr>
-          <p:nvPr/>
-        </p:nvCxnSpPr>
-        <p:spPr>
-          <a:xfrm flipH="1">
-            <a:off x="6719888" y="4741014"/>
-            <a:ext cx="1899534" cy="0"/>
-          </a:xfrm>
-          <a:prstGeom prst="line">
-            <a:avLst/>
-          </a:prstGeom>
-          <a:ln w="38100">
-            <a:solidFill>
-              <a:srgbClr val="006020"/>
-            </a:solidFill>
-          </a:ln>
-        </p:spPr>
-        <p:style>
-          <a:lnRef idx="2">
-            <a:schemeClr val="accent1"/>
-          </a:lnRef>
-          <a:fillRef idx="0">
-            <a:schemeClr val="accent1"/>
-          </a:fillRef>
-          <a:effectRef idx="1">
-            <a:schemeClr val="accent1"/>
-          </a:effectRef>
-          <a:fontRef idx="minor">
-            <a:schemeClr val="tx1"/>
-          </a:fontRef>
-        </p:style>
-      </p:cxnSp>
-      <p:cxnSp>
-        <p:nvCxnSpPr>
-          <p:cNvPr id="1288" name="Straight Connector 1287">
-            <a:extLst>
-              <a:ext uri="{FF2B5EF4-FFF2-40B4-BE49-F238E27FC236}">
-                <a16:creationId xmlns:a16="http://schemas.microsoft.com/office/drawing/2014/main" id="{A43B25C6-D991-A9EF-FDBE-2CE823EB3EEB}"/>
-              </a:ext>
-            </a:extLst>
-          </p:cNvPr>
-          <p:cNvCxnSpPr>
-            <a:cxnSpLocks/>
-          </p:cNvCxnSpPr>
-          <p:nvPr/>
-        </p:nvCxnSpPr>
-        <p:spPr>
-          <a:xfrm flipV="1">
-            <a:off x="6737892" y="4723717"/>
-            <a:ext cx="0" cy="755539"/>
-          </a:xfrm>
-          <a:prstGeom prst="line">
-            <a:avLst/>
-          </a:prstGeom>
-          <a:ln w="38100">
-            <a:solidFill>
-              <a:srgbClr val="006020"/>
-            </a:solidFill>
-          </a:ln>
-        </p:spPr>
-        <p:style>
-          <a:lnRef idx="2">
-            <a:schemeClr val="accent1"/>
-          </a:lnRef>
-          <a:fillRef idx="0">
-            <a:schemeClr val="accent1"/>
-          </a:fillRef>
-          <a:effectRef idx="1">
-            <a:schemeClr val="accent1"/>
-          </a:effectRef>
-          <a:fontRef idx="minor">
-            <a:schemeClr val="tx1"/>
-          </a:fontRef>
-        </p:style>
-      </p:cxnSp>
-      <p:cxnSp>
-        <p:nvCxnSpPr>
-          <p:cNvPr id="1291" name="Straight Connector 1290">
-            <a:extLst>
-              <a:ext uri="{FF2B5EF4-FFF2-40B4-BE49-F238E27FC236}">
-                <a16:creationId xmlns:a16="http://schemas.microsoft.com/office/drawing/2014/main" id="{B693FCD8-EC36-7F7A-554C-05BE7C7BC87C}"/>
-              </a:ext>
-            </a:extLst>
-          </p:cNvPr>
-          <p:cNvCxnSpPr>
-            <a:cxnSpLocks/>
-          </p:cNvCxnSpPr>
-          <p:nvPr/>
-        </p:nvCxnSpPr>
-        <p:spPr>
-          <a:xfrm flipH="1">
-            <a:off x="3490913" y="5460329"/>
-            <a:ext cx="3271308" cy="0"/>
+            <a:off x="3482975" y="6104854"/>
+            <a:ext cx="4348339" cy="0"/>
           </a:xfrm>
           <a:prstGeom prst="line">
             <a:avLst/>
@@ -9423,7 +8663,7 @@
         <p:spPr>
           <a:xfrm flipV="1">
             <a:off x="3489019" y="4999161"/>
-            <a:ext cx="0" cy="481214"/>
+            <a:ext cx="0" cy="1112714"/>
           </a:xfrm>
           <a:prstGeom prst="line">
             <a:avLst/>
@@ -9478,6 +8718,49 @@
               <a:schemeClr val="accent6">
                 <a:lumMod val="75000"/>
               </a:schemeClr>
+            </a:solidFill>
+          </a:ln>
+        </p:spPr>
+        <p:style>
+          <a:lnRef idx="2">
+            <a:schemeClr val="accent1"/>
+          </a:lnRef>
+          <a:fillRef idx="0">
+            <a:schemeClr val="accent1"/>
+          </a:fillRef>
+          <a:effectRef idx="1">
+            <a:schemeClr val="accent1"/>
+          </a:effectRef>
+          <a:fontRef idx="minor">
+            <a:schemeClr val="tx1"/>
+          </a:fontRef>
+        </p:style>
+      </p:cxnSp>
+      <p:cxnSp>
+        <p:nvCxnSpPr>
+          <p:cNvPr id="16" name="Straight Connector 15">
+            <a:extLst>
+              <a:ext uri="{FF2B5EF4-FFF2-40B4-BE49-F238E27FC236}">
+                <a16:creationId xmlns:a16="http://schemas.microsoft.com/office/drawing/2014/main" id="{FBC28DEF-1E6C-322C-4753-F97AA6BC53FF}"/>
+              </a:ext>
+            </a:extLst>
+          </p:cNvPr>
+          <p:cNvCxnSpPr>
+            <a:cxnSpLocks/>
+          </p:cNvCxnSpPr>
+          <p:nvPr/>
+        </p:nvCxnSpPr>
+        <p:spPr>
+          <a:xfrm flipH="1">
+            <a:off x="8443088" y="5521970"/>
+            <a:ext cx="211962" cy="0"/>
+          </a:xfrm>
+          <a:prstGeom prst="line">
+            <a:avLst/>
+          </a:prstGeom>
+          <a:ln w="38100">
+            <a:solidFill>
+              <a:srgbClr val="006020"/>
             </a:solidFill>
           </a:ln>
         </p:spPr>

</xml_diff>

<commit_message>
chore: update diagram assets for improved clarity and presentation
</commit_message>
<xml_diff>
--- a/assets/Diagram.pptx
+++ b/assets/Diagram.pptx
@@ -208,7 +208,7 @@
           <a:p>
             <a:fld id="{5F4790EC-F85E-4BC9-9E2D-31011507022E}" type="datetimeFigureOut">
               <a:rPr lang="en-US" smtClean="0"/>
-              <a:t>11/16/2025</a:t>
+              <a:t>12/29/2025</a:t>
             </a:fld>
             <a:endParaRPr lang="en-US"/>
           </a:p>
@@ -690,7 +690,7 @@
           <a:p>
             <a:fld id="{7F5102BF-3E1C-4FEC-B8AE-4CD23D8F5F17}" type="datetimeFigureOut">
               <a:rPr lang="en-US" smtClean="0"/>
-              <a:t>11/16/2025</a:t>
+              <a:t>12/29/2025</a:t>
             </a:fld>
             <a:endParaRPr lang="en-US"/>
           </a:p>
@@ -860,7 +860,7 @@
           <a:p>
             <a:fld id="{7F5102BF-3E1C-4FEC-B8AE-4CD23D8F5F17}" type="datetimeFigureOut">
               <a:rPr lang="en-US" smtClean="0"/>
-              <a:t>11/16/2025</a:t>
+              <a:t>12/29/2025</a:t>
             </a:fld>
             <a:endParaRPr lang="en-US"/>
           </a:p>
@@ -1040,7 +1040,7 @@
           <a:p>
             <a:fld id="{7F5102BF-3E1C-4FEC-B8AE-4CD23D8F5F17}" type="datetimeFigureOut">
               <a:rPr lang="en-US" smtClean="0"/>
-              <a:t>11/16/2025</a:t>
+              <a:t>12/29/2025</a:t>
             </a:fld>
             <a:endParaRPr lang="en-US"/>
           </a:p>
@@ -1210,7 +1210,7 @@
           <a:p>
             <a:fld id="{7F5102BF-3E1C-4FEC-B8AE-4CD23D8F5F17}" type="datetimeFigureOut">
               <a:rPr lang="en-US" smtClean="0"/>
-              <a:t>11/16/2025</a:t>
+              <a:t>12/29/2025</a:t>
             </a:fld>
             <a:endParaRPr lang="en-US"/>
           </a:p>
@@ -1456,7 +1456,7 @@
           <a:p>
             <a:fld id="{7F5102BF-3E1C-4FEC-B8AE-4CD23D8F5F17}" type="datetimeFigureOut">
               <a:rPr lang="en-US" smtClean="0"/>
-              <a:t>11/16/2025</a:t>
+              <a:t>12/29/2025</a:t>
             </a:fld>
             <a:endParaRPr lang="en-US"/>
           </a:p>
@@ -1688,7 +1688,7 @@
           <a:p>
             <a:fld id="{7F5102BF-3E1C-4FEC-B8AE-4CD23D8F5F17}" type="datetimeFigureOut">
               <a:rPr lang="en-US" smtClean="0"/>
-              <a:t>11/16/2025</a:t>
+              <a:t>12/29/2025</a:t>
             </a:fld>
             <a:endParaRPr lang="en-US"/>
           </a:p>
@@ -2055,7 +2055,7 @@
           <a:p>
             <a:fld id="{7F5102BF-3E1C-4FEC-B8AE-4CD23D8F5F17}" type="datetimeFigureOut">
               <a:rPr lang="en-US" smtClean="0"/>
-              <a:t>11/16/2025</a:t>
+              <a:t>12/29/2025</a:t>
             </a:fld>
             <a:endParaRPr lang="en-US"/>
           </a:p>
@@ -2173,7 +2173,7 @@
           <a:p>
             <a:fld id="{7F5102BF-3E1C-4FEC-B8AE-4CD23D8F5F17}" type="datetimeFigureOut">
               <a:rPr lang="en-US" smtClean="0"/>
-              <a:t>11/16/2025</a:t>
+              <a:t>12/29/2025</a:t>
             </a:fld>
             <a:endParaRPr lang="en-US"/>
           </a:p>
@@ -2268,7 +2268,7 @@
           <a:p>
             <a:fld id="{7F5102BF-3E1C-4FEC-B8AE-4CD23D8F5F17}" type="datetimeFigureOut">
               <a:rPr lang="en-US" smtClean="0"/>
-              <a:t>11/16/2025</a:t>
+              <a:t>12/29/2025</a:t>
             </a:fld>
             <a:endParaRPr lang="en-US"/>
           </a:p>
@@ -2545,7 +2545,7 @@
           <a:p>
             <a:fld id="{7F5102BF-3E1C-4FEC-B8AE-4CD23D8F5F17}" type="datetimeFigureOut">
               <a:rPr lang="en-US" smtClean="0"/>
-              <a:t>11/16/2025</a:t>
+              <a:t>12/29/2025</a:t>
             </a:fld>
             <a:endParaRPr lang="en-US"/>
           </a:p>
@@ -2802,7 +2802,7 @@
           <a:p>
             <a:fld id="{7F5102BF-3E1C-4FEC-B8AE-4CD23D8F5F17}" type="datetimeFigureOut">
               <a:rPr lang="en-US" smtClean="0"/>
-              <a:t>11/16/2025</a:t>
+              <a:t>12/29/2025</a:t>
             </a:fld>
             <a:endParaRPr lang="en-US"/>
           </a:p>
@@ -3015,7 +3015,7 @@
           <a:p>
             <a:fld id="{7F5102BF-3E1C-4FEC-B8AE-4CD23D8F5F17}" type="datetimeFigureOut">
               <a:rPr lang="en-US" smtClean="0"/>
-              <a:t>11/16/2025</a:t>
+              <a:t>12/29/2025</a:t>
             </a:fld>
             <a:endParaRPr lang="en-US"/>
           </a:p>
@@ -4073,10 +4073,7 @@
           </a:prstGeom>
           <a:ln w="38100">
             <a:solidFill>
-              <a:schemeClr val="accent3">
-                <a:lumMod val="60000"/>
-                <a:lumOff val="40000"/>
-              </a:schemeClr>
+              <a:srgbClr val="006020"/>
             </a:solidFill>
           </a:ln>
         </p:spPr>
@@ -4119,10 +4116,7 @@
           </a:prstGeom>
           <a:ln w="38100">
             <a:solidFill>
-              <a:schemeClr val="accent3">
-                <a:lumMod val="60000"/>
-                <a:lumOff val="40000"/>
-              </a:schemeClr>
+              <a:srgbClr val="006020"/>
             </a:solidFill>
           </a:ln>
         </p:spPr>
@@ -5424,10 +5418,7 @@
           </a:prstGeom>
           <a:ln w="38100">
             <a:solidFill>
-              <a:schemeClr val="accent3">
-                <a:lumMod val="60000"/>
-                <a:lumOff val="40000"/>
-              </a:schemeClr>
+              <a:srgbClr val="006020"/>
             </a:solidFill>
           </a:ln>
         </p:spPr>
@@ -5482,95 +5473,6 @@
           </a:p>
         </p:txBody>
       </p:sp>
-      <p:cxnSp>
-        <p:nvCxnSpPr>
-          <p:cNvPr id="5" name="Straight Connector 4">
-            <a:extLst>
-              <a:ext uri="{FF2B5EF4-FFF2-40B4-BE49-F238E27FC236}">
-                <a16:creationId xmlns:a16="http://schemas.microsoft.com/office/drawing/2014/main" id="{D0F82940-742A-1B74-5646-5BEA141C6AF8}"/>
-              </a:ext>
-            </a:extLst>
-          </p:cNvPr>
-          <p:cNvCxnSpPr>
-            <a:cxnSpLocks/>
-          </p:cNvCxnSpPr>
-          <p:nvPr/>
-        </p:nvCxnSpPr>
-        <p:spPr>
-          <a:xfrm flipV="1">
-            <a:off x="11833443" y="1799648"/>
-            <a:ext cx="0" cy="2575447"/>
-          </a:xfrm>
-          <a:prstGeom prst="line">
-            <a:avLst/>
-          </a:prstGeom>
-          <a:ln w="38100">
-            <a:solidFill>
-              <a:schemeClr val="accent2"/>
-            </a:solidFill>
-          </a:ln>
-        </p:spPr>
-        <p:style>
-          <a:lnRef idx="2">
-            <a:schemeClr val="accent1"/>
-          </a:lnRef>
-          <a:fillRef idx="0">
-            <a:schemeClr val="accent1"/>
-          </a:fillRef>
-          <a:effectRef idx="1">
-            <a:schemeClr val="accent1"/>
-          </a:effectRef>
-          <a:fontRef idx="minor">
-            <a:schemeClr val="tx1"/>
-          </a:fontRef>
-        </p:style>
-      </p:cxnSp>
-      <p:cxnSp>
-        <p:nvCxnSpPr>
-          <p:cNvPr id="7" name="Straight Connector 6">
-            <a:extLst>
-              <a:ext uri="{FF2B5EF4-FFF2-40B4-BE49-F238E27FC236}">
-                <a16:creationId xmlns:a16="http://schemas.microsoft.com/office/drawing/2014/main" id="{A6D604FD-8E32-7727-BB68-21C53B09D0E5}"/>
-              </a:ext>
-            </a:extLst>
-          </p:cNvPr>
-          <p:cNvCxnSpPr>
-            <a:cxnSpLocks/>
-          </p:cNvCxnSpPr>
-          <p:nvPr/>
-        </p:nvCxnSpPr>
-        <p:spPr>
-          <a:xfrm flipV="1">
-            <a:off x="11730311" y="3228341"/>
-            <a:ext cx="0" cy="1134613"/>
-          </a:xfrm>
-          <a:prstGeom prst="line">
-            <a:avLst/>
-          </a:prstGeom>
-          <a:ln w="38100">
-            <a:solidFill>
-              <a:schemeClr val="accent3">
-                <a:lumMod val="60000"/>
-                <a:lumOff val="40000"/>
-              </a:schemeClr>
-            </a:solidFill>
-          </a:ln>
-        </p:spPr>
-        <p:style>
-          <a:lnRef idx="2">
-            <a:schemeClr val="accent1"/>
-          </a:lnRef>
-          <a:fillRef idx="0">
-            <a:schemeClr val="accent1"/>
-          </a:fillRef>
-          <a:effectRef idx="1">
-            <a:schemeClr val="accent1"/>
-          </a:effectRef>
-          <a:fontRef idx="minor">
-            <a:schemeClr val="tx1"/>
-          </a:fontRef>
-        </p:style>
-      </p:cxnSp>
       <p:pic>
         <p:nvPicPr>
           <p:cNvPr id="57" name="Picture 2" descr="NVIDIA Jetson Xavier NX Developer Kit (812674024318), 16 GB">
@@ -5729,10 +5631,7 @@
           </a:prstGeom>
           <a:ln w="38100">
             <a:solidFill>
-              <a:schemeClr val="accent3">
-                <a:lumMod val="60000"/>
-                <a:lumOff val="40000"/>
-              </a:schemeClr>
+              <a:srgbClr val="006020"/>
             </a:solidFill>
           </a:ln>
         </p:spPr>
@@ -5818,10 +5717,7 @@
           </a:prstGeom>
           <a:ln w="38100">
             <a:solidFill>
-              <a:schemeClr val="accent3">
-                <a:lumMod val="60000"/>
-                <a:lumOff val="40000"/>
-              </a:schemeClr>
+              <a:srgbClr val="006020"/>
             </a:solidFill>
           </a:ln>
         </p:spPr>
@@ -6068,7 +5964,10 @@
           </a:prstGeom>
           <a:ln w="38100">
             <a:solidFill>
-              <a:srgbClr val="006020"/>
+              <a:schemeClr val="accent3">
+                <a:lumMod val="60000"/>
+                <a:lumOff val="40000"/>
+              </a:schemeClr>
             </a:solidFill>
           </a:ln>
         </p:spPr>
@@ -6147,6 +6046,2137 @@
           </a:prstGeom>
           <a:ln w="38100">
             <a:solidFill>
+              <a:srgbClr val="006020"/>
+            </a:solidFill>
+          </a:ln>
+        </p:spPr>
+        <p:style>
+          <a:lnRef idx="2">
+            <a:schemeClr val="accent1"/>
+          </a:lnRef>
+          <a:fillRef idx="0">
+            <a:schemeClr val="accent1"/>
+          </a:fillRef>
+          <a:effectRef idx="1">
+            <a:schemeClr val="accent1"/>
+          </a:effectRef>
+          <a:fontRef idx="minor">
+            <a:schemeClr val="tx1"/>
+          </a:fontRef>
+        </p:style>
+      </p:cxnSp>
+      <p:cxnSp>
+        <p:nvCxnSpPr>
+          <p:cNvPr id="1036" name="Straight Connector 1035">
+            <a:extLst>
+              <a:ext uri="{FF2B5EF4-FFF2-40B4-BE49-F238E27FC236}">
+                <a16:creationId xmlns:a16="http://schemas.microsoft.com/office/drawing/2014/main" id="{41D34E39-8CA6-3605-D322-D66F50619FFE}"/>
+              </a:ext>
+            </a:extLst>
+          </p:cNvPr>
+          <p:cNvCxnSpPr>
+            <a:cxnSpLocks/>
+          </p:cNvCxnSpPr>
+          <p:nvPr/>
+        </p:nvCxnSpPr>
+        <p:spPr>
+          <a:xfrm flipH="1">
+            <a:off x="7398799" y="3890142"/>
+            <a:ext cx="180254" cy="0"/>
+          </a:xfrm>
+          <a:prstGeom prst="line">
+            <a:avLst/>
+          </a:prstGeom>
+          <a:ln w="38100">
+            <a:solidFill>
+              <a:srgbClr val="FF0000"/>
+            </a:solidFill>
+          </a:ln>
+        </p:spPr>
+        <p:style>
+          <a:lnRef idx="2">
+            <a:schemeClr val="accent1"/>
+          </a:lnRef>
+          <a:fillRef idx="0">
+            <a:schemeClr val="accent1"/>
+          </a:fillRef>
+          <a:effectRef idx="1">
+            <a:schemeClr val="accent1"/>
+          </a:effectRef>
+          <a:fontRef idx="minor">
+            <a:schemeClr val="tx1"/>
+          </a:fontRef>
+        </p:style>
+      </p:cxnSp>
+      <p:cxnSp>
+        <p:nvCxnSpPr>
+          <p:cNvPr id="1038" name="Straight Connector 1037">
+            <a:extLst>
+              <a:ext uri="{FF2B5EF4-FFF2-40B4-BE49-F238E27FC236}">
+                <a16:creationId xmlns:a16="http://schemas.microsoft.com/office/drawing/2014/main" id="{D30DCFD6-D0F0-1A56-B994-13F99BA1D425}"/>
+              </a:ext>
+            </a:extLst>
+          </p:cNvPr>
+          <p:cNvCxnSpPr>
+            <a:cxnSpLocks/>
+          </p:cNvCxnSpPr>
+          <p:nvPr/>
+        </p:nvCxnSpPr>
+        <p:spPr>
+          <a:xfrm flipH="1">
+            <a:off x="7339058" y="4022603"/>
+            <a:ext cx="233325" cy="0"/>
+          </a:xfrm>
+          <a:prstGeom prst="line">
+            <a:avLst/>
+          </a:prstGeom>
+          <a:ln w="38100">
+            <a:solidFill>
+              <a:schemeClr val="bg1"/>
+            </a:solidFill>
+          </a:ln>
+        </p:spPr>
+        <p:style>
+          <a:lnRef idx="2">
+            <a:schemeClr val="accent1"/>
+          </a:lnRef>
+          <a:fillRef idx="0">
+            <a:schemeClr val="accent1"/>
+          </a:fillRef>
+          <a:effectRef idx="1">
+            <a:schemeClr val="accent1"/>
+          </a:effectRef>
+          <a:fontRef idx="minor">
+            <a:schemeClr val="tx1"/>
+          </a:fontRef>
+        </p:style>
+      </p:cxnSp>
+      <p:cxnSp>
+        <p:nvCxnSpPr>
+          <p:cNvPr id="1045" name="Straight Connector 1044">
+            <a:extLst>
+              <a:ext uri="{FF2B5EF4-FFF2-40B4-BE49-F238E27FC236}">
+                <a16:creationId xmlns:a16="http://schemas.microsoft.com/office/drawing/2014/main" id="{F2AD5D75-D949-374C-AA8B-B5BA9155F2C6}"/>
+              </a:ext>
+            </a:extLst>
+          </p:cNvPr>
+          <p:cNvCxnSpPr>
+            <a:cxnSpLocks/>
+          </p:cNvCxnSpPr>
+          <p:nvPr/>
+        </p:nvCxnSpPr>
+        <p:spPr>
+          <a:xfrm flipV="1">
+            <a:off x="7179723" y="2330925"/>
+            <a:ext cx="0" cy="1836844"/>
+          </a:xfrm>
+          <a:prstGeom prst="line">
+            <a:avLst/>
+          </a:prstGeom>
+          <a:ln w="38100">
+            <a:solidFill>
+              <a:srgbClr val="FF0000"/>
+            </a:solidFill>
+          </a:ln>
+        </p:spPr>
+        <p:style>
+          <a:lnRef idx="2">
+            <a:schemeClr val="accent1"/>
+          </a:lnRef>
+          <a:fillRef idx="0">
+            <a:schemeClr val="accent1"/>
+          </a:fillRef>
+          <a:effectRef idx="1">
+            <a:schemeClr val="accent1"/>
+          </a:effectRef>
+          <a:fontRef idx="minor">
+            <a:schemeClr val="tx1"/>
+          </a:fontRef>
+        </p:style>
+      </p:cxnSp>
+      <p:cxnSp>
+        <p:nvCxnSpPr>
+          <p:cNvPr id="1048" name="Straight Connector 1047">
+            <a:extLst>
+              <a:ext uri="{FF2B5EF4-FFF2-40B4-BE49-F238E27FC236}">
+                <a16:creationId xmlns:a16="http://schemas.microsoft.com/office/drawing/2014/main" id="{C9A2F697-C2C9-5713-9196-199A85DC02BE}"/>
+              </a:ext>
+            </a:extLst>
+          </p:cNvPr>
+          <p:cNvCxnSpPr>
+            <a:cxnSpLocks/>
+          </p:cNvCxnSpPr>
+          <p:nvPr/>
+        </p:nvCxnSpPr>
+        <p:spPr>
+          <a:xfrm flipH="1">
+            <a:off x="7198537" y="4151191"/>
+            <a:ext cx="380516" cy="0"/>
+          </a:xfrm>
+          <a:prstGeom prst="line">
+            <a:avLst/>
+          </a:prstGeom>
+          <a:ln w="38100">
+            <a:solidFill>
+              <a:srgbClr val="FF0000"/>
+            </a:solidFill>
+          </a:ln>
+        </p:spPr>
+        <p:style>
+          <a:lnRef idx="2">
+            <a:schemeClr val="accent1"/>
+          </a:lnRef>
+          <a:fillRef idx="0">
+            <a:schemeClr val="accent1"/>
+          </a:fillRef>
+          <a:effectRef idx="1">
+            <a:schemeClr val="accent1"/>
+          </a:effectRef>
+          <a:fontRef idx="minor">
+            <a:schemeClr val="tx1"/>
+          </a:fontRef>
+        </p:style>
+      </p:cxnSp>
+      <p:cxnSp>
+        <p:nvCxnSpPr>
+          <p:cNvPr id="1072" name="Straight Connector 1071">
+            <a:extLst>
+              <a:ext uri="{FF2B5EF4-FFF2-40B4-BE49-F238E27FC236}">
+                <a16:creationId xmlns:a16="http://schemas.microsoft.com/office/drawing/2014/main" id="{D7EE408A-CA8F-7DA2-D34E-9ECF1ECC72C1}"/>
+              </a:ext>
+            </a:extLst>
+          </p:cNvPr>
+          <p:cNvCxnSpPr>
+            <a:cxnSpLocks/>
+          </p:cNvCxnSpPr>
+          <p:nvPr/>
+        </p:nvCxnSpPr>
+        <p:spPr>
+          <a:xfrm flipH="1">
+            <a:off x="7104243" y="4304966"/>
+            <a:ext cx="474810" cy="0"/>
+          </a:xfrm>
+          <a:prstGeom prst="line">
+            <a:avLst/>
+          </a:prstGeom>
+          <a:ln w="38100">
+            <a:solidFill>
+              <a:schemeClr val="bg1"/>
+            </a:solidFill>
+          </a:ln>
+        </p:spPr>
+        <p:style>
+          <a:lnRef idx="2">
+            <a:schemeClr val="accent1"/>
+          </a:lnRef>
+          <a:fillRef idx="0">
+            <a:schemeClr val="accent1"/>
+          </a:fillRef>
+          <a:effectRef idx="1">
+            <a:schemeClr val="accent1"/>
+          </a:effectRef>
+          <a:fontRef idx="minor">
+            <a:schemeClr val="tx1"/>
+          </a:fontRef>
+        </p:style>
+      </p:cxnSp>
+      <p:cxnSp>
+        <p:nvCxnSpPr>
+          <p:cNvPr id="1105" name="Straight Connector 1104">
+            <a:extLst>
+              <a:ext uri="{FF2B5EF4-FFF2-40B4-BE49-F238E27FC236}">
+                <a16:creationId xmlns:a16="http://schemas.microsoft.com/office/drawing/2014/main" id="{0E998F13-ECE2-8F2D-5471-4D165CFCFC6F}"/>
+              </a:ext>
+            </a:extLst>
+          </p:cNvPr>
+          <p:cNvCxnSpPr>
+            <a:cxnSpLocks/>
+          </p:cNvCxnSpPr>
+          <p:nvPr/>
+        </p:nvCxnSpPr>
+        <p:spPr>
+          <a:xfrm flipH="1">
+            <a:off x="8394796" y="3473405"/>
+            <a:ext cx="306292" cy="0"/>
+          </a:xfrm>
+          <a:prstGeom prst="line">
+            <a:avLst/>
+          </a:prstGeom>
+          <a:ln w="38100" cmpd="sng">
+            <a:solidFill>
+              <a:schemeClr val="accent5">
+                <a:lumMod val="75000"/>
+              </a:schemeClr>
+            </a:solidFill>
+            <a:prstDash val="solid"/>
+            <a:round/>
+          </a:ln>
+        </p:spPr>
+        <p:style>
+          <a:lnRef idx="2">
+            <a:schemeClr val="accent1"/>
+          </a:lnRef>
+          <a:fillRef idx="0">
+            <a:schemeClr val="accent1"/>
+          </a:fillRef>
+          <a:effectRef idx="1">
+            <a:schemeClr val="accent1"/>
+          </a:effectRef>
+          <a:fontRef idx="minor">
+            <a:schemeClr val="tx1"/>
+          </a:fontRef>
+        </p:style>
+      </p:cxnSp>
+      <p:cxnSp>
+        <p:nvCxnSpPr>
+          <p:cNvPr id="1109" name="Straight Connector 1108">
+            <a:extLst>
+              <a:ext uri="{FF2B5EF4-FFF2-40B4-BE49-F238E27FC236}">
+                <a16:creationId xmlns:a16="http://schemas.microsoft.com/office/drawing/2014/main" id="{1A1D4365-DBB9-D75D-E31E-87F587A7D0F3}"/>
+              </a:ext>
+            </a:extLst>
+          </p:cNvPr>
+          <p:cNvCxnSpPr>
+            <a:cxnSpLocks/>
+          </p:cNvCxnSpPr>
+          <p:nvPr/>
+        </p:nvCxnSpPr>
+        <p:spPr>
+          <a:xfrm flipV="1">
+            <a:off x="8696326" y="3454461"/>
+            <a:ext cx="0" cy="1603314"/>
+          </a:xfrm>
+          <a:prstGeom prst="line">
+            <a:avLst/>
+          </a:prstGeom>
+          <a:ln w="38100" cmpd="sng">
+            <a:solidFill>
+              <a:schemeClr val="accent5">
+                <a:lumMod val="75000"/>
+              </a:schemeClr>
+            </a:solidFill>
+            <a:prstDash val="solid"/>
+            <a:round/>
+          </a:ln>
+        </p:spPr>
+        <p:style>
+          <a:lnRef idx="2">
+            <a:schemeClr val="accent1"/>
+          </a:lnRef>
+          <a:fillRef idx="0">
+            <a:schemeClr val="accent1"/>
+          </a:fillRef>
+          <a:effectRef idx="1">
+            <a:schemeClr val="accent1"/>
+          </a:effectRef>
+          <a:fontRef idx="minor">
+            <a:schemeClr val="tx1"/>
+          </a:fontRef>
+        </p:style>
+      </p:cxnSp>
+      <p:cxnSp>
+        <p:nvCxnSpPr>
+          <p:cNvPr id="1115" name="Straight Connector 1114">
+            <a:extLst>
+              <a:ext uri="{FF2B5EF4-FFF2-40B4-BE49-F238E27FC236}">
+                <a16:creationId xmlns:a16="http://schemas.microsoft.com/office/drawing/2014/main" id="{9AC671A4-4F9A-8520-4D39-2ED31BBA57CE}"/>
+              </a:ext>
+            </a:extLst>
+          </p:cNvPr>
+          <p:cNvCxnSpPr>
+            <a:cxnSpLocks/>
+          </p:cNvCxnSpPr>
+          <p:nvPr/>
+        </p:nvCxnSpPr>
+        <p:spPr>
+          <a:xfrm flipH="1">
+            <a:off x="8438804" y="5046617"/>
+            <a:ext cx="236853" cy="0"/>
+          </a:xfrm>
+          <a:prstGeom prst="line">
+            <a:avLst/>
+          </a:prstGeom>
+          <a:ln w="38100" cmpd="sng">
+            <a:solidFill>
+              <a:schemeClr val="accent5">
+                <a:lumMod val="75000"/>
+              </a:schemeClr>
+            </a:solidFill>
+            <a:prstDash val="solid"/>
+            <a:round/>
+          </a:ln>
+        </p:spPr>
+        <p:style>
+          <a:lnRef idx="2">
+            <a:schemeClr val="accent1"/>
+          </a:lnRef>
+          <a:fillRef idx="0">
+            <a:schemeClr val="accent1"/>
+          </a:fillRef>
+          <a:effectRef idx="1">
+            <a:schemeClr val="accent1"/>
+          </a:effectRef>
+          <a:fontRef idx="minor">
+            <a:schemeClr val="tx1"/>
+          </a:fontRef>
+        </p:style>
+      </p:cxnSp>
+      <p:cxnSp>
+        <p:nvCxnSpPr>
+          <p:cNvPr id="1118" name="Straight Connector 1117">
+            <a:extLst>
+              <a:ext uri="{FF2B5EF4-FFF2-40B4-BE49-F238E27FC236}">
+                <a16:creationId xmlns:a16="http://schemas.microsoft.com/office/drawing/2014/main" id="{0443605E-96C3-FFA7-59B4-7A02CE29DD34}"/>
+              </a:ext>
+            </a:extLst>
+          </p:cNvPr>
+          <p:cNvCxnSpPr>
+            <a:cxnSpLocks/>
+          </p:cNvCxnSpPr>
+          <p:nvPr/>
+        </p:nvCxnSpPr>
+        <p:spPr>
+          <a:xfrm flipH="1">
+            <a:off x="8394792" y="3613478"/>
+            <a:ext cx="387258" cy="0"/>
+          </a:xfrm>
+          <a:prstGeom prst="line">
+            <a:avLst/>
+          </a:prstGeom>
+          <a:ln w="38100" cmpd="thickThin">
+            <a:solidFill>
+              <a:schemeClr val="accent5">
+                <a:lumMod val="75000"/>
+              </a:schemeClr>
+            </a:solidFill>
+          </a:ln>
+        </p:spPr>
+        <p:style>
+          <a:lnRef idx="2">
+            <a:schemeClr val="accent1"/>
+          </a:lnRef>
+          <a:fillRef idx="0">
+            <a:schemeClr val="accent1"/>
+          </a:fillRef>
+          <a:effectRef idx="1">
+            <a:schemeClr val="accent1"/>
+          </a:effectRef>
+          <a:fontRef idx="minor">
+            <a:schemeClr val="tx1"/>
+          </a:fontRef>
+        </p:style>
+      </p:cxnSp>
+      <p:cxnSp>
+        <p:nvCxnSpPr>
+          <p:cNvPr id="1120" name="Straight Connector 1119">
+            <a:extLst>
+              <a:ext uri="{FF2B5EF4-FFF2-40B4-BE49-F238E27FC236}">
+                <a16:creationId xmlns:a16="http://schemas.microsoft.com/office/drawing/2014/main" id="{F2CC7E69-A96F-C3A2-91C5-BE485B378C9C}"/>
+              </a:ext>
+            </a:extLst>
+          </p:cNvPr>
+          <p:cNvCxnSpPr>
+            <a:cxnSpLocks/>
+          </p:cNvCxnSpPr>
+          <p:nvPr/>
+        </p:nvCxnSpPr>
+        <p:spPr>
+          <a:xfrm flipV="1">
+            <a:off x="8788005" y="3590925"/>
+            <a:ext cx="0" cy="1628775"/>
+          </a:xfrm>
+          <a:prstGeom prst="line">
+            <a:avLst/>
+          </a:prstGeom>
+          <a:ln w="38100" cmpd="thickThin">
+            <a:solidFill>
+              <a:schemeClr val="accent5">
+                <a:lumMod val="75000"/>
+              </a:schemeClr>
+            </a:solidFill>
+          </a:ln>
+        </p:spPr>
+        <p:style>
+          <a:lnRef idx="2">
+            <a:schemeClr val="accent1"/>
+          </a:lnRef>
+          <a:fillRef idx="0">
+            <a:schemeClr val="accent1"/>
+          </a:fillRef>
+          <a:effectRef idx="1">
+            <a:schemeClr val="accent1"/>
+          </a:effectRef>
+          <a:fontRef idx="minor">
+            <a:schemeClr val="tx1"/>
+          </a:fontRef>
+        </p:style>
+      </p:cxnSp>
+      <p:cxnSp>
+        <p:nvCxnSpPr>
+          <p:cNvPr id="1121" name="Straight Connector 1120">
+            <a:extLst>
+              <a:ext uri="{FF2B5EF4-FFF2-40B4-BE49-F238E27FC236}">
+                <a16:creationId xmlns:a16="http://schemas.microsoft.com/office/drawing/2014/main" id="{6F0577C7-3B3E-B0B3-076B-EF0FD0B0C45D}"/>
+              </a:ext>
+            </a:extLst>
+          </p:cNvPr>
+          <p:cNvCxnSpPr>
+            <a:cxnSpLocks/>
+          </p:cNvCxnSpPr>
+          <p:nvPr/>
+        </p:nvCxnSpPr>
+        <p:spPr>
+          <a:xfrm flipH="1">
+            <a:off x="8464231" y="5210500"/>
+            <a:ext cx="327344" cy="0"/>
+          </a:xfrm>
+          <a:prstGeom prst="line">
+            <a:avLst/>
+          </a:prstGeom>
+          <a:ln w="38100" cmpd="thickThin">
+            <a:solidFill>
+              <a:schemeClr val="accent5">
+                <a:lumMod val="75000"/>
+              </a:schemeClr>
+            </a:solidFill>
+          </a:ln>
+        </p:spPr>
+        <p:style>
+          <a:lnRef idx="2">
+            <a:schemeClr val="accent1"/>
+          </a:lnRef>
+          <a:fillRef idx="0">
+            <a:schemeClr val="accent1"/>
+          </a:fillRef>
+          <a:effectRef idx="1">
+            <a:schemeClr val="accent1"/>
+          </a:effectRef>
+          <a:fontRef idx="minor">
+            <a:schemeClr val="tx1"/>
+          </a:fontRef>
+        </p:style>
+      </p:cxnSp>
+      <p:cxnSp>
+        <p:nvCxnSpPr>
+          <p:cNvPr id="1125" name="Straight Connector 1124">
+            <a:extLst>
+              <a:ext uri="{FF2B5EF4-FFF2-40B4-BE49-F238E27FC236}">
+                <a16:creationId xmlns:a16="http://schemas.microsoft.com/office/drawing/2014/main" id="{E13949AC-F6D2-F48B-3FDF-79900A1D8DCC}"/>
+              </a:ext>
+            </a:extLst>
+          </p:cNvPr>
+          <p:cNvCxnSpPr>
+            <a:cxnSpLocks/>
+          </p:cNvCxnSpPr>
+          <p:nvPr/>
+        </p:nvCxnSpPr>
+        <p:spPr>
+          <a:xfrm flipH="1">
+            <a:off x="8394796" y="3753550"/>
+            <a:ext cx="484886" cy="0"/>
+          </a:xfrm>
+          <a:prstGeom prst="line">
+            <a:avLst/>
+          </a:prstGeom>
+          <a:ln w="38100" cmpd="dbl">
+            <a:solidFill>
+              <a:schemeClr val="accent5">
+                <a:lumMod val="75000"/>
+              </a:schemeClr>
+            </a:solidFill>
+          </a:ln>
+        </p:spPr>
+        <p:style>
+          <a:lnRef idx="2">
+            <a:schemeClr val="accent1"/>
+          </a:lnRef>
+          <a:fillRef idx="0">
+            <a:schemeClr val="accent1"/>
+          </a:fillRef>
+          <a:effectRef idx="1">
+            <a:schemeClr val="accent1"/>
+          </a:effectRef>
+          <a:fontRef idx="minor">
+            <a:schemeClr val="tx1"/>
+          </a:fontRef>
+        </p:style>
+      </p:cxnSp>
+      <p:cxnSp>
+        <p:nvCxnSpPr>
+          <p:cNvPr id="1126" name="Straight Connector 1125">
+            <a:extLst>
+              <a:ext uri="{FF2B5EF4-FFF2-40B4-BE49-F238E27FC236}">
+                <a16:creationId xmlns:a16="http://schemas.microsoft.com/office/drawing/2014/main" id="{A87DB142-59BF-0566-CC9E-8EF4EEFB0ECF}"/>
+              </a:ext>
+            </a:extLst>
+          </p:cNvPr>
+          <p:cNvCxnSpPr>
+            <a:cxnSpLocks/>
+          </p:cNvCxnSpPr>
+          <p:nvPr/>
+        </p:nvCxnSpPr>
+        <p:spPr>
+          <a:xfrm flipV="1">
+            <a:off x="8879684" y="3731431"/>
+            <a:ext cx="0" cy="1659719"/>
+          </a:xfrm>
+          <a:prstGeom prst="line">
+            <a:avLst/>
+          </a:prstGeom>
+          <a:ln w="38100" cmpd="dbl">
+            <a:solidFill>
+              <a:schemeClr val="accent5">
+                <a:lumMod val="75000"/>
+              </a:schemeClr>
+            </a:solidFill>
+          </a:ln>
+        </p:spPr>
+        <p:style>
+          <a:lnRef idx="2">
+            <a:schemeClr val="accent1"/>
+          </a:lnRef>
+          <a:fillRef idx="0">
+            <a:schemeClr val="accent1"/>
+          </a:fillRef>
+          <a:effectRef idx="1">
+            <a:schemeClr val="accent1"/>
+          </a:effectRef>
+          <a:fontRef idx="minor">
+            <a:schemeClr val="tx1"/>
+          </a:fontRef>
+        </p:style>
+      </p:cxnSp>
+      <p:cxnSp>
+        <p:nvCxnSpPr>
+          <p:cNvPr id="1127" name="Straight Connector 1126">
+            <a:extLst>
+              <a:ext uri="{FF2B5EF4-FFF2-40B4-BE49-F238E27FC236}">
+                <a16:creationId xmlns:a16="http://schemas.microsoft.com/office/drawing/2014/main" id="{FC783D8A-6C73-94A8-422B-35D5C97FE300}"/>
+              </a:ext>
+            </a:extLst>
+          </p:cNvPr>
+          <p:cNvCxnSpPr>
+            <a:cxnSpLocks/>
+          </p:cNvCxnSpPr>
+          <p:nvPr/>
+        </p:nvCxnSpPr>
+        <p:spPr>
+          <a:xfrm flipH="1">
+            <a:off x="8453438" y="5368034"/>
+            <a:ext cx="435769" cy="0"/>
+          </a:xfrm>
+          <a:prstGeom prst="line">
+            <a:avLst/>
+          </a:prstGeom>
+          <a:ln w="38100" cmpd="dbl">
+            <a:solidFill>
+              <a:schemeClr val="accent5">
+                <a:lumMod val="75000"/>
+              </a:schemeClr>
+            </a:solidFill>
+          </a:ln>
+        </p:spPr>
+        <p:style>
+          <a:lnRef idx="2">
+            <a:schemeClr val="accent1"/>
+          </a:lnRef>
+          <a:fillRef idx="0">
+            <a:schemeClr val="accent1"/>
+          </a:fillRef>
+          <a:effectRef idx="1">
+            <a:schemeClr val="accent1"/>
+          </a:effectRef>
+          <a:fontRef idx="minor">
+            <a:schemeClr val="tx1"/>
+          </a:fontRef>
+        </p:style>
+      </p:cxnSp>
+      <p:cxnSp>
+        <p:nvCxnSpPr>
+          <p:cNvPr id="1143" name="Straight Connector 1142">
+            <a:extLst>
+              <a:ext uri="{FF2B5EF4-FFF2-40B4-BE49-F238E27FC236}">
+                <a16:creationId xmlns:a16="http://schemas.microsoft.com/office/drawing/2014/main" id="{08C43701-FA0C-B39B-BAC7-65BEE8D5B834}"/>
+              </a:ext>
+            </a:extLst>
+          </p:cNvPr>
+          <p:cNvCxnSpPr>
+            <a:cxnSpLocks/>
+          </p:cNvCxnSpPr>
+          <p:nvPr/>
+        </p:nvCxnSpPr>
+        <p:spPr>
+          <a:xfrm flipH="1">
+            <a:off x="8394796" y="4299905"/>
+            <a:ext cx="611595" cy="0"/>
+          </a:xfrm>
+          <a:prstGeom prst="line">
+            <a:avLst/>
+          </a:prstGeom>
+          <a:ln w="38100">
+            <a:solidFill>
+              <a:schemeClr val="bg2">
+                <a:lumMod val="25000"/>
+              </a:schemeClr>
+            </a:solidFill>
+          </a:ln>
+        </p:spPr>
+        <p:style>
+          <a:lnRef idx="2">
+            <a:schemeClr val="accent1"/>
+          </a:lnRef>
+          <a:fillRef idx="0">
+            <a:schemeClr val="accent1"/>
+          </a:fillRef>
+          <a:effectRef idx="1">
+            <a:schemeClr val="accent1"/>
+          </a:effectRef>
+          <a:fontRef idx="minor">
+            <a:schemeClr val="tx1"/>
+          </a:fontRef>
+        </p:style>
+      </p:cxnSp>
+      <p:cxnSp>
+        <p:nvCxnSpPr>
+          <p:cNvPr id="1144" name="Straight Connector 1143">
+            <a:extLst>
+              <a:ext uri="{FF2B5EF4-FFF2-40B4-BE49-F238E27FC236}">
+                <a16:creationId xmlns:a16="http://schemas.microsoft.com/office/drawing/2014/main" id="{B9795412-6CC3-CAD4-A4BB-26AB98702FC6}"/>
+              </a:ext>
+            </a:extLst>
+          </p:cNvPr>
+          <p:cNvCxnSpPr>
+            <a:cxnSpLocks/>
+          </p:cNvCxnSpPr>
+          <p:nvPr/>
+        </p:nvCxnSpPr>
+        <p:spPr>
+          <a:xfrm flipV="1">
+            <a:off x="9001629" y="4277786"/>
+            <a:ext cx="0" cy="2830725"/>
+          </a:xfrm>
+          <a:prstGeom prst="line">
+            <a:avLst/>
+          </a:prstGeom>
+          <a:ln w="38100">
+            <a:solidFill>
+              <a:schemeClr val="bg2">
+                <a:lumMod val="25000"/>
+              </a:schemeClr>
+            </a:solidFill>
+          </a:ln>
+        </p:spPr>
+        <p:style>
+          <a:lnRef idx="2">
+            <a:schemeClr val="accent1"/>
+          </a:lnRef>
+          <a:fillRef idx="0">
+            <a:schemeClr val="accent1"/>
+          </a:fillRef>
+          <a:effectRef idx="1">
+            <a:schemeClr val="accent1"/>
+          </a:effectRef>
+          <a:fontRef idx="minor">
+            <a:schemeClr val="tx1"/>
+          </a:fontRef>
+        </p:style>
+      </p:cxnSp>
+      <p:cxnSp>
+        <p:nvCxnSpPr>
+          <p:cNvPr id="1145" name="Straight Connector 1144">
+            <a:extLst>
+              <a:ext uri="{FF2B5EF4-FFF2-40B4-BE49-F238E27FC236}">
+                <a16:creationId xmlns:a16="http://schemas.microsoft.com/office/drawing/2014/main" id="{5815556F-5658-BA4A-0D9A-6D503CE4DC9E}"/>
+              </a:ext>
+            </a:extLst>
+          </p:cNvPr>
+          <p:cNvCxnSpPr>
+            <a:cxnSpLocks/>
+          </p:cNvCxnSpPr>
+          <p:nvPr/>
+        </p:nvCxnSpPr>
+        <p:spPr>
+          <a:xfrm flipH="1">
+            <a:off x="7398799" y="7095178"/>
+            <a:ext cx="1607592" cy="0"/>
+          </a:xfrm>
+          <a:prstGeom prst="line">
+            <a:avLst/>
+          </a:prstGeom>
+          <a:ln w="38100">
+            <a:solidFill>
+              <a:schemeClr val="bg2">
+                <a:lumMod val="25000"/>
+              </a:schemeClr>
+            </a:solidFill>
+          </a:ln>
+        </p:spPr>
+        <p:style>
+          <a:lnRef idx="2">
+            <a:schemeClr val="accent1"/>
+          </a:lnRef>
+          <a:fillRef idx="0">
+            <a:schemeClr val="accent1"/>
+          </a:fillRef>
+          <a:effectRef idx="1">
+            <a:schemeClr val="accent1"/>
+          </a:effectRef>
+          <a:fontRef idx="minor">
+            <a:schemeClr val="tx1"/>
+          </a:fontRef>
+        </p:style>
+      </p:cxnSp>
+      <p:cxnSp>
+        <p:nvCxnSpPr>
+          <p:cNvPr id="1147" name="Straight Connector 1146">
+            <a:extLst>
+              <a:ext uri="{FF2B5EF4-FFF2-40B4-BE49-F238E27FC236}">
+                <a16:creationId xmlns:a16="http://schemas.microsoft.com/office/drawing/2014/main" id="{2BD7C420-B270-FEB8-B068-5076E2BE159F}"/>
+              </a:ext>
+            </a:extLst>
+          </p:cNvPr>
+          <p:cNvCxnSpPr>
+            <a:cxnSpLocks/>
+          </p:cNvCxnSpPr>
+          <p:nvPr/>
+        </p:nvCxnSpPr>
+        <p:spPr>
+          <a:xfrm flipH="1">
+            <a:off x="8401384" y="4026481"/>
+            <a:ext cx="964866" cy="0"/>
+          </a:xfrm>
+          <a:prstGeom prst="line">
+            <a:avLst/>
+          </a:prstGeom>
+          <a:ln w="38100" cmpd="dbl">
+            <a:solidFill>
+              <a:schemeClr val="bg2">
+                <a:lumMod val="25000"/>
+              </a:schemeClr>
+            </a:solidFill>
+          </a:ln>
+        </p:spPr>
+        <p:style>
+          <a:lnRef idx="2">
+            <a:schemeClr val="accent1"/>
+          </a:lnRef>
+          <a:fillRef idx="0">
+            <a:schemeClr val="accent1"/>
+          </a:fillRef>
+          <a:effectRef idx="1">
+            <a:schemeClr val="accent1"/>
+          </a:effectRef>
+          <a:fontRef idx="minor">
+            <a:schemeClr val="tx1"/>
+          </a:fontRef>
+        </p:style>
+      </p:cxnSp>
+      <p:cxnSp>
+        <p:nvCxnSpPr>
+          <p:cNvPr id="1148" name="Straight Connector 1147">
+            <a:extLst>
+              <a:ext uri="{FF2B5EF4-FFF2-40B4-BE49-F238E27FC236}">
+                <a16:creationId xmlns:a16="http://schemas.microsoft.com/office/drawing/2014/main" id="{A3DB7831-78AB-F4CB-4A2E-02051DC8E052}"/>
+              </a:ext>
+            </a:extLst>
+          </p:cNvPr>
+          <p:cNvCxnSpPr>
+            <a:cxnSpLocks/>
+          </p:cNvCxnSpPr>
+          <p:nvPr/>
+        </p:nvCxnSpPr>
+        <p:spPr>
+          <a:xfrm flipV="1">
+            <a:off x="9335558" y="4000757"/>
+            <a:ext cx="0" cy="3447234"/>
+          </a:xfrm>
+          <a:prstGeom prst="line">
+            <a:avLst/>
+          </a:prstGeom>
+          <a:ln w="38100" cmpd="dbl">
+            <a:solidFill>
+              <a:schemeClr val="bg2">
+                <a:lumMod val="25000"/>
+              </a:schemeClr>
+            </a:solidFill>
+          </a:ln>
+        </p:spPr>
+        <p:style>
+          <a:lnRef idx="2">
+            <a:schemeClr val="accent1"/>
+          </a:lnRef>
+          <a:fillRef idx="0">
+            <a:schemeClr val="accent1"/>
+          </a:fillRef>
+          <a:effectRef idx="1">
+            <a:schemeClr val="accent1"/>
+          </a:effectRef>
+          <a:fontRef idx="minor">
+            <a:schemeClr val="tx1"/>
+          </a:fontRef>
+        </p:style>
+      </p:cxnSp>
+      <p:cxnSp>
+        <p:nvCxnSpPr>
+          <p:cNvPr id="1165" name="Straight Connector 1164">
+            <a:extLst>
+              <a:ext uri="{FF2B5EF4-FFF2-40B4-BE49-F238E27FC236}">
+                <a16:creationId xmlns:a16="http://schemas.microsoft.com/office/drawing/2014/main" id="{FEF0A87C-0F7E-C80F-1AC8-B9D2A140C2E4}"/>
+              </a:ext>
+            </a:extLst>
+          </p:cNvPr>
+          <p:cNvCxnSpPr>
+            <a:cxnSpLocks/>
+          </p:cNvCxnSpPr>
+          <p:nvPr/>
+        </p:nvCxnSpPr>
+        <p:spPr>
+          <a:xfrm flipH="1">
+            <a:off x="8394796" y="4151191"/>
+            <a:ext cx="768254" cy="0"/>
+          </a:xfrm>
+          <a:prstGeom prst="line">
+            <a:avLst/>
+          </a:prstGeom>
+          <a:ln w="38100" cmpd="thickThin">
+            <a:solidFill>
+              <a:schemeClr val="bg2">
+                <a:lumMod val="25000"/>
+              </a:schemeClr>
+            </a:solidFill>
+          </a:ln>
+        </p:spPr>
+        <p:style>
+          <a:lnRef idx="2">
+            <a:schemeClr val="accent1"/>
+          </a:lnRef>
+          <a:fillRef idx="0">
+            <a:schemeClr val="accent1"/>
+          </a:fillRef>
+          <a:effectRef idx="1">
+            <a:schemeClr val="accent1"/>
+          </a:effectRef>
+          <a:fontRef idx="minor">
+            <a:schemeClr val="tx1"/>
+          </a:fontRef>
+        </p:style>
+      </p:cxnSp>
+      <p:cxnSp>
+        <p:nvCxnSpPr>
+          <p:cNvPr id="1169" name="Straight Connector 1168">
+            <a:extLst>
+              <a:ext uri="{FF2B5EF4-FFF2-40B4-BE49-F238E27FC236}">
+                <a16:creationId xmlns:a16="http://schemas.microsoft.com/office/drawing/2014/main" id="{DCECDAC3-5BE1-F093-79E8-6F531A911C63}"/>
+              </a:ext>
+            </a:extLst>
+          </p:cNvPr>
+          <p:cNvCxnSpPr>
+            <a:cxnSpLocks/>
+          </p:cNvCxnSpPr>
+          <p:nvPr/>
+        </p:nvCxnSpPr>
+        <p:spPr>
+          <a:xfrm flipH="1">
+            <a:off x="7388795" y="5058730"/>
+            <a:ext cx="190258" cy="0"/>
+          </a:xfrm>
+          <a:prstGeom prst="line">
+            <a:avLst/>
+          </a:prstGeom>
+          <a:ln w="38100">
+            <a:solidFill>
+              <a:schemeClr val="bg2">
+                <a:lumMod val="25000"/>
+              </a:schemeClr>
+            </a:solidFill>
+          </a:ln>
+        </p:spPr>
+        <p:style>
+          <a:lnRef idx="2">
+            <a:schemeClr val="accent1"/>
+          </a:lnRef>
+          <a:fillRef idx="0">
+            <a:schemeClr val="accent1"/>
+          </a:fillRef>
+          <a:effectRef idx="1">
+            <a:schemeClr val="accent1"/>
+          </a:effectRef>
+          <a:fontRef idx="minor">
+            <a:schemeClr val="tx1"/>
+          </a:fontRef>
+        </p:style>
+      </p:cxnSp>
+      <p:cxnSp>
+        <p:nvCxnSpPr>
+          <p:cNvPr id="1171" name="Straight Connector 1170">
+            <a:extLst>
+              <a:ext uri="{FF2B5EF4-FFF2-40B4-BE49-F238E27FC236}">
+                <a16:creationId xmlns:a16="http://schemas.microsoft.com/office/drawing/2014/main" id="{D17FDE0C-5D68-2DE1-23C0-7128FE15C172}"/>
+              </a:ext>
+            </a:extLst>
+          </p:cNvPr>
+          <p:cNvCxnSpPr>
+            <a:cxnSpLocks/>
+          </p:cNvCxnSpPr>
+          <p:nvPr/>
+        </p:nvCxnSpPr>
+        <p:spPr>
+          <a:xfrm flipV="1">
+            <a:off x="7377078" y="5051425"/>
+            <a:ext cx="0" cy="2057086"/>
+          </a:xfrm>
+          <a:prstGeom prst="line">
+            <a:avLst/>
+          </a:prstGeom>
+          <a:ln w="38100">
+            <a:solidFill>
+              <a:schemeClr val="bg2">
+                <a:lumMod val="25000"/>
+              </a:schemeClr>
+            </a:solidFill>
+          </a:ln>
+        </p:spPr>
+        <p:style>
+          <a:lnRef idx="2">
+            <a:schemeClr val="accent1"/>
+          </a:lnRef>
+          <a:fillRef idx="0">
+            <a:schemeClr val="accent1"/>
+          </a:fillRef>
+          <a:effectRef idx="1">
+            <a:schemeClr val="accent1"/>
+          </a:effectRef>
+          <a:fontRef idx="minor">
+            <a:schemeClr val="tx1"/>
+          </a:fontRef>
+        </p:style>
+      </p:cxnSp>
+      <p:cxnSp>
+        <p:nvCxnSpPr>
+          <p:cNvPr id="1177" name="Straight Connector 1176">
+            <a:extLst>
+              <a:ext uri="{FF2B5EF4-FFF2-40B4-BE49-F238E27FC236}">
+                <a16:creationId xmlns:a16="http://schemas.microsoft.com/office/drawing/2014/main" id="{5CD046CB-C3AD-F950-5B3A-E2DCB6C25329}"/>
+              </a:ext>
+            </a:extLst>
+          </p:cNvPr>
+          <p:cNvCxnSpPr>
+            <a:cxnSpLocks/>
+          </p:cNvCxnSpPr>
+          <p:nvPr/>
+        </p:nvCxnSpPr>
+        <p:spPr>
+          <a:xfrm flipV="1">
+            <a:off x="9168593" y="4151191"/>
+            <a:ext cx="0" cy="3114286"/>
+          </a:xfrm>
+          <a:prstGeom prst="line">
+            <a:avLst/>
+          </a:prstGeom>
+          <a:ln w="38100" cmpd="thickThin">
+            <a:solidFill>
+              <a:schemeClr val="bg2">
+                <a:lumMod val="25000"/>
+              </a:schemeClr>
+            </a:solidFill>
+          </a:ln>
+        </p:spPr>
+        <p:style>
+          <a:lnRef idx="2">
+            <a:schemeClr val="accent1"/>
+          </a:lnRef>
+          <a:fillRef idx="0">
+            <a:schemeClr val="accent1"/>
+          </a:fillRef>
+          <a:effectRef idx="1">
+            <a:schemeClr val="accent1"/>
+          </a:effectRef>
+          <a:fontRef idx="minor">
+            <a:schemeClr val="tx1"/>
+          </a:fontRef>
+        </p:style>
+      </p:cxnSp>
+      <p:cxnSp>
+        <p:nvCxnSpPr>
+          <p:cNvPr id="1182" name="Straight Connector 1181">
+            <a:extLst>
+              <a:ext uri="{FF2B5EF4-FFF2-40B4-BE49-F238E27FC236}">
+                <a16:creationId xmlns:a16="http://schemas.microsoft.com/office/drawing/2014/main" id="{BC30FF90-E2AC-C50E-E9CF-CEF09385F4FB}"/>
+              </a:ext>
+            </a:extLst>
+          </p:cNvPr>
+          <p:cNvCxnSpPr>
+            <a:cxnSpLocks/>
+          </p:cNvCxnSpPr>
+          <p:nvPr/>
+        </p:nvCxnSpPr>
+        <p:spPr>
+          <a:xfrm flipV="1">
+            <a:off x="7133943" y="5191125"/>
+            <a:ext cx="0" cy="2074352"/>
+          </a:xfrm>
+          <a:prstGeom prst="line">
+            <a:avLst/>
+          </a:prstGeom>
+          <a:ln w="38100" cmpd="thickThin">
+            <a:solidFill>
+              <a:schemeClr val="bg2">
+                <a:lumMod val="25000"/>
+              </a:schemeClr>
+            </a:solidFill>
+          </a:ln>
+        </p:spPr>
+        <p:style>
+          <a:lnRef idx="2">
+            <a:schemeClr val="accent1"/>
+          </a:lnRef>
+          <a:fillRef idx="0">
+            <a:schemeClr val="accent1"/>
+          </a:fillRef>
+          <a:effectRef idx="1">
+            <a:schemeClr val="accent1"/>
+          </a:effectRef>
+          <a:fontRef idx="minor">
+            <a:schemeClr val="tx1"/>
+          </a:fontRef>
+        </p:style>
+      </p:cxnSp>
+      <p:cxnSp>
+        <p:nvCxnSpPr>
+          <p:cNvPr id="1183" name="Straight Connector 1182">
+            <a:extLst>
+              <a:ext uri="{FF2B5EF4-FFF2-40B4-BE49-F238E27FC236}">
+                <a16:creationId xmlns:a16="http://schemas.microsoft.com/office/drawing/2014/main" id="{B1D009FE-F575-C9DF-7CE0-9D6123C82354}"/>
+              </a:ext>
+            </a:extLst>
+          </p:cNvPr>
+          <p:cNvCxnSpPr>
+            <a:cxnSpLocks/>
+          </p:cNvCxnSpPr>
+          <p:nvPr/>
+        </p:nvCxnSpPr>
+        <p:spPr>
+          <a:xfrm flipH="1">
+            <a:off x="7149291" y="5214118"/>
+            <a:ext cx="429762" cy="0"/>
+          </a:xfrm>
+          <a:prstGeom prst="line">
+            <a:avLst/>
+          </a:prstGeom>
+          <a:ln w="38100" cmpd="thickThin">
+            <a:solidFill>
+              <a:schemeClr val="bg2">
+                <a:lumMod val="25000"/>
+              </a:schemeClr>
+            </a:solidFill>
+          </a:ln>
+        </p:spPr>
+        <p:style>
+          <a:lnRef idx="2">
+            <a:schemeClr val="accent1"/>
+          </a:lnRef>
+          <a:fillRef idx="0">
+            <a:schemeClr val="accent1"/>
+          </a:fillRef>
+          <a:effectRef idx="1">
+            <a:schemeClr val="accent1"/>
+          </a:effectRef>
+          <a:fontRef idx="minor">
+            <a:schemeClr val="tx1"/>
+          </a:fontRef>
+        </p:style>
+      </p:cxnSp>
+      <p:cxnSp>
+        <p:nvCxnSpPr>
+          <p:cNvPr id="1186" name="Straight Connector 1185">
+            <a:extLst>
+              <a:ext uri="{FF2B5EF4-FFF2-40B4-BE49-F238E27FC236}">
+                <a16:creationId xmlns:a16="http://schemas.microsoft.com/office/drawing/2014/main" id="{908320B9-BDF1-1910-0D70-61E3E84C31CB}"/>
+              </a:ext>
+            </a:extLst>
+          </p:cNvPr>
+          <p:cNvCxnSpPr>
+            <a:cxnSpLocks/>
+          </p:cNvCxnSpPr>
+          <p:nvPr/>
+        </p:nvCxnSpPr>
+        <p:spPr>
+          <a:xfrm flipH="1">
+            <a:off x="7115784" y="7259175"/>
+            <a:ext cx="2072666" cy="0"/>
+          </a:xfrm>
+          <a:prstGeom prst="line">
+            <a:avLst/>
+          </a:prstGeom>
+          <a:ln w="38100" cmpd="thickThin">
+            <a:solidFill>
+              <a:schemeClr val="bg2">
+                <a:lumMod val="25000"/>
+              </a:schemeClr>
+            </a:solidFill>
+          </a:ln>
+        </p:spPr>
+        <p:style>
+          <a:lnRef idx="2">
+            <a:schemeClr val="accent1"/>
+          </a:lnRef>
+          <a:fillRef idx="0">
+            <a:schemeClr val="accent1"/>
+          </a:fillRef>
+          <a:effectRef idx="1">
+            <a:schemeClr val="accent1"/>
+          </a:effectRef>
+          <a:fontRef idx="minor">
+            <a:schemeClr val="tx1"/>
+          </a:fontRef>
+        </p:style>
+      </p:cxnSp>
+      <p:cxnSp>
+        <p:nvCxnSpPr>
+          <p:cNvPr id="1192" name="Straight Connector 1191">
+            <a:extLst>
+              <a:ext uri="{FF2B5EF4-FFF2-40B4-BE49-F238E27FC236}">
+                <a16:creationId xmlns:a16="http://schemas.microsoft.com/office/drawing/2014/main" id="{36FD166D-67EB-5C41-343C-C9B9ABCBA76D}"/>
+              </a:ext>
+            </a:extLst>
+          </p:cNvPr>
+          <p:cNvCxnSpPr>
+            <a:cxnSpLocks/>
+          </p:cNvCxnSpPr>
+          <p:nvPr/>
+        </p:nvCxnSpPr>
+        <p:spPr>
+          <a:xfrm flipH="1">
+            <a:off x="6927850" y="7423172"/>
+            <a:ext cx="2400300" cy="24819"/>
+          </a:xfrm>
+          <a:prstGeom prst="line">
+            <a:avLst/>
+          </a:prstGeom>
+          <a:ln w="38100" cmpd="dbl">
+            <a:solidFill>
+              <a:schemeClr val="bg2">
+                <a:lumMod val="25000"/>
+              </a:schemeClr>
+            </a:solidFill>
+          </a:ln>
+        </p:spPr>
+        <p:style>
+          <a:lnRef idx="2">
+            <a:schemeClr val="accent1"/>
+          </a:lnRef>
+          <a:fillRef idx="0">
+            <a:schemeClr val="accent1"/>
+          </a:fillRef>
+          <a:effectRef idx="1">
+            <a:schemeClr val="accent1"/>
+          </a:effectRef>
+          <a:fontRef idx="minor">
+            <a:schemeClr val="tx1"/>
+          </a:fontRef>
+        </p:style>
+      </p:cxnSp>
+      <p:cxnSp>
+        <p:nvCxnSpPr>
+          <p:cNvPr id="1195" name="Straight Connector 1194">
+            <a:extLst>
+              <a:ext uri="{FF2B5EF4-FFF2-40B4-BE49-F238E27FC236}">
+                <a16:creationId xmlns:a16="http://schemas.microsoft.com/office/drawing/2014/main" id="{0AE5D181-A139-E172-89B9-0D9689CDEA91}"/>
+              </a:ext>
+            </a:extLst>
+          </p:cNvPr>
+          <p:cNvCxnSpPr>
+            <a:cxnSpLocks/>
+          </p:cNvCxnSpPr>
+          <p:nvPr/>
+        </p:nvCxnSpPr>
+        <p:spPr>
+          <a:xfrm flipH="1">
+            <a:off x="6926257" y="5363156"/>
+            <a:ext cx="646126" cy="0"/>
+          </a:xfrm>
+          <a:prstGeom prst="line">
+            <a:avLst/>
+          </a:prstGeom>
+          <a:ln w="38100" cmpd="dbl">
+            <a:solidFill>
+              <a:schemeClr val="bg2">
+                <a:lumMod val="25000"/>
+              </a:schemeClr>
+            </a:solidFill>
+          </a:ln>
+        </p:spPr>
+        <p:style>
+          <a:lnRef idx="2">
+            <a:schemeClr val="accent1"/>
+          </a:lnRef>
+          <a:fillRef idx="0">
+            <a:schemeClr val="accent1"/>
+          </a:fillRef>
+          <a:effectRef idx="1">
+            <a:schemeClr val="accent1"/>
+          </a:effectRef>
+          <a:fontRef idx="minor">
+            <a:schemeClr val="tx1"/>
+          </a:fontRef>
+        </p:style>
+      </p:cxnSp>
+      <p:cxnSp>
+        <p:nvCxnSpPr>
+          <p:cNvPr id="1197" name="Straight Connector 1196">
+            <a:extLst>
+              <a:ext uri="{FF2B5EF4-FFF2-40B4-BE49-F238E27FC236}">
+                <a16:creationId xmlns:a16="http://schemas.microsoft.com/office/drawing/2014/main" id="{5B437DD7-1D52-FEB9-6A01-DBBF9E665527}"/>
+              </a:ext>
+            </a:extLst>
+          </p:cNvPr>
+          <p:cNvCxnSpPr>
+            <a:cxnSpLocks/>
+          </p:cNvCxnSpPr>
+          <p:nvPr/>
+        </p:nvCxnSpPr>
+        <p:spPr>
+          <a:xfrm flipV="1">
+            <a:off x="6928908" y="5343525"/>
+            <a:ext cx="0" cy="2114550"/>
+          </a:xfrm>
+          <a:prstGeom prst="line">
+            <a:avLst/>
+          </a:prstGeom>
+          <a:ln w="38100" cmpd="dbl">
+            <a:solidFill>
+              <a:schemeClr val="bg2">
+                <a:lumMod val="25000"/>
+              </a:schemeClr>
+            </a:solidFill>
+          </a:ln>
+        </p:spPr>
+        <p:style>
+          <a:lnRef idx="2">
+            <a:schemeClr val="accent1"/>
+          </a:lnRef>
+          <a:fillRef idx="0">
+            <a:schemeClr val="accent1"/>
+          </a:fillRef>
+          <a:effectRef idx="1">
+            <a:schemeClr val="accent1"/>
+          </a:effectRef>
+          <a:fontRef idx="minor">
+            <a:schemeClr val="tx1"/>
+          </a:fontRef>
+        </p:style>
+      </p:cxnSp>
+      <p:cxnSp>
+        <p:nvCxnSpPr>
+          <p:cNvPr id="1207" name="Straight Connector 1206">
+            <a:extLst>
+              <a:ext uri="{FF2B5EF4-FFF2-40B4-BE49-F238E27FC236}">
+                <a16:creationId xmlns:a16="http://schemas.microsoft.com/office/drawing/2014/main" id="{B31B91D0-9643-D8AF-455E-3E69F5903DE5}"/>
+              </a:ext>
+            </a:extLst>
+          </p:cNvPr>
+          <p:cNvCxnSpPr>
+            <a:cxnSpLocks/>
+          </p:cNvCxnSpPr>
+          <p:nvPr/>
+        </p:nvCxnSpPr>
+        <p:spPr>
+          <a:xfrm>
+            <a:off x="7953375" y="3899127"/>
+            <a:ext cx="423320" cy="0"/>
+          </a:xfrm>
+          <a:prstGeom prst="line">
+            <a:avLst/>
+          </a:prstGeom>
+          <a:ln w="38100">
+            <a:solidFill>
+              <a:schemeClr val="accent5">
+                <a:lumMod val="60000"/>
+                <a:lumOff val="40000"/>
+              </a:schemeClr>
+            </a:solidFill>
+          </a:ln>
+        </p:spPr>
+        <p:style>
+          <a:lnRef idx="2">
+            <a:schemeClr val="accent1"/>
+          </a:lnRef>
+          <a:fillRef idx="0">
+            <a:schemeClr val="accent1"/>
+          </a:fillRef>
+          <a:effectRef idx="1">
+            <a:schemeClr val="accent1"/>
+          </a:effectRef>
+          <a:fontRef idx="minor">
+            <a:schemeClr val="tx1"/>
+          </a:fontRef>
+        </p:style>
+      </p:cxnSp>
+      <p:cxnSp>
+        <p:nvCxnSpPr>
+          <p:cNvPr id="1209" name="Straight Connector 1208">
+            <a:extLst>
+              <a:ext uri="{FF2B5EF4-FFF2-40B4-BE49-F238E27FC236}">
+                <a16:creationId xmlns:a16="http://schemas.microsoft.com/office/drawing/2014/main" id="{FA0CDD07-29B7-F1B9-FFD0-96EC59E93EC9}"/>
+              </a:ext>
+            </a:extLst>
+          </p:cNvPr>
+          <p:cNvCxnSpPr>
+            <a:cxnSpLocks/>
+          </p:cNvCxnSpPr>
+          <p:nvPr/>
+        </p:nvCxnSpPr>
+        <p:spPr>
+          <a:xfrm>
+            <a:off x="7558820" y="5518377"/>
+            <a:ext cx="413605" cy="0"/>
+          </a:xfrm>
+          <a:prstGeom prst="line">
+            <a:avLst/>
+          </a:prstGeom>
+          <a:ln w="38100">
+            <a:solidFill>
+              <a:schemeClr val="accent5">
+                <a:lumMod val="60000"/>
+                <a:lumOff val="40000"/>
+              </a:schemeClr>
+            </a:solidFill>
+          </a:ln>
+        </p:spPr>
+        <p:style>
+          <a:lnRef idx="2">
+            <a:schemeClr val="accent1"/>
+          </a:lnRef>
+          <a:fillRef idx="0">
+            <a:schemeClr val="accent1"/>
+          </a:fillRef>
+          <a:effectRef idx="1">
+            <a:schemeClr val="accent1"/>
+          </a:effectRef>
+          <a:fontRef idx="minor">
+            <a:schemeClr val="tx1"/>
+          </a:fontRef>
+        </p:style>
+      </p:cxnSp>
+      <p:cxnSp>
+        <p:nvCxnSpPr>
+          <p:cNvPr id="1211" name="Straight Connector 1210">
+            <a:extLst>
+              <a:ext uri="{FF2B5EF4-FFF2-40B4-BE49-F238E27FC236}">
+                <a16:creationId xmlns:a16="http://schemas.microsoft.com/office/drawing/2014/main" id="{3FFA9011-4D69-744F-CDB6-F6BB185AB153}"/>
+              </a:ext>
+            </a:extLst>
+          </p:cNvPr>
+          <p:cNvCxnSpPr>
+            <a:cxnSpLocks/>
+          </p:cNvCxnSpPr>
+          <p:nvPr/>
+        </p:nvCxnSpPr>
+        <p:spPr>
+          <a:xfrm flipV="1">
+            <a:off x="7972425" y="3890142"/>
+            <a:ext cx="0" cy="1653408"/>
+          </a:xfrm>
+          <a:prstGeom prst="line">
+            <a:avLst/>
+          </a:prstGeom>
+          <a:ln w="38100">
+            <a:solidFill>
+              <a:schemeClr val="accent5">
+                <a:lumMod val="60000"/>
+                <a:lumOff val="40000"/>
+              </a:schemeClr>
+            </a:solidFill>
+          </a:ln>
+        </p:spPr>
+        <p:style>
+          <a:lnRef idx="2">
+            <a:schemeClr val="accent1"/>
+          </a:lnRef>
+          <a:fillRef idx="0">
+            <a:schemeClr val="accent1"/>
+          </a:fillRef>
+          <a:effectRef idx="1">
+            <a:schemeClr val="accent1"/>
+          </a:effectRef>
+          <a:fontRef idx="minor">
+            <a:schemeClr val="tx1"/>
+          </a:fontRef>
+        </p:style>
+      </p:cxnSp>
+      <p:cxnSp>
+        <p:nvCxnSpPr>
+          <p:cNvPr id="1222" name="Straight Connector 1221">
+            <a:extLst>
+              <a:ext uri="{FF2B5EF4-FFF2-40B4-BE49-F238E27FC236}">
+                <a16:creationId xmlns:a16="http://schemas.microsoft.com/office/drawing/2014/main" id="{C9E5D2EE-AA64-3AEA-84A5-41204DEC1A1E}"/>
+              </a:ext>
+            </a:extLst>
+          </p:cNvPr>
+          <p:cNvCxnSpPr>
+            <a:cxnSpLocks/>
+          </p:cNvCxnSpPr>
+          <p:nvPr/>
+        </p:nvCxnSpPr>
+        <p:spPr>
+          <a:xfrm>
+            <a:off x="2635250" y="3401844"/>
+            <a:ext cx="0" cy="2423300"/>
+          </a:xfrm>
+          <a:prstGeom prst="line">
+            <a:avLst/>
+          </a:prstGeom>
+          <a:ln w="38100">
+            <a:solidFill>
+              <a:schemeClr val="tx1"/>
+            </a:solidFill>
+          </a:ln>
+        </p:spPr>
+        <p:style>
+          <a:lnRef idx="2">
+            <a:schemeClr val="accent1"/>
+          </a:lnRef>
+          <a:fillRef idx="0">
+            <a:schemeClr val="accent1"/>
+          </a:fillRef>
+          <a:effectRef idx="1">
+            <a:schemeClr val="accent1"/>
+          </a:effectRef>
+          <a:fontRef idx="minor">
+            <a:schemeClr val="tx1"/>
+          </a:fontRef>
+        </p:style>
+      </p:cxnSp>
+      <p:cxnSp>
+        <p:nvCxnSpPr>
+          <p:cNvPr id="1224" name="Straight Connector 1223">
+            <a:extLst>
+              <a:ext uri="{FF2B5EF4-FFF2-40B4-BE49-F238E27FC236}">
+                <a16:creationId xmlns:a16="http://schemas.microsoft.com/office/drawing/2014/main" id="{AA8479D3-A65D-5719-F60D-48B45A3ACF6F}"/>
+              </a:ext>
+            </a:extLst>
+          </p:cNvPr>
+          <p:cNvCxnSpPr>
+            <a:cxnSpLocks/>
+          </p:cNvCxnSpPr>
+          <p:nvPr/>
+        </p:nvCxnSpPr>
+        <p:spPr>
+          <a:xfrm flipH="1">
+            <a:off x="2635250" y="5182213"/>
+            <a:ext cx="158750" cy="0"/>
+          </a:xfrm>
+          <a:prstGeom prst="line">
+            <a:avLst/>
+          </a:prstGeom>
+          <a:ln w="38100">
+            <a:solidFill>
+              <a:schemeClr val="tx1"/>
+            </a:solidFill>
+          </a:ln>
+        </p:spPr>
+        <p:style>
+          <a:lnRef idx="2">
+            <a:schemeClr val="accent1"/>
+          </a:lnRef>
+          <a:fillRef idx="0">
+            <a:schemeClr val="accent1"/>
+          </a:fillRef>
+          <a:effectRef idx="1">
+            <a:schemeClr val="accent1"/>
+          </a:effectRef>
+          <a:fontRef idx="minor">
+            <a:schemeClr val="tx1"/>
+          </a:fontRef>
+        </p:style>
+      </p:cxnSp>
+      <p:cxnSp>
+        <p:nvCxnSpPr>
+          <p:cNvPr id="1228" name="Straight Connector 1227">
+            <a:extLst>
+              <a:ext uri="{FF2B5EF4-FFF2-40B4-BE49-F238E27FC236}">
+                <a16:creationId xmlns:a16="http://schemas.microsoft.com/office/drawing/2014/main" id="{6B41C633-2B98-F4B6-B551-A58A84F5B628}"/>
+              </a:ext>
+            </a:extLst>
+          </p:cNvPr>
+          <p:cNvCxnSpPr>
+            <a:cxnSpLocks/>
+          </p:cNvCxnSpPr>
+          <p:nvPr/>
+        </p:nvCxnSpPr>
+        <p:spPr>
+          <a:xfrm>
+            <a:off x="2989789" y="3454538"/>
+            <a:ext cx="0" cy="2241412"/>
+          </a:xfrm>
+          <a:prstGeom prst="line">
+            <a:avLst/>
+          </a:prstGeom>
+          <a:ln w="38100">
+            <a:solidFill>
+              <a:schemeClr val="accent1">
+                <a:lumMod val="75000"/>
+              </a:schemeClr>
+            </a:solidFill>
+          </a:ln>
+        </p:spPr>
+        <p:style>
+          <a:lnRef idx="2">
+            <a:schemeClr val="accent1"/>
+          </a:lnRef>
+          <a:fillRef idx="0">
+            <a:schemeClr val="accent1"/>
+          </a:fillRef>
+          <a:effectRef idx="1">
+            <a:schemeClr val="accent1"/>
+          </a:effectRef>
+          <a:fontRef idx="minor">
+            <a:schemeClr val="tx1"/>
+          </a:fontRef>
+        </p:style>
+      </p:cxnSp>
+      <p:cxnSp>
+        <p:nvCxnSpPr>
+          <p:cNvPr id="1231" name="Straight Connector 1230">
+            <a:extLst>
+              <a:ext uri="{FF2B5EF4-FFF2-40B4-BE49-F238E27FC236}">
+                <a16:creationId xmlns:a16="http://schemas.microsoft.com/office/drawing/2014/main" id="{FCAE815A-6ADB-8F7F-80B2-EB8AA0D01F37}"/>
+              </a:ext>
+            </a:extLst>
+          </p:cNvPr>
+          <p:cNvCxnSpPr>
+            <a:cxnSpLocks/>
+          </p:cNvCxnSpPr>
+          <p:nvPr/>
+        </p:nvCxnSpPr>
+        <p:spPr>
+          <a:xfrm flipH="1">
+            <a:off x="2978073" y="5259496"/>
+            <a:ext cx="158750" cy="0"/>
+          </a:xfrm>
+          <a:prstGeom prst="line">
+            <a:avLst/>
+          </a:prstGeom>
+          <a:ln w="38100">
+            <a:solidFill>
+              <a:schemeClr val="accent1">
+                <a:lumMod val="75000"/>
+              </a:schemeClr>
+            </a:solidFill>
+          </a:ln>
+        </p:spPr>
+        <p:style>
+          <a:lnRef idx="2">
+            <a:schemeClr val="accent1"/>
+          </a:lnRef>
+          <a:fillRef idx="0">
+            <a:schemeClr val="accent1"/>
+          </a:fillRef>
+          <a:effectRef idx="1">
+            <a:schemeClr val="accent1"/>
+          </a:effectRef>
+          <a:fontRef idx="minor">
+            <a:schemeClr val="tx1"/>
+          </a:fontRef>
+        </p:style>
+      </p:cxnSp>
+      <p:cxnSp>
+        <p:nvCxnSpPr>
+          <p:cNvPr id="1234" name="Straight Connector 1233">
+            <a:extLst>
+              <a:ext uri="{FF2B5EF4-FFF2-40B4-BE49-F238E27FC236}">
+                <a16:creationId xmlns:a16="http://schemas.microsoft.com/office/drawing/2014/main" id="{1C08B4E7-400E-5D25-97DA-4B18AE4BBD55}"/>
+              </a:ext>
+            </a:extLst>
+          </p:cNvPr>
+          <p:cNvCxnSpPr>
+            <a:cxnSpLocks/>
+          </p:cNvCxnSpPr>
+          <p:nvPr/>
+        </p:nvCxnSpPr>
+        <p:spPr>
+          <a:xfrm flipV="1">
+            <a:off x="8469057" y="5975009"/>
+            <a:ext cx="0" cy="235102"/>
+          </a:xfrm>
+          <a:prstGeom prst="line">
+            <a:avLst/>
+          </a:prstGeom>
+          <a:ln w="38100">
+            <a:solidFill>
+              <a:srgbClr val="00B0F0"/>
+            </a:solidFill>
+          </a:ln>
+        </p:spPr>
+        <p:style>
+          <a:lnRef idx="2">
+            <a:schemeClr val="accent1"/>
+          </a:lnRef>
+          <a:fillRef idx="0">
+            <a:schemeClr val="accent1"/>
+          </a:fillRef>
+          <a:effectRef idx="1">
+            <a:schemeClr val="accent1"/>
+          </a:effectRef>
+          <a:fontRef idx="minor">
+            <a:schemeClr val="tx1"/>
+          </a:fontRef>
+        </p:style>
+      </p:cxnSp>
+      <p:cxnSp>
+        <p:nvCxnSpPr>
+          <p:cNvPr id="1236" name="Straight Connector 1235">
+            <a:extLst>
+              <a:ext uri="{FF2B5EF4-FFF2-40B4-BE49-F238E27FC236}">
+                <a16:creationId xmlns:a16="http://schemas.microsoft.com/office/drawing/2014/main" id="{66092858-2E03-3721-3BB0-6857DF640024}"/>
+              </a:ext>
+            </a:extLst>
+          </p:cNvPr>
+          <p:cNvCxnSpPr>
+            <a:cxnSpLocks/>
+          </p:cNvCxnSpPr>
+          <p:nvPr/>
+        </p:nvCxnSpPr>
+        <p:spPr>
+          <a:xfrm flipH="1">
+            <a:off x="3298825" y="6190073"/>
+            <a:ext cx="5165406" cy="0"/>
+          </a:xfrm>
+          <a:prstGeom prst="line">
+            <a:avLst/>
+          </a:prstGeom>
+          <a:ln w="38100">
+            <a:solidFill>
+              <a:srgbClr val="00B0F0"/>
+            </a:solidFill>
+          </a:ln>
+        </p:spPr>
+        <p:style>
+          <a:lnRef idx="2">
+            <a:schemeClr val="accent1"/>
+          </a:lnRef>
+          <a:fillRef idx="0">
+            <a:schemeClr val="accent1"/>
+          </a:fillRef>
+          <a:effectRef idx="1">
+            <a:schemeClr val="accent1"/>
+          </a:effectRef>
+          <a:fontRef idx="minor">
+            <a:schemeClr val="tx1"/>
+          </a:fontRef>
+        </p:style>
+      </p:cxnSp>
+      <p:cxnSp>
+        <p:nvCxnSpPr>
+          <p:cNvPr id="1239" name="Straight Connector 1238">
+            <a:extLst>
+              <a:ext uri="{FF2B5EF4-FFF2-40B4-BE49-F238E27FC236}">
+                <a16:creationId xmlns:a16="http://schemas.microsoft.com/office/drawing/2014/main" id="{03D3ADB5-D769-26F8-C7B6-82C7F8131A11}"/>
+              </a:ext>
+            </a:extLst>
+          </p:cNvPr>
+          <p:cNvCxnSpPr>
+            <a:cxnSpLocks/>
+          </p:cNvCxnSpPr>
+          <p:nvPr/>
+        </p:nvCxnSpPr>
+        <p:spPr>
+          <a:xfrm flipV="1">
+            <a:off x="3315188" y="5097796"/>
+            <a:ext cx="0" cy="1092277"/>
+          </a:xfrm>
+          <a:prstGeom prst="line">
+            <a:avLst/>
+          </a:prstGeom>
+          <a:ln w="38100">
+            <a:solidFill>
+              <a:srgbClr val="FFC000"/>
+            </a:solidFill>
+          </a:ln>
+        </p:spPr>
+        <p:style>
+          <a:lnRef idx="2">
+            <a:schemeClr val="accent1"/>
+          </a:lnRef>
+          <a:fillRef idx="0">
+            <a:schemeClr val="accent1"/>
+          </a:fillRef>
+          <a:effectRef idx="1">
+            <a:schemeClr val="accent1"/>
+          </a:effectRef>
+          <a:fontRef idx="minor">
+            <a:schemeClr val="tx1"/>
+          </a:fontRef>
+        </p:style>
+      </p:cxnSp>
+      <p:cxnSp>
+        <p:nvCxnSpPr>
+          <p:cNvPr id="1242" name="Straight Connector 1241">
+            <a:extLst>
+              <a:ext uri="{FF2B5EF4-FFF2-40B4-BE49-F238E27FC236}">
+                <a16:creationId xmlns:a16="http://schemas.microsoft.com/office/drawing/2014/main" id="{5C3101C7-7AD1-00C8-C46F-653504587C37}"/>
+              </a:ext>
+            </a:extLst>
+          </p:cNvPr>
+          <p:cNvCxnSpPr>
+            <a:cxnSpLocks/>
+          </p:cNvCxnSpPr>
+          <p:nvPr/>
+        </p:nvCxnSpPr>
+        <p:spPr>
+          <a:xfrm flipH="1">
+            <a:off x="3101588" y="5115597"/>
+            <a:ext cx="234543" cy="0"/>
+          </a:xfrm>
+          <a:prstGeom prst="line">
+            <a:avLst/>
+          </a:prstGeom>
+          <a:ln w="38100">
+            <a:solidFill>
+              <a:srgbClr val="FFC000"/>
+            </a:solidFill>
+          </a:ln>
+        </p:spPr>
+        <p:style>
+          <a:lnRef idx="2">
+            <a:schemeClr val="accent1"/>
+          </a:lnRef>
+          <a:fillRef idx="0">
+            <a:schemeClr val="accent1"/>
+          </a:fillRef>
+          <a:effectRef idx="1">
+            <a:schemeClr val="accent1"/>
+          </a:effectRef>
+          <a:fontRef idx="minor">
+            <a:schemeClr val="tx1"/>
+          </a:fontRef>
+        </p:style>
+      </p:cxnSp>
+      <p:cxnSp>
+        <p:nvCxnSpPr>
+          <p:cNvPr id="1246" name="Straight Connector 1245">
+            <a:extLst>
+              <a:ext uri="{FF2B5EF4-FFF2-40B4-BE49-F238E27FC236}">
+                <a16:creationId xmlns:a16="http://schemas.microsoft.com/office/drawing/2014/main" id="{5864A5DC-1204-D60F-824D-416BBA18C109}"/>
+              </a:ext>
+            </a:extLst>
+          </p:cNvPr>
+          <p:cNvCxnSpPr>
+            <a:cxnSpLocks/>
+          </p:cNvCxnSpPr>
+          <p:nvPr/>
+        </p:nvCxnSpPr>
+        <p:spPr>
+          <a:xfrm flipV="1">
+            <a:off x="3266502" y="3249347"/>
+            <a:ext cx="0" cy="1065965"/>
+          </a:xfrm>
+          <a:prstGeom prst="line">
+            <a:avLst/>
+          </a:prstGeom>
+          <a:ln w="38100">
+            <a:solidFill>
+              <a:srgbClr val="FFC000"/>
+            </a:solidFill>
+          </a:ln>
+        </p:spPr>
+        <p:style>
+          <a:lnRef idx="2">
+            <a:schemeClr val="accent1"/>
+          </a:lnRef>
+          <a:fillRef idx="0">
+            <a:schemeClr val="accent1"/>
+          </a:fillRef>
+          <a:effectRef idx="1">
+            <a:schemeClr val="accent1"/>
+          </a:effectRef>
+          <a:fontRef idx="minor">
+            <a:schemeClr val="tx1"/>
+          </a:fontRef>
+        </p:style>
+      </p:cxnSp>
+      <p:cxnSp>
+        <p:nvCxnSpPr>
+          <p:cNvPr id="1247" name="Straight Connector 1246">
+            <a:extLst>
+              <a:ext uri="{FF2B5EF4-FFF2-40B4-BE49-F238E27FC236}">
+                <a16:creationId xmlns:a16="http://schemas.microsoft.com/office/drawing/2014/main" id="{59DFCBBA-2139-E49D-8107-3A6536E5251A}"/>
+              </a:ext>
+            </a:extLst>
+          </p:cNvPr>
+          <p:cNvCxnSpPr>
+            <a:cxnSpLocks/>
+          </p:cNvCxnSpPr>
+          <p:nvPr/>
+        </p:nvCxnSpPr>
+        <p:spPr>
+          <a:xfrm flipH="1">
+            <a:off x="2971940" y="3254443"/>
+            <a:ext cx="304077" cy="0"/>
+          </a:xfrm>
+          <a:prstGeom prst="line">
+            <a:avLst/>
+          </a:prstGeom>
+          <a:ln w="38100">
+            <a:solidFill>
+              <a:srgbClr val="FFC000"/>
+            </a:solidFill>
+          </a:ln>
+        </p:spPr>
+        <p:style>
+          <a:lnRef idx="2">
+            <a:schemeClr val="accent1"/>
+          </a:lnRef>
+          <a:fillRef idx="0">
+            <a:schemeClr val="accent1"/>
+          </a:fillRef>
+          <a:effectRef idx="1">
+            <a:schemeClr val="accent1"/>
+          </a:effectRef>
+          <a:fontRef idx="minor">
+            <a:schemeClr val="tx1"/>
+          </a:fontRef>
+        </p:style>
+      </p:cxnSp>
+      <p:cxnSp>
+        <p:nvCxnSpPr>
+          <p:cNvPr id="1250" name="Straight Connector 1249">
+            <a:extLst>
+              <a:ext uri="{FF2B5EF4-FFF2-40B4-BE49-F238E27FC236}">
+                <a16:creationId xmlns:a16="http://schemas.microsoft.com/office/drawing/2014/main" id="{4C32E461-B9EB-46B5-0458-E41301651739}"/>
+              </a:ext>
+            </a:extLst>
+          </p:cNvPr>
+          <p:cNvCxnSpPr>
+            <a:cxnSpLocks/>
+          </p:cNvCxnSpPr>
+          <p:nvPr/>
+        </p:nvCxnSpPr>
+        <p:spPr>
+          <a:xfrm flipH="1">
+            <a:off x="1035050" y="4297241"/>
+            <a:ext cx="2238902" cy="0"/>
+          </a:xfrm>
+          <a:prstGeom prst="line">
+            <a:avLst/>
+          </a:prstGeom>
+          <a:ln w="38100">
+            <a:solidFill>
+              <a:srgbClr val="00B0F0"/>
+            </a:solidFill>
+          </a:ln>
+        </p:spPr>
+        <p:style>
+          <a:lnRef idx="2">
+            <a:schemeClr val="accent1"/>
+          </a:lnRef>
+          <a:fillRef idx="0">
+            <a:schemeClr val="accent1"/>
+          </a:fillRef>
+          <a:effectRef idx="1">
+            <a:schemeClr val="accent1"/>
+          </a:effectRef>
+          <a:fontRef idx="minor">
+            <a:schemeClr val="tx1"/>
+          </a:fontRef>
+        </p:style>
+      </p:cxnSp>
+      <p:cxnSp>
+        <p:nvCxnSpPr>
+          <p:cNvPr id="1253" name="Straight Connector 1252">
+            <a:extLst>
+              <a:ext uri="{FF2B5EF4-FFF2-40B4-BE49-F238E27FC236}">
+                <a16:creationId xmlns:a16="http://schemas.microsoft.com/office/drawing/2014/main" id="{76CB76FB-48CB-51CB-4305-DB53005E0E2D}"/>
+              </a:ext>
+            </a:extLst>
+          </p:cNvPr>
+          <p:cNvCxnSpPr>
+            <a:cxnSpLocks/>
+          </p:cNvCxnSpPr>
+          <p:nvPr/>
+        </p:nvCxnSpPr>
+        <p:spPr>
+          <a:xfrm flipV="1">
+            <a:off x="1031302" y="4281379"/>
+            <a:ext cx="0" cy="2379771"/>
+          </a:xfrm>
+          <a:prstGeom prst="line">
+            <a:avLst/>
+          </a:prstGeom>
+          <a:ln w="38100">
+            <a:solidFill>
+              <a:srgbClr val="00B0F0"/>
+            </a:solidFill>
+          </a:ln>
+        </p:spPr>
+        <p:style>
+          <a:lnRef idx="2">
+            <a:schemeClr val="accent1"/>
+          </a:lnRef>
+          <a:fillRef idx="0">
+            <a:schemeClr val="accent1"/>
+          </a:fillRef>
+          <a:effectRef idx="1">
+            <a:schemeClr val="accent1"/>
+          </a:effectRef>
+          <a:fontRef idx="minor">
+            <a:schemeClr val="tx1"/>
+          </a:fontRef>
+        </p:style>
+      </p:cxnSp>
+      <p:cxnSp>
+        <p:nvCxnSpPr>
+          <p:cNvPr id="1255" name="Straight Connector 1254">
+            <a:extLst>
+              <a:ext uri="{FF2B5EF4-FFF2-40B4-BE49-F238E27FC236}">
+                <a16:creationId xmlns:a16="http://schemas.microsoft.com/office/drawing/2014/main" id="{B8148F18-63D8-C86D-8E6C-2BD5C4E94D86}"/>
+              </a:ext>
+            </a:extLst>
+          </p:cNvPr>
+          <p:cNvCxnSpPr>
+            <a:cxnSpLocks/>
+          </p:cNvCxnSpPr>
+          <p:nvPr/>
+        </p:nvCxnSpPr>
+        <p:spPr>
+          <a:xfrm flipH="1">
+            <a:off x="8434389" y="5680196"/>
+            <a:ext cx="360361" cy="0"/>
+          </a:xfrm>
+          <a:prstGeom prst="line">
+            <a:avLst/>
+          </a:prstGeom>
+          <a:ln w="38100">
+            <a:solidFill>
+              <a:srgbClr val="00B0F0"/>
+            </a:solidFill>
+          </a:ln>
+        </p:spPr>
+        <p:style>
+          <a:lnRef idx="2">
+            <a:schemeClr val="accent1"/>
+          </a:lnRef>
+          <a:fillRef idx="0">
+            <a:schemeClr val="accent1"/>
+          </a:fillRef>
+          <a:effectRef idx="1">
+            <a:schemeClr val="accent1"/>
+          </a:effectRef>
+          <a:fontRef idx="minor">
+            <a:schemeClr val="tx1"/>
+          </a:fontRef>
+        </p:style>
+      </p:cxnSp>
+      <p:cxnSp>
+        <p:nvCxnSpPr>
+          <p:cNvPr id="1257" name="Straight Connector 1256">
+            <a:extLst>
+              <a:ext uri="{FF2B5EF4-FFF2-40B4-BE49-F238E27FC236}">
+                <a16:creationId xmlns:a16="http://schemas.microsoft.com/office/drawing/2014/main" id="{E0680223-12E6-CCCB-B1BB-71C44341D174}"/>
+              </a:ext>
+            </a:extLst>
+          </p:cNvPr>
+          <p:cNvCxnSpPr>
+            <a:cxnSpLocks/>
+          </p:cNvCxnSpPr>
+          <p:nvPr/>
+        </p:nvCxnSpPr>
+        <p:spPr>
+          <a:xfrm flipV="1">
+            <a:off x="8791585" y="5669235"/>
+            <a:ext cx="0" cy="968886"/>
+          </a:xfrm>
+          <a:prstGeom prst="line">
+            <a:avLst/>
+          </a:prstGeom>
+          <a:ln w="38100">
+            <a:solidFill>
+              <a:srgbClr val="00B0F0"/>
+            </a:solidFill>
+          </a:ln>
+        </p:spPr>
+        <p:style>
+          <a:lnRef idx="2">
+            <a:schemeClr val="accent1"/>
+          </a:lnRef>
+          <a:fillRef idx="0">
+            <a:schemeClr val="accent1"/>
+          </a:fillRef>
+          <a:effectRef idx="1">
+            <a:schemeClr val="accent1"/>
+          </a:effectRef>
+          <a:fontRef idx="minor">
+            <a:schemeClr val="tx1"/>
+          </a:fontRef>
+        </p:style>
+      </p:cxnSp>
+      <p:cxnSp>
+        <p:nvCxnSpPr>
+          <p:cNvPr id="1259" name="Straight Connector 1258">
+            <a:extLst>
+              <a:ext uri="{FF2B5EF4-FFF2-40B4-BE49-F238E27FC236}">
+                <a16:creationId xmlns:a16="http://schemas.microsoft.com/office/drawing/2014/main" id="{2601BA2A-7ACF-50B8-38E8-B15999FFAB1E}"/>
+              </a:ext>
+            </a:extLst>
+          </p:cNvPr>
+          <p:cNvCxnSpPr>
+            <a:cxnSpLocks/>
+          </p:cNvCxnSpPr>
+          <p:nvPr/>
+        </p:nvCxnSpPr>
+        <p:spPr>
+          <a:xfrm flipH="1">
+            <a:off x="1041400" y="6650821"/>
+            <a:ext cx="7770018" cy="0"/>
+          </a:xfrm>
+          <a:prstGeom prst="line">
+            <a:avLst/>
+          </a:prstGeom>
+          <a:ln w="38100">
+            <a:solidFill>
+              <a:srgbClr val="00B0F0"/>
+            </a:solidFill>
+          </a:ln>
+        </p:spPr>
+        <p:style>
+          <a:lnRef idx="2">
+            <a:schemeClr val="accent1"/>
+          </a:lnRef>
+          <a:fillRef idx="0">
+            <a:schemeClr val="accent1"/>
+          </a:fillRef>
+          <a:effectRef idx="1">
+            <a:schemeClr val="accent1"/>
+          </a:effectRef>
+          <a:fontRef idx="minor">
+            <a:schemeClr val="tx1"/>
+          </a:fontRef>
+        </p:style>
+      </p:cxnSp>
+      <p:cxnSp>
+        <p:nvCxnSpPr>
+          <p:cNvPr id="1263" name="Straight Connector 1262">
+            <a:extLst>
+              <a:ext uri="{FF2B5EF4-FFF2-40B4-BE49-F238E27FC236}">
+                <a16:creationId xmlns:a16="http://schemas.microsoft.com/office/drawing/2014/main" id="{2E1AE1E5-576E-9C5B-F857-21F2B657AD1A}"/>
+              </a:ext>
+            </a:extLst>
+          </p:cNvPr>
+          <p:cNvCxnSpPr>
+            <a:cxnSpLocks/>
+          </p:cNvCxnSpPr>
+          <p:nvPr/>
+        </p:nvCxnSpPr>
+        <p:spPr>
+          <a:xfrm flipV="1">
+            <a:off x="8645535" y="5505450"/>
+            <a:ext cx="0" cy="1428750"/>
+          </a:xfrm>
+          <a:prstGeom prst="line">
+            <a:avLst/>
+          </a:prstGeom>
+          <a:ln w="38100">
+            <a:solidFill>
               <a:schemeClr val="accent3">
                 <a:lumMod val="60000"/>
                 <a:lumOff val="40000"/>
@@ -6171,10 +8201,10 @@
       </p:cxnSp>
       <p:cxnSp>
         <p:nvCxnSpPr>
-          <p:cNvPr id="1036" name="Straight Connector 1035">
-            <a:extLst>
-              <a:ext uri="{FF2B5EF4-FFF2-40B4-BE49-F238E27FC236}">
-                <a16:creationId xmlns:a16="http://schemas.microsoft.com/office/drawing/2014/main" id="{41D34E39-8CA6-3605-D322-D66F50619FFE}"/>
+          <p:cNvPr id="1268" name="Straight Connector 1267">
+            <a:extLst>
+              <a:ext uri="{FF2B5EF4-FFF2-40B4-BE49-F238E27FC236}">
+                <a16:creationId xmlns:a16="http://schemas.microsoft.com/office/drawing/2014/main" id="{44D841F6-9BF4-4426-D9F7-4AD2E5801ED7}"/>
               </a:ext>
             </a:extLst>
           </p:cNvPr>
@@ -6185,1316 +8215,15 @@
         </p:nvCxnSpPr>
         <p:spPr>
           <a:xfrm flipH="1">
-            <a:off x="7398799" y="3890142"/>
-            <a:ext cx="180254" cy="0"/>
+            <a:off x="875682" y="6922166"/>
+            <a:ext cx="7770018" cy="0"/>
           </a:xfrm>
           <a:prstGeom prst="line">
             <a:avLst/>
           </a:prstGeom>
           <a:ln w="38100">
             <a:solidFill>
-              <a:srgbClr val="FF0000"/>
-            </a:solidFill>
-          </a:ln>
-        </p:spPr>
-        <p:style>
-          <a:lnRef idx="2">
-            <a:schemeClr val="accent1"/>
-          </a:lnRef>
-          <a:fillRef idx="0">
-            <a:schemeClr val="accent1"/>
-          </a:fillRef>
-          <a:effectRef idx="1">
-            <a:schemeClr val="accent1"/>
-          </a:effectRef>
-          <a:fontRef idx="minor">
-            <a:schemeClr val="tx1"/>
-          </a:fontRef>
-        </p:style>
-      </p:cxnSp>
-      <p:cxnSp>
-        <p:nvCxnSpPr>
-          <p:cNvPr id="1038" name="Straight Connector 1037">
-            <a:extLst>
-              <a:ext uri="{FF2B5EF4-FFF2-40B4-BE49-F238E27FC236}">
-                <a16:creationId xmlns:a16="http://schemas.microsoft.com/office/drawing/2014/main" id="{D30DCFD6-D0F0-1A56-B994-13F99BA1D425}"/>
-              </a:ext>
-            </a:extLst>
-          </p:cNvPr>
-          <p:cNvCxnSpPr>
-            <a:cxnSpLocks/>
-          </p:cNvCxnSpPr>
-          <p:nvPr/>
-        </p:nvCxnSpPr>
-        <p:spPr>
-          <a:xfrm flipH="1">
-            <a:off x="7339058" y="4022603"/>
-            <a:ext cx="233325" cy="0"/>
-          </a:xfrm>
-          <a:prstGeom prst="line">
-            <a:avLst/>
-          </a:prstGeom>
-          <a:ln w="38100">
-            <a:solidFill>
-              <a:schemeClr val="bg1"/>
-            </a:solidFill>
-          </a:ln>
-        </p:spPr>
-        <p:style>
-          <a:lnRef idx="2">
-            <a:schemeClr val="accent1"/>
-          </a:lnRef>
-          <a:fillRef idx="0">
-            <a:schemeClr val="accent1"/>
-          </a:fillRef>
-          <a:effectRef idx="1">
-            <a:schemeClr val="accent1"/>
-          </a:effectRef>
-          <a:fontRef idx="minor">
-            <a:schemeClr val="tx1"/>
-          </a:fontRef>
-        </p:style>
-      </p:cxnSp>
-      <p:cxnSp>
-        <p:nvCxnSpPr>
-          <p:cNvPr id="1045" name="Straight Connector 1044">
-            <a:extLst>
-              <a:ext uri="{FF2B5EF4-FFF2-40B4-BE49-F238E27FC236}">
-                <a16:creationId xmlns:a16="http://schemas.microsoft.com/office/drawing/2014/main" id="{F2AD5D75-D949-374C-AA8B-B5BA9155F2C6}"/>
-              </a:ext>
-            </a:extLst>
-          </p:cNvPr>
-          <p:cNvCxnSpPr>
-            <a:cxnSpLocks/>
-          </p:cNvCxnSpPr>
-          <p:nvPr/>
-        </p:nvCxnSpPr>
-        <p:spPr>
-          <a:xfrm flipV="1">
-            <a:off x="7179723" y="2330925"/>
-            <a:ext cx="0" cy="1836844"/>
-          </a:xfrm>
-          <a:prstGeom prst="line">
-            <a:avLst/>
-          </a:prstGeom>
-          <a:ln w="38100">
-            <a:solidFill>
-              <a:srgbClr val="FF0000"/>
-            </a:solidFill>
-          </a:ln>
-        </p:spPr>
-        <p:style>
-          <a:lnRef idx="2">
-            <a:schemeClr val="accent1"/>
-          </a:lnRef>
-          <a:fillRef idx="0">
-            <a:schemeClr val="accent1"/>
-          </a:fillRef>
-          <a:effectRef idx="1">
-            <a:schemeClr val="accent1"/>
-          </a:effectRef>
-          <a:fontRef idx="minor">
-            <a:schemeClr val="tx1"/>
-          </a:fontRef>
-        </p:style>
-      </p:cxnSp>
-      <p:cxnSp>
-        <p:nvCxnSpPr>
-          <p:cNvPr id="1048" name="Straight Connector 1047">
-            <a:extLst>
-              <a:ext uri="{FF2B5EF4-FFF2-40B4-BE49-F238E27FC236}">
-                <a16:creationId xmlns:a16="http://schemas.microsoft.com/office/drawing/2014/main" id="{C9A2F697-C2C9-5713-9196-199A85DC02BE}"/>
-              </a:ext>
-            </a:extLst>
-          </p:cNvPr>
-          <p:cNvCxnSpPr>
-            <a:cxnSpLocks/>
-          </p:cNvCxnSpPr>
-          <p:nvPr/>
-        </p:nvCxnSpPr>
-        <p:spPr>
-          <a:xfrm flipH="1">
-            <a:off x="7198537" y="4151191"/>
-            <a:ext cx="380516" cy="0"/>
-          </a:xfrm>
-          <a:prstGeom prst="line">
-            <a:avLst/>
-          </a:prstGeom>
-          <a:ln w="38100">
-            <a:solidFill>
-              <a:srgbClr val="FF0000"/>
-            </a:solidFill>
-          </a:ln>
-        </p:spPr>
-        <p:style>
-          <a:lnRef idx="2">
-            <a:schemeClr val="accent1"/>
-          </a:lnRef>
-          <a:fillRef idx="0">
-            <a:schemeClr val="accent1"/>
-          </a:fillRef>
-          <a:effectRef idx="1">
-            <a:schemeClr val="accent1"/>
-          </a:effectRef>
-          <a:fontRef idx="minor">
-            <a:schemeClr val="tx1"/>
-          </a:fontRef>
-        </p:style>
-      </p:cxnSp>
-      <p:cxnSp>
-        <p:nvCxnSpPr>
-          <p:cNvPr id="1072" name="Straight Connector 1071">
-            <a:extLst>
-              <a:ext uri="{FF2B5EF4-FFF2-40B4-BE49-F238E27FC236}">
-                <a16:creationId xmlns:a16="http://schemas.microsoft.com/office/drawing/2014/main" id="{D7EE408A-CA8F-7DA2-D34E-9ECF1ECC72C1}"/>
-              </a:ext>
-            </a:extLst>
-          </p:cNvPr>
-          <p:cNvCxnSpPr>
-            <a:cxnSpLocks/>
-          </p:cNvCxnSpPr>
-          <p:nvPr/>
-        </p:nvCxnSpPr>
-        <p:spPr>
-          <a:xfrm flipH="1">
-            <a:off x="7104243" y="4304966"/>
-            <a:ext cx="474810" cy="0"/>
-          </a:xfrm>
-          <a:prstGeom prst="line">
-            <a:avLst/>
-          </a:prstGeom>
-          <a:ln w="38100">
-            <a:solidFill>
-              <a:schemeClr val="bg1"/>
-            </a:solidFill>
-          </a:ln>
-        </p:spPr>
-        <p:style>
-          <a:lnRef idx="2">
-            <a:schemeClr val="accent1"/>
-          </a:lnRef>
-          <a:fillRef idx="0">
-            <a:schemeClr val="accent1"/>
-          </a:fillRef>
-          <a:effectRef idx="1">
-            <a:schemeClr val="accent1"/>
-          </a:effectRef>
-          <a:fontRef idx="minor">
-            <a:schemeClr val="tx1"/>
-          </a:fontRef>
-        </p:style>
-      </p:cxnSp>
-      <p:cxnSp>
-        <p:nvCxnSpPr>
-          <p:cNvPr id="1105" name="Straight Connector 1104">
-            <a:extLst>
-              <a:ext uri="{FF2B5EF4-FFF2-40B4-BE49-F238E27FC236}">
-                <a16:creationId xmlns:a16="http://schemas.microsoft.com/office/drawing/2014/main" id="{0E998F13-ECE2-8F2D-5471-4D165CFCFC6F}"/>
-              </a:ext>
-            </a:extLst>
-          </p:cNvPr>
-          <p:cNvCxnSpPr>
-            <a:cxnSpLocks/>
-          </p:cNvCxnSpPr>
-          <p:nvPr/>
-        </p:nvCxnSpPr>
-        <p:spPr>
-          <a:xfrm flipH="1">
-            <a:off x="8394796" y="3473405"/>
-            <a:ext cx="306292" cy="0"/>
-          </a:xfrm>
-          <a:prstGeom prst="line">
-            <a:avLst/>
-          </a:prstGeom>
-          <a:ln w="38100" cmpd="sng">
-            <a:solidFill>
-              <a:schemeClr val="accent5">
-                <a:lumMod val="75000"/>
-              </a:schemeClr>
-            </a:solidFill>
-            <a:prstDash val="solid"/>
-            <a:round/>
-          </a:ln>
-        </p:spPr>
-        <p:style>
-          <a:lnRef idx="2">
-            <a:schemeClr val="accent1"/>
-          </a:lnRef>
-          <a:fillRef idx="0">
-            <a:schemeClr val="accent1"/>
-          </a:fillRef>
-          <a:effectRef idx="1">
-            <a:schemeClr val="accent1"/>
-          </a:effectRef>
-          <a:fontRef idx="minor">
-            <a:schemeClr val="tx1"/>
-          </a:fontRef>
-        </p:style>
-      </p:cxnSp>
-      <p:cxnSp>
-        <p:nvCxnSpPr>
-          <p:cNvPr id="1109" name="Straight Connector 1108">
-            <a:extLst>
-              <a:ext uri="{FF2B5EF4-FFF2-40B4-BE49-F238E27FC236}">
-                <a16:creationId xmlns:a16="http://schemas.microsoft.com/office/drawing/2014/main" id="{1A1D4365-DBB9-D75D-E31E-87F587A7D0F3}"/>
-              </a:ext>
-            </a:extLst>
-          </p:cNvPr>
-          <p:cNvCxnSpPr>
-            <a:cxnSpLocks/>
-          </p:cNvCxnSpPr>
-          <p:nvPr/>
-        </p:nvCxnSpPr>
-        <p:spPr>
-          <a:xfrm flipV="1">
-            <a:off x="8696326" y="3454461"/>
-            <a:ext cx="0" cy="1603314"/>
-          </a:xfrm>
-          <a:prstGeom prst="line">
-            <a:avLst/>
-          </a:prstGeom>
-          <a:ln w="38100" cmpd="sng">
-            <a:solidFill>
-              <a:schemeClr val="accent5">
-                <a:lumMod val="75000"/>
-              </a:schemeClr>
-            </a:solidFill>
-            <a:prstDash val="solid"/>
-            <a:round/>
-          </a:ln>
-        </p:spPr>
-        <p:style>
-          <a:lnRef idx="2">
-            <a:schemeClr val="accent1"/>
-          </a:lnRef>
-          <a:fillRef idx="0">
-            <a:schemeClr val="accent1"/>
-          </a:fillRef>
-          <a:effectRef idx="1">
-            <a:schemeClr val="accent1"/>
-          </a:effectRef>
-          <a:fontRef idx="minor">
-            <a:schemeClr val="tx1"/>
-          </a:fontRef>
-        </p:style>
-      </p:cxnSp>
-      <p:cxnSp>
-        <p:nvCxnSpPr>
-          <p:cNvPr id="1115" name="Straight Connector 1114">
-            <a:extLst>
-              <a:ext uri="{FF2B5EF4-FFF2-40B4-BE49-F238E27FC236}">
-                <a16:creationId xmlns:a16="http://schemas.microsoft.com/office/drawing/2014/main" id="{9AC671A4-4F9A-8520-4D39-2ED31BBA57CE}"/>
-              </a:ext>
-            </a:extLst>
-          </p:cNvPr>
-          <p:cNvCxnSpPr>
-            <a:cxnSpLocks/>
-          </p:cNvCxnSpPr>
-          <p:nvPr/>
-        </p:nvCxnSpPr>
-        <p:spPr>
-          <a:xfrm flipH="1">
-            <a:off x="8438804" y="5046617"/>
-            <a:ext cx="236853" cy="0"/>
-          </a:xfrm>
-          <a:prstGeom prst="line">
-            <a:avLst/>
-          </a:prstGeom>
-          <a:ln w="38100" cmpd="sng">
-            <a:solidFill>
-              <a:schemeClr val="accent5">
-                <a:lumMod val="75000"/>
-              </a:schemeClr>
-            </a:solidFill>
-            <a:prstDash val="solid"/>
-            <a:round/>
-          </a:ln>
-        </p:spPr>
-        <p:style>
-          <a:lnRef idx="2">
-            <a:schemeClr val="accent1"/>
-          </a:lnRef>
-          <a:fillRef idx="0">
-            <a:schemeClr val="accent1"/>
-          </a:fillRef>
-          <a:effectRef idx="1">
-            <a:schemeClr val="accent1"/>
-          </a:effectRef>
-          <a:fontRef idx="minor">
-            <a:schemeClr val="tx1"/>
-          </a:fontRef>
-        </p:style>
-      </p:cxnSp>
-      <p:cxnSp>
-        <p:nvCxnSpPr>
-          <p:cNvPr id="1118" name="Straight Connector 1117">
-            <a:extLst>
-              <a:ext uri="{FF2B5EF4-FFF2-40B4-BE49-F238E27FC236}">
-                <a16:creationId xmlns:a16="http://schemas.microsoft.com/office/drawing/2014/main" id="{0443605E-96C3-FFA7-59B4-7A02CE29DD34}"/>
-              </a:ext>
-            </a:extLst>
-          </p:cNvPr>
-          <p:cNvCxnSpPr>
-            <a:cxnSpLocks/>
-          </p:cNvCxnSpPr>
-          <p:nvPr/>
-        </p:nvCxnSpPr>
-        <p:spPr>
-          <a:xfrm flipH="1">
-            <a:off x="8394792" y="3613478"/>
-            <a:ext cx="387258" cy="0"/>
-          </a:xfrm>
-          <a:prstGeom prst="line">
-            <a:avLst/>
-          </a:prstGeom>
-          <a:ln w="38100" cmpd="thickThin">
-            <a:solidFill>
-              <a:schemeClr val="accent5">
-                <a:lumMod val="75000"/>
-              </a:schemeClr>
-            </a:solidFill>
-          </a:ln>
-        </p:spPr>
-        <p:style>
-          <a:lnRef idx="2">
-            <a:schemeClr val="accent1"/>
-          </a:lnRef>
-          <a:fillRef idx="0">
-            <a:schemeClr val="accent1"/>
-          </a:fillRef>
-          <a:effectRef idx="1">
-            <a:schemeClr val="accent1"/>
-          </a:effectRef>
-          <a:fontRef idx="minor">
-            <a:schemeClr val="tx1"/>
-          </a:fontRef>
-        </p:style>
-      </p:cxnSp>
-      <p:cxnSp>
-        <p:nvCxnSpPr>
-          <p:cNvPr id="1120" name="Straight Connector 1119">
-            <a:extLst>
-              <a:ext uri="{FF2B5EF4-FFF2-40B4-BE49-F238E27FC236}">
-                <a16:creationId xmlns:a16="http://schemas.microsoft.com/office/drawing/2014/main" id="{F2CC7E69-A96F-C3A2-91C5-BE485B378C9C}"/>
-              </a:ext>
-            </a:extLst>
-          </p:cNvPr>
-          <p:cNvCxnSpPr>
-            <a:cxnSpLocks/>
-          </p:cNvCxnSpPr>
-          <p:nvPr/>
-        </p:nvCxnSpPr>
-        <p:spPr>
-          <a:xfrm flipV="1">
-            <a:off x="8788005" y="3590925"/>
-            <a:ext cx="0" cy="1628775"/>
-          </a:xfrm>
-          <a:prstGeom prst="line">
-            <a:avLst/>
-          </a:prstGeom>
-          <a:ln w="38100" cmpd="thickThin">
-            <a:solidFill>
-              <a:schemeClr val="accent5">
-                <a:lumMod val="75000"/>
-              </a:schemeClr>
-            </a:solidFill>
-          </a:ln>
-        </p:spPr>
-        <p:style>
-          <a:lnRef idx="2">
-            <a:schemeClr val="accent1"/>
-          </a:lnRef>
-          <a:fillRef idx="0">
-            <a:schemeClr val="accent1"/>
-          </a:fillRef>
-          <a:effectRef idx="1">
-            <a:schemeClr val="accent1"/>
-          </a:effectRef>
-          <a:fontRef idx="minor">
-            <a:schemeClr val="tx1"/>
-          </a:fontRef>
-        </p:style>
-      </p:cxnSp>
-      <p:cxnSp>
-        <p:nvCxnSpPr>
-          <p:cNvPr id="1121" name="Straight Connector 1120">
-            <a:extLst>
-              <a:ext uri="{FF2B5EF4-FFF2-40B4-BE49-F238E27FC236}">
-                <a16:creationId xmlns:a16="http://schemas.microsoft.com/office/drawing/2014/main" id="{6F0577C7-3B3E-B0B3-076B-EF0FD0B0C45D}"/>
-              </a:ext>
-            </a:extLst>
-          </p:cNvPr>
-          <p:cNvCxnSpPr>
-            <a:cxnSpLocks/>
-          </p:cNvCxnSpPr>
-          <p:nvPr/>
-        </p:nvCxnSpPr>
-        <p:spPr>
-          <a:xfrm flipH="1">
-            <a:off x="8464231" y="5210500"/>
-            <a:ext cx="327344" cy="0"/>
-          </a:xfrm>
-          <a:prstGeom prst="line">
-            <a:avLst/>
-          </a:prstGeom>
-          <a:ln w="38100" cmpd="thickThin">
-            <a:solidFill>
-              <a:schemeClr val="accent5">
-                <a:lumMod val="75000"/>
-              </a:schemeClr>
-            </a:solidFill>
-          </a:ln>
-        </p:spPr>
-        <p:style>
-          <a:lnRef idx="2">
-            <a:schemeClr val="accent1"/>
-          </a:lnRef>
-          <a:fillRef idx="0">
-            <a:schemeClr val="accent1"/>
-          </a:fillRef>
-          <a:effectRef idx="1">
-            <a:schemeClr val="accent1"/>
-          </a:effectRef>
-          <a:fontRef idx="minor">
-            <a:schemeClr val="tx1"/>
-          </a:fontRef>
-        </p:style>
-      </p:cxnSp>
-      <p:cxnSp>
-        <p:nvCxnSpPr>
-          <p:cNvPr id="1125" name="Straight Connector 1124">
-            <a:extLst>
-              <a:ext uri="{FF2B5EF4-FFF2-40B4-BE49-F238E27FC236}">
-                <a16:creationId xmlns:a16="http://schemas.microsoft.com/office/drawing/2014/main" id="{E13949AC-F6D2-F48B-3FDF-79900A1D8DCC}"/>
-              </a:ext>
-            </a:extLst>
-          </p:cNvPr>
-          <p:cNvCxnSpPr>
-            <a:cxnSpLocks/>
-          </p:cNvCxnSpPr>
-          <p:nvPr/>
-        </p:nvCxnSpPr>
-        <p:spPr>
-          <a:xfrm flipH="1">
-            <a:off x="8394796" y="3753550"/>
-            <a:ext cx="484886" cy="0"/>
-          </a:xfrm>
-          <a:prstGeom prst="line">
-            <a:avLst/>
-          </a:prstGeom>
-          <a:ln w="38100" cmpd="dbl">
-            <a:solidFill>
-              <a:schemeClr val="accent5">
-                <a:lumMod val="75000"/>
-              </a:schemeClr>
-            </a:solidFill>
-          </a:ln>
-        </p:spPr>
-        <p:style>
-          <a:lnRef idx="2">
-            <a:schemeClr val="accent1"/>
-          </a:lnRef>
-          <a:fillRef idx="0">
-            <a:schemeClr val="accent1"/>
-          </a:fillRef>
-          <a:effectRef idx="1">
-            <a:schemeClr val="accent1"/>
-          </a:effectRef>
-          <a:fontRef idx="minor">
-            <a:schemeClr val="tx1"/>
-          </a:fontRef>
-        </p:style>
-      </p:cxnSp>
-      <p:cxnSp>
-        <p:nvCxnSpPr>
-          <p:cNvPr id="1126" name="Straight Connector 1125">
-            <a:extLst>
-              <a:ext uri="{FF2B5EF4-FFF2-40B4-BE49-F238E27FC236}">
-                <a16:creationId xmlns:a16="http://schemas.microsoft.com/office/drawing/2014/main" id="{A87DB142-59BF-0566-CC9E-8EF4EEFB0ECF}"/>
-              </a:ext>
-            </a:extLst>
-          </p:cNvPr>
-          <p:cNvCxnSpPr>
-            <a:cxnSpLocks/>
-          </p:cNvCxnSpPr>
-          <p:nvPr/>
-        </p:nvCxnSpPr>
-        <p:spPr>
-          <a:xfrm flipV="1">
-            <a:off x="8879684" y="3731431"/>
-            <a:ext cx="0" cy="1659719"/>
-          </a:xfrm>
-          <a:prstGeom prst="line">
-            <a:avLst/>
-          </a:prstGeom>
-          <a:ln w="38100" cmpd="dbl">
-            <a:solidFill>
-              <a:schemeClr val="accent5">
-                <a:lumMod val="75000"/>
-              </a:schemeClr>
-            </a:solidFill>
-          </a:ln>
-        </p:spPr>
-        <p:style>
-          <a:lnRef idx="2">
-            <a:schemeClr val="accent1"/>
-          </a:lnRef>
-          <a:fillRef idx="0">
-            <a:schemeClr val="accent1"/>
-          </a:fillRef>
-          <a:effectRef idx="1">
-            <a:schemeClr val="accent1"/>
-          </a:effectRef>
-          <a:fontRef idx="minor">
-            <a:schemeClr val="tx1"/>
-          </a:fontRef>
-        </p:style>
-      </p:cxnSp>
-      <p:cxnSp>
-        <p:nvCxnSpPr>
-          <p:cNvPr id="1127" name="Straight Connector 1126">
-            <a:extLst>
-              <a:ext uri="{FF2B5EF4-FFF2-40B4-BE49-F238E27FC236}">
-                <a16:creationId xmlns:a16="http://schemas.microsoft.com/office/drawing/2014/main" id="{FC783D8A-6C73-94A8-422B-35D5C97FE300}"/>
-              </a:ext>
-            </a:extLst>
-          </p:cNvPr>
-          <p:cNvCxnSpPr>
-            <a:cxnSpLocks/>
-          </p:cNvCxnSpPr>
-          <p:nvPr/>
-        </p:nvCxnSpPr>
-        <p:spPr>
-          <a:xfrm flipH="1">
-            <a:off x="8453438" y="5368034"/>
-            <a:ext cx="435769" cy="0"/>
-          </a:xfrm>
-          <a:prstGeom prst="line">
-            <a:avLst/>
-          </a:prstGeom>
-          <a:ln w="38100" cmpd="dbl">
-            <a:solidFill>
-              <a:schemeClr val="accent5">
-                <a:lumMod val="75000"/>
-              </a:schemeClr>
-            </a:solidFill>
-          </a:ln>
-        </p:spPr>
-        <p:style>
-          <a:lnRef idx="2">
-            <a:schemeClr val="accent1"/>
-          </a:lnRef>
-          <a:fillRef idx="0">
-            <a:schemeClr val="accent1"/>
-          </a:fillRef>
-          <a:effectRef idx="1">
-            <a:schemeClr val="accent1"/>
-          </a:effectRef>
-          <a:fontRef idx="minor">
-            <a:schemeClr val="tx1"/>
-          </a:fontRef>
-        </p:style>
-      </p:cxnSp>
-      <p:cxnSp>
-        <p:nvCxnSpPr>
-          <p:cNvPr id="1143" name="Straight Connector 1142">
-            <a:extLst>
-              <a:ext uri="{FF2B5EF4-FFF2-40B4-BE49-F238E27FC236}">
-                <a16:creationId xmlns:a16="http://schemas.microsoft.com/office/drawing/2014/main" id="{08C43701-FA0C-B39B-BAC7-65BEE8D5B834}"/>
-              </a:ext>
-            </a:extLst>
-          </p:cNvPr>
-          <p:cNvCxnSpPr>
-            <a:cxnSpLocks/>
-          </p:cNvCxnSpPr>
-          <p:nvPr/>
-        </p:nvCxnSpPr>
-        <p:spPr>
-          <a:xfrm flipH="1">
-            <a:off x="8394796" y="4299905"/>
-            <a:ext cx="611595" cy="0"/>
-          </a:xfrm>
-          <a:prstGeom prst="line">
-            <a:avLst/>
-          </a:prstGeom>
-          <a:ln w="38100">
-            <a:solidFill>
-              <a:schemeClr val="bg2">
-                <a:lumMod val="25000"/>
-              </a:schemeClr>
-            </a:solidFill>
-          </a:ln>
-        </p:spPr>
-        <p:style>
-          <a:lnRef idx="2">
-            <a:schemeClr val="accent1"/>
-          </a:lnRef>
-          <a:fillRef idx="0">
-            <a:schemeClr val="accent1"/>
-          </a:fillRef>
-          <a:effectRef idx="1">
-            <a:schemeClr val="accent1"/>
-          </a:effectRef>
-          <a:fontRef idx="minor">
-            <a:schemeClr val="tx1"/>
-          </a:fontRef>
-        </p:style>
-      </p:cxnSp>
-      <p:cxnSp>
-        <p:nvCxnSpPr>
-          <p:cNvPr id="1144" name="Straight Connector 1143">
-            <a:extLst>
-              <a:ext uri="{FF2B5EF4-FFF2-40B4-BE49-F238E27FC236}">
-                <a16:creationId xmlns:a16="http://schemas.microsoft.com/office/drawing/2014/main" id="{B9795412-6CC3-CAD4-A4BB-26AB98702FC6}"/>
-              </a:ext>
-            </a:extLst>
-          </p:cNvPr>
-          <p:cNvCxnSpPr>
-            <a:cxnSpLocks/>
-          </p:cNvCxnSpPr>
-          <p:nvPr/>
-        </p:nvCxnSpPr>
-        <p:spPr>
-          <a:xfrm flipV="1">
-            <a:off x="9001629" y="4277786"/>
-            <a:ext cx="0" cy="2830725"/>
-          </a:xfrm>
-          <a:prstGeom prst="line">
-            <a:avLst/>
-          </a:prstGeom>
-          <a:ln w="38100">
-            <a:solidFill>
-              <a:schemeClr val="bg2">
-                <a:lumMod val="25000"/>
-              </a:schemeClr>
-            </a:solidFill>
-          </a:ln>
-        </p:spPr>
-        <p:style>
-          <a:lnRef idx="2">
-            <a:schemeClr val="accent1"/>
-          </a:lnRef>
-          <a:fillRef idx="0">
-            <a:schemeClr val="accent1"/>
-          </a:fillRef>
-          <a:effectRef idx="1">
-            <a:schemeClr val="accent1"/>
-          </a:effectRef>
-          <a:fontRef idx="minor">
-            <a:schemeClr val="tx1"/>
-          </a:fontRef>
-        </p:style>
-      </p:cxnSp>
-      <p:cxnSp>
-        <p:nvCxnSpPr>
-          <p:cNvPr id="1145" name="Straight Connector 1144">
-            <a:extLst>
-              <a:ext uri="{FF2B5EF4-FFF2-40B4-BE49-F238E27FC236}">
-                <a16:creationId xmlns:a16="http://schemas.microsoft.com/office/drawing/2014/main" id="{5815556F-5658-BA4A-0D9A-6D503CE4DC9E}"/>
-              </a:ext>
-            </a:extLst>
-          </p:cNvPr>
-          <p:cNvCxnSpPr>
-            <a:cxnSpLocks/>
-          </p:cNvCxnSpPr>
-          <p:nvPr/>
-        </p:nvCxnSpPr>
-        <p:spPr>
-          <a:xfrm flipH="1">
-            <a:off x="7398799" y="7095178"/>
-            <a:ext cx="1607592" cy="0"/>
-          </a:xfrm>
-          <a:prstGeom prst="line">
-            <a:avLst/>
-          </a:prstGeom>
-          <a:ln w="38100">
-            <a:solidFill>
-              <a:schemeClr val="bg2">
-                <a:lumMod val="25000"/>
-              </a:schemeClr>
-            </a:solidFill>
-          </a:ln>
-        </p:spPr>
-        <p:style>
-          <a:lnRef idx="2">
-            <a:schemeClr val="accent1"/>
-          </a:lnRef>
-          <a:fillRef idx="0">
-            <a:schemeClr val="accent1"/>
-          </a:fillRef>
-          <a:effectRef idx="1">
-            <a:schemeClr val="accent1"/>
-          </a:effectRef>
-          <a:fontRef idx="minor">
-            <a:schemeClr val="tx1"/>
-          </a:fontRef>
-        </p:style>
-      </p:cxnSp>
-      <p:cxnSp>
-        <p:nvCxnSpPr>
-          <p:cNvPr id="1147" name="Straight Connector 1146">
-            <a:extLst>
-              <a:ext uri="{FF2B5EF4-FFF2-40B4-BE49-F238E27FC236}">
-                <a16:creationId xmlns:a16="http://schemas.microsoft.com/office/drawing/2014/main" id="{2BD7C420-B270-FEB8-B068-5076E2BE159F}"/>
-              </a:ext>
-            </a:extLst>
-          </p:cNvPr>
-          <p:cNvCxnSpPr>
-            <a:cxnSpLocks/>
-          </p:cNvCxnSpPr>
-          <p:nvPr/>
-        </p:nvCxnSpPr>
-        <p:spPr>
-          <a:xfrm flipH="1">
-            <a:off x="8401384" y="4026481"/>
-            <a:ext cx="964866" cy="0"/>
-          </a:xfrm>
-          <a:prstGeom prst="line">
-            <a:avLst/>
-          </a:prstGeom>
-          <a:ln w="38100" cmpd="dbl">
-            <a:solidFill>
-              <a:schemeClr val="bg2">
-                <a:lumMod val="25000"/>
-              </a:schemeClr>
-            </a:solidFill>
-          </a:ln>
-        </p:spPr>
-        <p:style>
-          <a:lnRef idx="2">
-            <a:schemeClr val="accent1"/>
-          </a:lnRef>
-          <a:fillRef idx="0">
-            <a:schemeClr val="accent1"/>
-          </a:fillRef>
-          <a:effectRef idx="1">
-            <a:schemeClr val="accent1"/>
-          </a:effectRef>
-          <a:fontRef idx="minor">
-            <a:schemeClr val="tx1"/>
-          </a:fontRef>
-        </p:style>
-      </p:cxnSp>
-      <p:cxnSp>
-        <p:nvCxnSpPr>
-          <p:cNvPr id="1148" name="Straight Connector 1147">
-            <a:extLst>
-              <a:ext uri="{FF2B5EF4-FFF2-40B4-BE49-F238E27FC236}">
-                <a16:creationId xmlns:a16="http://schemas.microsoft.com/office/drawing/2014/main" id="{A3DB7831-78AB-F4CB-4A2E-02051DC8E052}"/>
-              </a:ext>
-            </a:extLst>
-          </p:cNvPr>
-          <p:cNvCxnSpPr>
-            <a:cxnSpLocks/>
-          </p:cNvCxnSpPr>
-          <p:nvPr/>
-        </p:nvCxnSpPr>
-        <p:spPr>
-          <a:xfrm flipV="1">
-            <a:off x="9335558" y="4000757"/>
-            <a:ext cx="0" cy="3447234"/>
-          </a:xfrm>
-          <a:prstGeom prst="line">
-            <a:avLst/>
-          </a:prstGeom>
-          <a:ln w="38100" cmpd="dbl">
-            <a:solidFill>
-              <a:schemeClr val="bg2">
-                <a:lumMod val="25000"/>
-              </a:schemeClr>
-            </a:solidFill>
-          </a:ln>
-        </p:spPr>
-        <p:style>
-          <a:lnRef idx="2">
-            <a:schemeClr val="accent1"/>
-          </a:lnRef>
-          <a:fillRef idx="0">
-            <a:schemeClr val="accent1"/>
-          </a:fillRef>
-          <a:effectRef idx="1">
-            <a:schemeClr val="accent1"/>
-          </a:effectRef>
-          <a:fontRef idx="minor">
-            <a:schemeClr val="tx1"/>
-          </a:fontRef>
-        </p:style>
-      </p:cxnSp>
-      <p:cxnSp>
-        <p:nvCxnSpPr>
-          <p:cNvPr id="1165" name="Straight Connector 1164">
-            <a:extLst>
-              <a:ext uri="{FF2B5EF4-FFF2-40B4-BE49-F238E27FC236}">
-                <a16:creationId xmlns:a16="http://schemas.microsoft.com/office/drawing/2014/main" id="{FEF0A87C-0F7E-C80F-1AC8-B9D2A140C2E4}"/>
-              </a:ext>
-            </a:extLst>
-          </p:cNvPr>
-          <p:cNvCxnSpPr>
-            <a:cxnSpLocks/>
-          </p:cNvCxnSpPr>
-          <p:nvPr/>
-        </p:nvCxnSpPr>
-        <p:spPr>
-          <a:xfrm flipH="1">
-            <a:off x="8394796" y="4151191"/>
-            <a:ext cx="768254" cy="0"/>
-          </a:xfrm>
-          <a:prstGeom prst="line">
-            <a:avLst/>
-          </a:prstGeom>
-          <a:ln w="38100" cmpd="thickThin">
-            <a:solidFill>
-              <a:schemeClr val="bg2">
-                <a:lumMod val="25000"/>
-              </a:schemeClr>
-            </a:solidFill>
-          </a:ln>
-        </p:spPr>
-        <p:style>
-          <a:lnRef idx="2">
-            <a:schemeClr val="accent1"/>
-          </a:lnRef>
-          <a:fillRef idx="0">
-            <a:schemeClr val="accent1"/>
-          </a:fillRef>
-          <a:effectRef idx="1">
-            <a:schemeClr val="accent1"/>
-          </a:effectRef>
-          <a:fontRef idx="minor">
-            <a:schemeClr val="tx1"/>
-          </a:fontRef>
-        </p:style>
-      </p:cxnSp>
-      <p:cxnSp>
-        <p:nvCxnSpPr>
-          <p:cNvPr id="1169" name="Straight Connector 1168">
-            <a:extLst>
-              <a:ext uri="{FF2B5EF4-FFF2-40B4-BE49-F238E27FC236}">
-                <a16:creationId xmlns:a16="http://schemas.microsoft.com/office/drawing/2014/main" id="{DCECDAC3-5BE1-F093-79E8-6F531A911C63}"/>
-              </a:ext>
-            </a:extLst>
-          </p:cNvPr>
-          <p:cNvCxnSpPr>
-            <a:cxnSpLocks/>
-          </p:cNvCxnSpPr>
-          <p:nvPr/>
-        </p:nvCxnSpPr>
-        <p:spPr>
-          <a:xfrm flipH="1">
-            <a:off x="7388795" y="5058730"/>
-            <a:ext cx="190258" cy="0"/>
-          </a:xfrm>
-          <a:prstGeom prst="line">
-            <a:avLst/>
-          </a:prstGeom>
-          <a:ln w="38100">
-            <a:solidFill>
-              <a:schemeClr val="bg2">
-                <a:lumMod val="25000"/>
-              </a:schemeClr>
-            </a:solidFill>
-          </a:ln>
-        </p:spPr>
-        <p:style>
-          <a:lnRef idx="2">
-            <a:schemeClr val="accent1"/>
-          </a:lnRef>
-          <a:fillRef idx="0">
-            <a:schemeClr val="accent1"/>
-          </a:fillRef>
-          <a:effectRef idx="1">
-            <a:schemeClr val="accent1"/>
-          </a:effectRef>
-          <a:fontRef idx="minor">
-            <a:schemeClr val="tx1"/>
-          </a:fontRef>
-        </p:style>
-      </p:cxnSp>
-      <p:cxnSp>
-        <p:nvCxnSpPr>
-          <p:cNvPr id="1171" name="Straight Connector 1170">
-            <a:extLst>
-              <a:ext uri="{FF2B5EF4-FFF2-40B4-BE49-F238E27FC236}">
-                <a16:creationId xmlns:a16="http://schemas.microsoft.com/office/drawing/2014/main" id="{D17FDE0C-5D68-2DE1-23C0-7128FE15C172}"/>
-              </a:ext>
-            </a:extLst>
-          </p:cNvPr>
-          <p:cNvCxnSpPr>
-            <a:cxnSpLocks/>
-          </p:cNvCxnSpPr>
-          <p:nvPr/>
-        </p:nvCxnSpPr>
-        <p:spPr>
-          <a:xfrm flipV="1">
-            <a:off x="7377078" y="5051425"/>
-            <a:ext cx="0" cy="2057086"/>
-          </a:xfrm>
-          <a:prstGeom prst="line">
-            <a:avLst/>
-          </a:prstGeom>
-          <a:ln w="38100">
-            <a:solidFill>
-              <a:schemeClr val="bg2">
-                <a:lumMod val="25000"/>
-              </a:schemeClr>
-            </a:solidFill>
-          </a:ln>
-        </p:spPr>
-        <p:style>
-          <a:lnRef idx="2">
-            <a:schemeClr val="accent1"/>
-          </a:lnRef>
-          <a:fillRef idx="0">
-            <a:schemeClr val="accent1"/>
-          </a:fillRef>
-          <a:effectRef idx="1">
-            <a:schemeClr val="accent1"/>
-          </a:effectRef>
-          <a:fontRef idx="minor">
-            <a:schemeClr val="tx1"/>
-          </a:fontRef>
-        </p:style>
-      </p:cxnSp>
-      <p:cxnSp>
-        <p:nvCxnSpPr>
-          <p:cNvPr id="1177" name="Straight Connector 1176">
-            <a:extLst>
-              <a:ext uri="{FF2B5EF4-FFF2-40B4-BE49-F238E27FC236}">
-                <a16:creationId xmlns:a16="http://schemas.microsoft.com/office/drawing/2014/main" id="{5CD046CB-C3AD-F950-5B3A-E2DCB6C25329}"/>
-              </a:ext>
-            </a:extLst>
-          </p:cNvPr>
-          <p:cNvCxnSpPr>
-            <a:cxnSpLocks/>
-          </p:cNvCxnSpPr>
-          <p:nvPr/>
-        </p:nvCxnSpPr>
-        <p:spPr>
-          <a:xfrm flipV="1">
-            <a:off x="9168593" y="4151191"/>
-            <a:ext cx="0" cy="3114286"/>
-          </a:xfrm>
-          <a:prstGeom prst="line">
-            <a:avLst/>
-          </a:prstGeom>
-          <a:ln w="38100" cmpd="thickThin">
-            <a:solidFill>
-              <a:schemeClr val="bg2">
-                <a:lumMod val="25000"/>
-              </a:schemeClr>
-            </a:solidFill>
-          </a:ln>
-        </p:spPr>
-        <p:style>
-          <a:lnRef idx="2">
-            <a:schemeClr val="accent1"/>
-          </a:lnRef>
-          <a:fillRef idx="0">
-            <a:schemeClr val="accent1"/>
-          </a:fillRef>
-          <a:effectRef idx="1">
-            <a:schemeClr val="accent1"/>
-          </a:effectRef>
-          <a:fontRef idx="minor">
-            <a:schemeClr val="tx1"/>
-          </a:fontRef>
-        </p:style>
-      </p:cxnSp>
-      <p:cxnSp>
-        <p:nvCxnSpPr>
-          <p:cNvPr id="1182" name="Straight Connector 1181">
-            <a:extLst>
-              <a:ext uri="{FF2B5EF4-FFF2-40B4-BE49-F238E27FC236}">
-                <a16:creationId xmlns:a16="http://schemas.microsoft.com/office/drawing/2014/main" id="{BC30FF90-E2AC-C50E-E9CF-CEF09385F4FB}"/>
-              </a:ext>
-            </a:extLst>
-          </p:cNvPr>
-          <p:cNvCxnSpPr>
-            <a:cxnSpLocks/>
-          </p:cNvCxnSpPr>
-          <p:nvPr/>
-        </p:nvCxnSpPr>
-        <p:spPr>
-          <a:xfrm flipV="1">
-            <a:off x="7133943" y="5191125"/>
-            <a:ext cx="0" cy="2074352"/>
-          </a:xfrm>
-          <a:prstGeom prst="line">
-            <a:avLst/>
-          </a:prstGeom>
-          <a:ln w="38100" cmpd="thickThin">
-            <a:solidFill>
-              <a:schemeClr val="bg2">
-                <a:lumMod val="25000"/>
-              </a:schemeClr>
-            </a:solidFill>
-          </a:ln>
-        </p:spPr>
-        <p:style>
-          <a:lnRef idx="2">
-            <a:schemeClr val="accent1"/>
-          </a:lnRef>
-          <a:fillRef idx="0">
-            <a:schemeClr val="accent1"/>
-          </a:fillRef>
-          <a:effectRef idx="1">
-            <a:schemeClr val="accent1"/>
-          </a:effectRef>
-          <a:fontRef idx="minor">
-            <a:schemeClr val="tx1"/>
-          </a:fontRef>
-        </p:style>
-      </p:cxnSp>
-      <p:cxnSp>
-        <p:nvCxnSpPr>
-          <p:cNvPr id="1183" name="Straight Connector 1182">
-            <a:extLst>
-              <a:ext uri="{FF2B5EF4-FFF2-40B4-BE49-F238E27FC236}">
-                <a16:creationId xmlns:a16="http://schemas.microsoft.com/office/drawing/2014/main" id="{B1D009FE-F575-C9DF-7CE0-9D6123C82354}"/>
-              </a:ext>
-            </a:extLst>
-          </p:cNvPr>
-          <p:cNvCxnSpPr>
-            <a:cxnSpLocks/>
-          </p:cNvCxnSpPr>
-          <p:nvPr/>
-        </p:nvCxnSpPr>
-        <p:spPr>
-          <a:xfrm flipH="1">
-            <a:off x="7149291" y="5214118"/>
-            <a:ext cx="429762" cy="0"/>
-          </a:xfrm>
-          <a:prstGeom prst="line">
-            <a:avLst/>
-          </a:prstGeom>
-          <a:ln w="38100" cmpd="thickThin">
-            <a:solidFill>
-              <a:schemeClr val="bg2">
-                <a:lumMod val="25000"/>
-              </a:schemeClr>
-            </a:solidFill>
-          </a:ln>
-        </p:spPr>
-        <p:style>
-          <a:lnRef idx="2">
-            <a:schemeClr val="accent1"/>
-          </a:lnRef>
-          <a:fillRef idx="0">
-            <a:schemeClr val="accent1"/>
-          </a:fillRef>
-          <a:effectRef idx="1">
-            <a:schemeClr val="accent1"/>
-          </a:effectRef>
-          <a:fontRef idx="minor">
-            <a:schemeClr val="tx1"/>
-          </a:fontRef>
-        </p:style>
-      </p:cxnSp>
-      <p:cxnSp>
-        <p:nvCxnSpPr>
-          <p:cNvPr id="1186" name="Straight Connector 1185">
-            <a:extLst>
-              <a:ext uri="{FF2B5EF4-FFF2-40B4-BE49-F238E27FC236}">
-                <a16:creationId xmlns:a16="http://schemas.microsoft.com/office/drawing/2014/main" id="{908320B9-BDF1-1910-0D70-61E3E84C31CB}"/>
-              </a:ext>
-            </a:extLst>
-          </p:cNvPr>
-          <p:cNvCxnSpPr>
-            <a:cxnSpLocks/>
-          </p:cNvCxnSpPr>
-          <p:nvPr/>
-        </p:nvCxnSpPr>
-        <p:spPr>
-          <a:xfrm flipH="1">
-            <a:off x="7115784" y="7259175"/>
-            <a:ext cx="2072666" cy="0"/>
-          </a:xfrm>
-          <a:prstGeom prst="line">
-            <a:avLst/>
-          </a:prstGeom>
-          <a:ln w="38100" cmpd="thickThin">
-            <a:solidFill>
-              <a:schemeClr val="bg2">
-                <a:lumMod val="25000"/>
-              </a:schemeClr>
-            </a:solidFill>
-          </a:ln>
-        </p:spPr>
-        <p:style>
-          <a:lnRef idx="2">
-            <a:schemeClr val="accent1"/>
-          </a:lnRef>
-          <a:fillRef idx="0">
-            <a:schemeClr val="accent1"/>
-          </a:fillRef>
-          <a:effectRef idx="1">
-            <a:schemeClr val="accent1"/>
-          </a:effectRef>
-          <a:fontRef idx="minor">
-            <a:schemeClr val="tx1"/>
-          </a:fontRef>
-        </p:style>
-      </p:cxnSp>
-      <p:cxnSp>
-        <p:nvCxnSpPr>
-          <p:cNvPr id="1192" name="Straight Connector 1191">
-            <a:extLst>
-              <a:ext uri="{FF2B5EF4-FFF2-40B4-BE49-F238E27FC236}">
-                <a16:creationId xmlns:a16="http://schemas.microsoft.com/office/drawing/2014/main" id="{36FD166D-67EB-5C41-343C-C9B9ABCBA76D}"/>
-              </a:ext>
-            </a:extLst>
-          </p:cNvPr>
-          <p:cNvCxnSpPr>
-            <a:cxnSpLocks/>
-          </p:cNvCxnSpPr>
-          <p:nvPr/>
-        </p:nvCxnSpPr>
-        <p:spPr>
-          <a:xfrm flipH="1">
-            <a:off x="6927850" y="7423172"/>
-            <a:ext cx="2400300" cy="24819"/>
-          </a:xfrm>
-          <a:prstGeom prst="line">
-            <a:avLst/>
-          </a:prstGeom>
-          <a:ln w="38100" cmpd="dbl">
-            <a:solidFill>
-              <a:schemeClr val="bg2">
-                <a:lumMod val="25000"/>
-              </a:schemeClr>
-            </a:solidFill>
-          </a:ln>
-        </p:spPr>
-        <p:style>
-          <a:lnRef idx="2">
-            <a:schemeClr val="accent1"/>
-          </a:lnRef>
-          <a:fillRef idx="0">
-            <a:schemeClr val="accent1"/>
-          </a:fillRef>
-          <a:effectRef idx="1">
-            <a:schemeClr val="accent1"/>
-          </a:effectRef>
-          <a:fontRef idx="minor">
-            <a:schemeClr val="tx1"/>
-          </a:fontRef>
-        </p:style>
-      </p:cxnSp>
-      <p:cxnSp>
-        <p:nvCxnSpPr>
-          <p:cNvPr id="1195" name="Straight Connector 1194">
-            <a:extLst>
-              <a:ext uri="{FF2B5EF4-FFF2-40B4-BE49-F238E27FC236}">
-                <a16:creationId xmlns:a16="http://schemas.microsoft.com/office/drawing/2014/main" id="{0AE5D181-A139-E172-89B9-0D9689CDEA91}"/>
-              </a:ext>
-            </a:extLst>
-          </p:cNvPr>
-          <p:cNvCxnSpPr>
-            <a:cxnSpLocks/>
-          </p:cNvCxnSpPr>
-          <p:nvPr/>
-        </p:nvCxnSpPr>
-        <p:spPr>
-          <a:xfrm flipH="1">
-            <a:off x="6926257" y="5363156"/>
-            <a:ext cx="646126" cy="0"/>
-          </a:xfrm>
-          <a:prstGeom prst="line">
-            <a:avLst/>
-          </a:prstGeom>
-          <a:ln w="38100" cmpd="dbl">
-            <a:solidFill>
-              <a:schemeClr val="bg2">
-                <a:lumMod val="25000"/>
-              </a:schemeClr>
-            </a:solidFill>
-          </a:ln>
-        </p:spPr>
-        <p:style>
-          <a:lnRef idx="2">
-            <a:schemeClr val="accent1"/>
-          </a:lnRef>
-          <a:fillRef idx="0">
-            <a:schemeClr val="accent1"/>
-          </a:fillRef>
-          <a:effectRef idx="1">
-            <a:schemeClr val="accent1"/>
-          </a:effectRef>
-          <a:fontRef idx="minor">
-            <a:schemeClr val="tx1"/>
-          </a:fontRef>
-        </p:style>
-      </p:cxnSp>
-      <p:cxnSp>
-        <p:nvCxnSpPr>
-          <p:cNvPr id="1197" name="Straight Connector 1196">
-            <a:extLst>
-              <a:ext uri="{FF2B5EF4-FFF2-40B4-BE49-F238E27FC236}">
-                <a16:creationId xmlns:a16="http://schemas.microsoft.com/office/drawing/2014/main" id="{5B437DD7-1D52-FEB9-6A01-DBBF9E665527}"/>
-              </a:ext>
-            </a:extLst>
-          </p:cNvPr>
-          <p:cNvCxnSpPr>
-            <a:cxnSpLocks/>
-          </p:cNvCxnSpPr>
-          <p:nvPr/>
-        </p:nvCxnSpPr>
-        <p:spPr>
-          <a:xfrm flipV="1">
-            <a:off x="6928908" y="5343525"/>
-            <a:ext cx="0" cy="2114550"/>
-          </a:xfrm>
-          <a:prstGeom prst="line">
-            <a:avLst/>
-          </a:prstGeom>
-          <a:ln w="38100" cmpd="dbl">
-            <a:solidFill>
-              <a:schemeClr val="bg2">
-                <a:lumMod val="25000"/>
-              </a:schemeClr>
-            </a:solidFill>
-          </a:ln>
-        </p:spPr>
-        <p:style>
-          <a:lnRef idx="2">
-            <a:schemeClr val="accent1"/>
-          </a:lnRef>
-          <a:fillRef idx="0">
-            <a:schemeClr val="accent1"/>
-          </a:fillRef>
-          <a:effectRef idx="1">
-            <a:schemeClr val="accent1"/>
-          </a:effectRef>
-          <a:fontRef idx="minor">
-            <a:schemeClr val="tx1"/>
-          </a:fontRef>
-        </p:style>
-      </p:cxnSp>
-      <p:cxnSp>
-        <p:nvCxnSpPr>
-          <p:cNvPr id="1207" name="Straight Connector 1206">
-            <a:extLst>
-              <a:ext uri="{FF2B5EF4-FFF2-40B4-BE49-F238E27FC236}">
-                <a16:creationId xmlns:a16="http://schemas.microsoft.com/office/drawing/2014/main" id="{B31B91D0-9643-D8AF-455E-3E69F5903DE5}"/>
-              </a:ext>
-            </a:extLst>
-          </p:cNvPr>
-          <p:cNvCxnSpPr>
-            <a:cxnSpLocks/>
-          </p:cNvCxnSpPr>
-          <p:nvPr/>
-        </p:nvCxnSpPr>
-        <p:spPr>
-          <a:xfrm>
-            <a:off x="7953375" y="3899127"/>
-            <a:ext cx="423320" cy="0"/>
-          </a:xfrm>
-          <a:prstGeom prst="line">
-            <a:avLst/>
-          </a:prstGeom>
-          <a:ln w="38100">
-            <a:solidFill>
-              <a:schemeClr val="accent5">
+              <a:schemeClr val="accent3">
                 <a:lumMod val="60000"/>
                 <a:lumOff val="40000"/>
               </a:schemeClr>
@@ -7518,29 +8247,29 @@
       </p:cxnSp>
       <p:cxnSp>
         <p:nvCxnSpPr>
-          <p:cNvPr id="1209" name="Straight Connector 1208">
-            <a:extLst>
-              <a:ext uri="{FF2B5EF4-FFF2-40B4-BE49-F238E27FC236}">
-                <a16:creationId xmlns:a16="http://schemas.microsoft.com/office/drawing/2014/main" id="{FA0CDD07-29B7-F1B9-FFD0-96EC59E93EC9}"/>
-              </a:ext>
-            </a:extLst>
-          </p:cNvPr>
-          <p:cNvCxnSpPr>
-            <a:cxnSpLocks/>
-          </p:cNvCxnSpPr>
-          <p:nvPr/>
-        </p:nvCxnSpPr>
-        <p:spPr>
-          <a:xfrm>
-            <a:off x="7558820" y="5518377"/>
-            <a:ext cx="413605" cy="0"/>
+          <p:cNvPr id="1269" name="Straight Connector 1268">
+            <a:extLst>
+              <a:ext uri="{FF2B5EF4-FFF2-40B4-BE49-F238E27FC236}">
+                <a16:creationId xmlns:a16="http://schemas.microsoft.com/office/drawing/2014/main" id="{96014400-274D-11F2-A939-B7D2838AE68A}"/>
+              </a:ext>
+            </a:extLst>
+          </p:cNvPr>
+          <p:cNvCxnSpPr>
+            <a:cxnSpLocks/>
+          </p:cNvCxnSpPr>
+          <p:nvPr/>
+        </p:nvCxnSpPr>
+        <p:spPr>
+          <a:xfrm flipV="1">
+            <a:off x="881888" y="4167769"/>
+            <a:ext cx="0" cy="2770668"/>
           </a:xfrm>
           <a:prstGeom prst="line">
             <a:avLst/>
           </a:prstGeom>
           <a:ln w="38100">
             <a:solidFill>
-              <a:schemeClr val="accent5">
+              <a:schemeClr val="accent3">
                 <a:lumMod val="60000"/>
                 <a:lumOff val="40000"/>
               </a:schemeClr>
@@ -7564,29 +8293,29 @@
       </p:cxnSp>
       <p:cxnSp>
         <p:nvCxnSpPr>
-          <p:cNvPr id="1211" name="Straight Connector 1210">
-            <a:extLst>
-              <a:ext uri="{FF2B5EF4-FFF2-40B4-BE49-F238E27FC236}">
-                <a16:creationId xmlns:a16="http://schemas.microsoft.com/office/drawing/2014/main" id="{3FFA9011-4D69-744F-CDB6-F6BB185AB153}"/>
-              </a:ext>
-            </a:extLst>
-          </p:cNvPr>
-          <p:cNvCxnSpPr>
-            <a:cxnSpLocks/>
-          </p:cNvCxnSpPr>
-          <p:nvPr/>
-        </p:nvCxnSpPr>
-        <p:spPr>
-          <a:xfrm flipV="1">
-            <a:off x="7972425" y="3890142"/>
-            <a:ext cx="0" cy="1653408"/>
+          <p:cNvPr id="1271" name="Straight Connector 1270">
+            <a:extLst>
+              <a:ext uri="{FF2B5EF4-FFF2-40B4-BE49-F238E27FC236}">
+                <a16:creationId xmlns:a16="http://schemas.microsoft.com/office/drawing/2014/main" id="{53C14AC3-0E8D-266F-F606-2800919F2CA9}"/>
+              </a:ext>
+            </a:extLst>
+          </p:cNvPr>
+          <p:cNvCxnSpPr>
+            <a:cxnSpLocks/>
+          </p:cNvCxnSpPr>
+          <p:nvPr/>
+        </p:nvCxnSpPr>
+        <p:spPr>
+          <a:xfrm flipH="1">
+            <a:off x="869188" y="4157541"/>
+            <a:ext cx="2238902" cy="0"/>
           </a:xfrm>
           <a:prstGeom prst="line">
             <a:avLst/>
           </a:prstGeom>
           <a:ln w="38100">
             <a:solidFill>
-              <a:schemeClr val="accent5">
+              <a:schemeClr val="accent3">
                 <a:lumMod val="60000"/>
                 <a:lumOff val="40000"/>
               </a:schemeClr>
@@ -7610,870 +8339,6 @@
       </p:cxnSp>
       <p:cxnSp>
         <p:nvCxnSpPr>
-          <p:cNvPr id="1222" name="Straight Connector 1221">
-            <a:extLst>
-              <a:ext uri="{FF2B5EF4-FFF2-40B4-BE49-F238E27FC236}">
-                <a16:creationId xmlns:a16="http://schemas.microsoft.com/office/drawing/2014/main" id="{C9E5D2EE-AA64-3AEA-84A5-41204DEC1A1E}"/>
-              </a:ext>
-            </a:extLst>
-          </p:cNvPr>
-          <p:cNvCxnSpPr>
-            <a:cxnSpLocks/>
-          </p:cNvCxnSpPr>
-          <p:nvPr/>
-        </p:nvCxnSpPr>
-        <p:spPr>
-          <a:xfrm>
-            <a:off x="2635250" y="3401844"/>
-            <a:ext cx="0" cy="3140077"/>
-          </a:xfrm>
-          <a:prstGeom prst="line">
-            <a:avLst/>
-          </a:prstGeom>
-          <a:ln w="38100">
-            <a:solidFill>
-              <a:schemeClr val="tx1"/>
-            </a:solidFill>
-          </a:ln>
-        </p:spPr>
-        <p:style>
-          <a:lnRef idx="2">
-            <a:schemeClr val="accent1"/>
-          </a:lnRef>
-          <a:fillRef idx="0">
-            <a:schemeClr val="accent1"/>
-          </a:fillRef>
-          <a:effectRef idx="1">
-            <a:schemeClr val="accent1"/>
-          </a:effectRef>
-          <a:fontRef idx="minor">
-            <a:schemeClr val="tx1"/>
-          </a:fontRef>
-        </p:style>
-      </p:cxnSp>
-      <p:cxnSp>
-        <p:nvCxnSpPr>
-          <p:cNvPr id="1224" name="Straight Connector 1223">
-            <a:extLst>
-              <a:ext uri="{FF2B5EF4-FFF2-40B4-BE49-F238E27FC236}">
-                <a16:creationId xmlns:a16="http://schemas.microsoft.com/office/drawing/2014/main" id="{AA8479D3-A65D-5719-F60D-48B45A3ACF6F}"/>
-              </a:ext>
-            </a:extLst>
-          </p:cNvPr>
-          <p:cNvCxnSpPr>
-            <a:cxnSpLocks/>
-          </p:cNvCxnSpPr>
-          <p:nvPr/>
-        </p:nvCxnSpPr>
-        <p:spPr>
-          <a:xfrm flipH="1">
-            <a:off x="2635250" y="5182213"/>
-            <a:ext cx="158750" cy="0"/>
-          </a:xfrm>
-          <a:prstGeom prst="line">
-            <a:avLst/>
-          </a:prstGeom>
-          <a:ln w="38100">
-            <a:solidFill>
-              <a:schemeClr val="tx1"/>
-            </a:solidFill>
-          </a:ln>
-        </p:spPr>
-        <p:style>
-          <a:lnRef idx="2">
-            <a:schemeClr val="accent1"/>
-          </a:lnRef>
-          <a:fillRef idx="0">
-            <a:schemeClr val="accent1"/>
-          </a:fillRef>
-          <a:effectRef idx="1">
-            <a:schemeClr val="accent1"/>
-          </a:effectRef>
-          <a:fontRef idx="minor">
-            <a:schemeClr val="tx1"/>
-          </a:fontRef>
-        </p:style>
-      </p:cxnSp>
-      <p:cxnSp>
-        <p:nvCxnSpPr>
-          <p:cNvPr id="1228" name="Straight Connector 1227">
-            <a:extLst>
-              <a:ext uri="{FF2B5EF4-FFF2-40B4-BE49-F238E27FC236}">
-                <a16:creationId xmlns:a16="http://schemas.microsoft.com/office/drawing/2014/main" id="{6B41C633-2B98-F4B6-B551-A58A84F5B628}"/>
-              </a:ext>
-            </a:extLst>
-          </p:cNvPr>
-          <p:cNvCxnSpPr>
-            <a:cxnSpLocks/>
-          </p:cNvCxnSpPr>
-          <p:nvPr/>
-        </p:nvCxnSpPr>
-        <p:spPr>
-          <a:xfrm>
-            <a:off x="2989789" y="3454538"/>
-            <a:ext cx="0" cy="2918986"/>
-          </a:xfrm>
-          <a:prstGeom prst="line">
-            <a:avLst/>
-          </a:prstGeom>
-          <a:ln w="38100">
-            <a:solidFill>
-              <a:schemeClr val="accent1">
-                <a:lumMod val="75000"/>
-              </a:schemeClr>
-            </a:solidFill>
-          </a:ln>
-        </p:spPr>
-        <p:style>
-          <a:lnRef idx="2">
-            <a:schemeClr val="accent1"/>
-          </a:lnRef>
-          <a:fillRef idx="0">
-            <a:schemeClr val="accent1"/>
-          </a:fillRef>
-          <a:effectRef idx="1">
-            <a:schemeClr val="accent1"/>
-          </a:effectRef>
-          <a:fontRef idx="minor">
-            <a:schemeClr val="tx1"/>
-          </a:fontRef>
-        </p:style>
-      </p:cxnSp>
-      <p:cxnSp>
-        <p:nvCxnSpPr>
-          <p:cNvPr id="1231" name="Straight Connector 1230">
-            <a:extLst>
-              <a:ext uri="{FF2B5EF4-FFF2-40B4-BE49-F238E27FC236}">
-                <a16:creationId xmlns:a16="http://schemas.microsoft.com/office/drawing/2014/main" id="{FCAE815A-6ADB-8F7F-80B2-EB8AA0D01F37}"/>
-              </a:ext>
-            </a:extLst>
-          </p:cNvPr>
-          <p:cNvCxnSpPr>
-            <a:cxnSpLocks/>
-          </p:cNvCxnSpPr>
-          <p:nvPr/>
-        </p:nvCxnSpPr>
-        <p:spPr>
-          <a:xfrm flipH="1">
-            <a:off x="2978073" y="5259496"/>
-            <a:ext cx="158750" cy="0"/>
-          </a:xfrm>
-          <a:prstGeom prst="line">
-            <a:avLst/>
-          </a:prstGeom>
-          <a:ln w="38100">
-            <a:solidFill>
-              <a:schemeClr val="accent1">
-                <a:lumMod val="75000"/>
-              </a:schemeClr>
-            </a:solidFill>
-          </a:ln>
-        </p:spPr>
-        <p:style>
-          <a:lnRef idx="2">
-            <a:schemeClr val="accent1"/>
-          </a:lnRef>
-          <a:fillRef idx="0">
-            <a:schemeClr val="accent1"/>
-          </a:fillRef>
-          <a:effectRef idx="1">
-            <a:schemeClr val="accent1"/>
-          </a:effectRef>
-          <a:fontRef idx="minor">
-            <a:schemeClr val="tx1"/>
-          </a:fontRef>
-        </p:style>
-      </p:cxnSp>
-      <p:cxnSp>
-        <p:nvCxnSpPr>
-          <p:cNvPr id="1232" name="Straight Connector 1231">
-            <a:extLst>
-              <a:ext uri="{FF2B5EF4-FFF2-40B4-BE49-F238E27FC236}">
-                <a16:creationId xmlns:a16="http://schemas.microsoft.com/office/drawing/2014/main" id="{66A2E19E-DC7A-8C8B-A064-DCC7FAEB1469}"/>
-              </a:ext>
-            </a:extLst>
-          </p:cNvPr>
-          <p:cNvCxnSpPr>
-            <a:cxnSpLocks/>
-          </p:cNvCxnSpPr>
-          <p:nvPr/>
-        </p:nvCxnSpPr>
-        <p:spPr>
-          <a:xfrm flipH="1">
-            <a:off x="7915275" y="5975009"/>
-            <a:ext cx="557943" cy="0"/>
-          </a:xfrm>
-          <a:prstGeom prst="line">
-            <a:avLst/>
-          </a:prstGeom>
-          <a:ln w="38100">
-            <a:solidFill>
-              <a:srgbClr val="00B0F0"/>
-            </a:solidFill>
-          </a:ln>
-        </p:spPr>
-        <p:style>
-          <a:lnRef idx="2">
-            <a:schemeClr val="accent1"/>
-          </a:lnRef>
-          <a:fillRef idx="0">
-            <a:schemeClr val="accent1"/>
-          </a:fillRef>
-          <a:effectRef idx="1">
-            <a:schemeClr val="accent1"/>
-          </a:effectRef>
-          <a:fontRef idx="minor">
-            <a:schemeClr val="tx1"/>
-          </a:fontRef>
-        </p:style>
-      </p:cxnSp>
-      <p:cxnSp>
-        <p:nvCxnSpPr>
-          <p:cNvPr id="1234" name="Straight Connector 1233">
-            <a:extLst>
-              <a:ext uri="{FF2B5EF4-FFF2-40B4-BE49-F238E27FC236}">
-                <a16:creationId xmlns:a16="http://schemas.microsoft.com/office/drawing/2014/main" id="{1C08B4E7-400E-5D25-97DA-4B18AE4BBD55}"/>
-              </a:ext>
-            </a:extLst>
-          </p:cNvPr>
-          <p:cNvCxnSpPr>
-            <a:cxnSpLocks/>
-          </p:cNvCxnSpPr>
-          <p:nvPr/>
-        </p:nvCxnSpPr>
-        <p:spPr>
-          <a:xfrm flipV="1">
-            <a:off x="7926929" y="5954971"/>
-            <a:ext cx="0" cy="235102"/>
-          </a:xfrm>
-          <a:prstGeom prst="line">
-            <a:avLst/>
-          </a:prstGeom>
-          <a:ln w="38100">
-            <a:solidFill>
-              <a:srgbClr val="00B0F0"/>
-            </a:solidFill>
-          </a:ln>
-        </p:spPr>
-        <p:style>
-          <a:lnRef idx="2">
-            <a:schemeClr val="accent1"/>
-          </a:lnRef>
-          <a:fillRef idx="0">
-            <a:schemeClr val="accent1"/>
-          </a:fillRef>
-          <a:effectRef idx="1">
-            <a:schemeClr val="accent1"/>
-          </a:effectRef>
-          <a:fontRef idx="minor">
-            <a:schemeClr val="tx1"/>
-          </a:fontRef>
-        </p:style>
-      </p:cxnSp>
-      <p:cxnSp>
-        <p:nvCxnSpPr>
-          <p:cNvPr id="1236" name="Straight Connector 1235">
-            <a:extLst>
-              <a:ext uri="{FF2B5EF4-FFF2-40B4-BE49-F238E27FC236}">
-                <a16:creationId xmlns:a16="http://schemas.microsoft.com/office/drawing/2014/main" id="{66092858-2E03-3721-3BB0-6857DF640024}"/>
-              </a:ext>
-            </a:extLst>
-          </p:cNvPr>
-          <p:cNvCxnSpPr>
-            <a:cxnSpLocks/>
-          </p:cNvCxnSpPr>
-          <p:nvPr/>
-        </p:nvCxnSpPr>
-        <p:spPr>
-          <a:xfrm flipH="1">
-            <a:off x="3298825" y="6190073"/>
-            <a:ext cx="4645091" cy="0"/>
-          </a:xfrm>
-          <a:prstGeom prst="line">
-            <a:avLst/>
-          </a:prstGeom>
-          <a:ln w="38100">
-            <a:solidFill>
-              <a:srgbClr val="00B0F0"/>
-            </a:solidFill>
-          </a:ln>
-        </p:spPr>
-        <p:style>
-          <a:lnRef idx="2">
-            <a:schemeClr val="accent1"/>
-          </a:lnRef>
-          <a:fillRef idx="0">
-            <a:schemeClr val="accent1"/>
-          </a:fillRef>
-          <a:effectRef idx="1">
-            <a:schemeClr val="accent1"/>
-          </a:effectRef>
-          <a:fontRef idx="minor">
-            <a:schemeClr val="tx1"/>
-          </a:fontRef>
-        </p:style>
-      </p:cxnSp>
-      <p:cxnSp>
-        <p:nvCxnSpPr>
-          <p:cNvPr id="1239" name="Straight Connector 1238">
-            <a:extLst>
-              <a:ext uri="{FF2B5EF4-FFF2-40B4-BE49-F238E27FC236}">
-                <a16:creationId xmlns:a16="http://schemas.microsoft.com/office/drawing/2014/main" id="{03D3ADB5-D769-26F8-C7B6-82C7F8131A11}"/>
-              </a:ext>
-            </a:extLst>
-          </p:cNvPr>
-          <p:cNvCxnSpPr>
-            <a:cxnSpLocks/>
-          </p:cNvCxnSpPr>
-          <p:nvPr/>
-        </p:nvCxnSpPr>
-        <p:spPr>
-          <a:xfrm flipV="1">
-            <a:off x="3315188" y="5097796"/>
-            <a:ext cx="0" cy="1092277"/>
-          </a:xfrm>
-          <a:prstGeom prst="line">
-            <a:avLst/>
-          </a:prstGeom>
-          <a:ln w="38100">
-            <a:solidFill>
-              <a:srgbClr val="FFC000"/>
-            </a:solidFill>
-          </a:ln>
-        </p:spPr>
-        <p:style>
-          <a:lnRef idx="2">
-            <a:schemeClr val="accent1"/>
-          </a:lnRef>
-          <a:fillRef idx="0">
-            <a:schemeClr val="accent1"/>
-          </a:fillRef>
-          <a:effectRef idx="1">
-            <a:schemeClr val="accent1"/>
-          </a:effectRef>
-          <a:fontRef idx="minor">
-            <a:schemeClr val="tx1"/>
-          </a:fontRef>
-        </p:style>
-      </p:cxnSp>
-      <p:cxnSp>
-        <p:nvCxnSpPr>
-          <p:cNvPr id="1242" name="Straight Connector 1241">
-            <a:extLst>
-              <a:ext uri="{FF2B5EF4-FFF2-40B4-BE49-F238E27FC236}">
-                <a16:creationId xmlns:a16="http://schemas.microsoft.com/office/drawing/2014/main" id="{5C3101C7-7AD1-00C8-C46F-653504587C37}"/>
-              </a:ext>
-            </a:extLst>
-          </p:cNvPr>
-          <p:cNvCxnSpPr>
-            <a:cxnSpLocks/>
-          </p:cNvCxnSpPr>
-          <p:nvPr/>
-        </p:nvCxnSpPr>
-        <p:spPr>
-          <a:xfrm flipH="1">
-            <a:off x="3101588" y="5115597"/>
-            <a:ext cx="234543" cy="0"/>
-          </a:xfrm>
-          <a:prstGeom prst="line">
-            <a:avLst/>
-          </a:prstGeom>
-          <a:ln w="38100">
-            <a:solidFill>
-              <a:srgbClr val="FFC000"/>
-            </a:solidFill>
-          </a:ln>
-        </p:spPr>
-        <p:style>
-          <a:lnRef idx="2">
-            <a:schemeClr val="accent1"/>
-          </a:lnRef>
-          <a:fillRef idx="0">
-            <a:schemeClr val="accent1"/>
-          </a:fillRef>
-          <a:effectRef idx="1">
-            <a:schemeClr val="accent1"/>
-          </a:effectRef>
-          <a:fontRef idx="minor">
-            <a:schemeClr val="tx1"/>
-          </a:fontRef>
-        </p:style>
-      </p:cxnSp>
-      <p:cxnSp>
-        <p:nvCxnSpPr>
-          <p:cNvPr id="1246" name="Straight Connector 1245">
-            <a:extLst>
-              <a:ext uri="{FF2B5EF4-FFF2-40B4-BE49-F238E27FC236}">
-                <a16:creationId xmlns:a16="http://schemas.microsoft.com/office/drawing/2014/main" id="{5864A5DC-1204-D60F-824D-416BBA18C109}"/>
-              </a:ext>
-            </a:extLst>
-          </p:cNvPr>
-          <p:cNvCxnSpPr>
-            <a:cxnSpLocks/>
-          </p:cNvCxnSpPr>
-          <p:nvPr/>
-        </p:nvCxnSpPr>
-        <p:spPr>
-          <a:xfrm flipV="1">
-            <a:off x="3266502" y="3249347"/>
-            <a:ext cx="0" cy="1065965"/>
-          </a:xfrm>
-          <a:prstGeom prst="line">
-            <a:avLst/>
-          </a:prstGeom>
-          <a:ln w="38100">
-            <a:solidFill>
-              <a:srgbClr val="FFC000"/>
-            </a:solidFill>
-          </a:ln>
-        </p:spPr>
-        <p:style>
-          <a:lnRef idx="2">
-            <a:schemeClr val="accent1"/>
-          </a:lnRef>
-          <a:fillRef idx="0">
-            <a:schemeClr val="accent1"/>
-          </a:fillRef>
-          <a:effectRef idx="1">
-            <a:schemeClr val="accent1"/>
-          </a:effectRef>
-          <a:fontRef idx="minor">
-            <a:schemeClr val="tx1"/>
-          </a:fontRef>
-        </p:style>
-      </p:cxnSp>
-      <p:cxnSp>
-        <p:nvCxnSpPr>
-          <p:cNvPr id="1247" name="Straight Connector 1246">
-            <a:extLst>
-              <a:ext uri="{FF2B5EF4-FFF2-40B4-BE49-F238E27FC236}">
-                <a16:creationId xmlns:a16="http://schemas.microsoft.com/office/drawing/2014/main" id="{59DFCBBA-2139-E49D-8107-3A6536E5251A}"/>
-              </a:ext>
-            </a:extLst>
-          </p:cNvPr>
-          <p:cNvCxnSpPr>
-            <a:cxnSpLocks/>
-          </p:cNvCxnSpPr>
-          <p:nvPr/>
-        </p:nvCxnSpPr>
-        <p:spPr>
-          <a:xfrm flipH="1">
-            <a:off x="2971940" y="3254443"/>
-            <a:ext cx="304077" cy="0"/>
-          </a:xfrm>
-          <a:prstGeom prst="line">
-            <a:avLst/>
-          </a:prstGeom>
-          <a:ln w="38100">
-            <a:solidFill>
-              <a:srgbClr val="FFC000"/>
-            </a:solidFill>
-          </a:ln>
-        </p:spPr>
-        <p:style>
-          <a:lnRef idx="2">
-            <a:schemeClr val="accent1"/>
-          </a:lnRef>
-          <a:fillRef idx="0">
-            <a:schemeClr val="accent1"/>
-          </a:fillRef>
-          <a:effectRef idx="1">
-            <a:schemeClr val="accent1"/>
-          </a:effectRef>
-          <a:fontRef idx="minor">
-            <a:schemeClr val="tx1"/>
-          </a:fontRef>
-        </p:style>
-      </p:cxnSp>
-      <p:cxnSp>
-        <p:nvCxnSpPr>
-          <p:cNvPr id="1250" name="Straight Connector 1249">
-            <a:extLst>
-              <a:ext uri="{FF2B5EF4-FFF2-40B4-BE49-F238E27FC236}">
-                <a16:creationId xmlns:a16="http://schemas.microsoft.com/office/drawing/2014/main" id="{4C32E461-B9EB-46B5-0458-E41301651739}"/>
-              </a:ext>
-            </a:extLst>
-          </p:cNvPr>
-          <p:cNvCxnSpPr>
-            <a:cxnSpLocks/>
-          </p:cNvCxnSpPr>
-          <p:nvPr/>
-        </p:nvCxnSpPr>
-        <p:spPr>
-          <a:xfrm flipH="1">
-            <a:off x="1035050" y="4297241"/>
-            <a:ext cx="2238902" cy="0"/>
-          </a:xfrm>
-          <a:prstGeom prst="line">
-            <a:avLst/>
-          </a:prstGeom>
-          <a:ln w="38100">
-            <a:solidFill>
-              <a:srgbClr val="00B0F0"/>
-            </a:solidFill>
-          </a:ln>
-        </p:spPr>
-        <p:style>
-          <a:lnRef idx="2">
-            <a:schemeClr val="accent1"/>
-          </a:lnRef>
-          <a:fillRef idx="0">
-            <a:schemeClr val="accent1"/>
-          </a:fillRef>
-          <a:effectRef idx="1">
-            <a:schemeClr val="accent1"/>
-          </a:effectRef>
-          <a:fontRef idx="minor">
-            <a:schemeClr val="tx1"/>
-          </a:fontRef>
-        </p:style>
-      </p:cxnSp>
-      <p:cxnSp>
-        <p:nvCxnSpPr>
-          <p:cNvPr id="1253" name="Straight Connector 1252">
-            <a:extLst>
-              <a:ext uri="{FF2B5EF4-FFF2-40B4-BE49-F238E27FC236}">
-                <a16:creationId xmlns:a16="http://schemas.microsoft.com/office/drawing/2014/main" id="{76CB76FB-48CB-51CB-4305-DB53005E0E2D}"/>
-              </a:ext>
-            </a:extLst>
-          </p:cNvPr>
-          <p:cNvCxnSpPr>
-            <a:cxnSpLocks/>
-          </p:cNvCxnSpPr>
-          <p:nvPr/>
-        </p:nvCxnSpPr>
-        <p:spPr>
-          <a:xfrm flipV="1">
-            <a:off x="1031302" y="4281379"/>
-            <a:ext cx="0" cy="2379771"/>
-          </a:xfrm>
-          <a:prstGeom prst="line">
-            <a:avLst/>
-          </a:prstGeom>
-          <a:ln w="38100">
-            <a:solidFill>
-              <a:srgbClr val="00B0F0"/>
-            </a:solidFill>
-          </a:ln>
-        </p:spPr>
-        <p:style>
-          <a:lnRef idx="2">
-            <a:schemeClr val="accent1"/>
-          </a:lnRef>
-          <a:fillRef idx="0">
-            <a:schemeClr val="accent1"/>
-          </a:fillRef>
-          <a:effectRef idx="1">
-            <a:schemeClr val="accent1"/>
-          </a:effectRef>
-          <a:fontRef idx="minor">
-            <a:schemeClr val="tx1"/>
-          </a:fontRef>
-        </p:style>
-      </p:cxnSp>
-      <p:cxnSp>
-        <p:nvCxnSpPr>
-          <p:cNvPr id="1255" name="Straight Connector 1254">
-            <a:extLst>
-              <a:ext uri="{FF2B5EF4-FFF2-40B4-BE49-F238E27FC236}">
-                <a16:creationId xmlns:a16="http://schemas.microsoft.com/office/drawing/2014/main" id="{B8148F18-63D8-C86D-8E6C-2BD5C4E94D86}"/>
-              </a:ext>
-            </a:extLst>
-          </p:cNvPr>
-          <p:cNvCxnSpPr>
-            <a:cxnSpLocks/>
-          </p:cNvCxnSpPr>
-          <p:nvPr/>
-        </p:nvCxnSpPr>
-        <p:spPr>
-          <a:xfrm flipH="1">
-            <a:off x="8434389" y="5680196"/>
-            <a:ext cx="360361" cy="0"/>
-          </a:xfrm>
-          <a:prstGeom prst="line">
-            <a:avLst/>
-          </a:prstGeom>
-          <a:ln w="38100">
-            <a:solidFill>
-              <a:srgbClr val="00B0F0"/>
-            </a:solidFill>
-          </a:ln>
-        </p:spPr>
-        <p:style>
-          <a:lnRef idx="2">
-            <a:schemeClr val="accent1"/>
-          </a:lnRef>
-          <a:fillRef idx="0">
-            <a:schemeClr val="accent1"/>
-          </a:fillRef>
-          <a:effectRef idx="1">
-            <a:schemeClr val="accent1"/>
-          </a:effectRef>
-          <a:fontRef idx="minor">
-            <a:schemeClr val="tx1"/>
-          </a:fontRef>
-        </p:style>
-      </p:cxnSp>
-      <p:cxnSp>
-        <p:nvCxnSpPr>
-          <p:cNvPr id="1257" name="Straight Connector 1256">
-            <a:extLst>
-              <a:ext uri="{FF2B5EF4-FFF2-40B4-BE49-F238E27FC236}">
-                <a16:creationId xmlns:a16="http://schemas.microsoft.com/office/drawing/2014/main" id="{E0680223-12E6-CCCB-B1BB-71C44341D174}"/>
-              </a:ext>
-            </a:extLst>
-          </p:cNvPr>
-          <p:cNvCxnSpPr>
-            <a:cxnSpLocks/>
-          </p:cNvCxnSpPr>
-          <p:nvPr/>
-        </p:nvCxnSpPr>
-        <p:spPr>
-          <a:xfrm flipV="1">
-            <a:off x="8791585" y="5669235"/>
-            <a:ext cx="0" cy="968886"/>
-          </a:xfrm>
-          <a:prstGeom prst="line">
-            <a:avLst/>
-          </a:prstGeom>
-          <a:ln w="38100">
-            <a:solidFill>
-              <a:srgbClr val="00B0F0"/>
-            </a:solidFill>
-          </a:ln>
-        </p:spPr>
-        <p:style>
-          <a:lnRef idx="2">
-            <a:schemeClr val="accent1"/>
-          </a:lnRef>
-          <a:fillRef idx="0">
-            <a:schemeClr val="accent1"/>
-          </a:fillRef>
-          <a:effectRef idx="1">
-            <a:schemeClr val="accent1"/>
-          </a:effectRef>
-          <a:fontRef idx="minor">
-            <a:schemeClr val="tx1"/>
-          </a:fontRef>
-        </p:style>
-      </p:cxnSp>
-      <p:cxnSp>
-        <p:nvCxnSpPr>
-          <p:cNvPr id="1259" name="Straight Connector 1258">
-            <a:extLst>
-              <a:ext uri="{FF2B5EF4-FFF2-40B4-BE49-F238E27FC236}">
-                <a16:creationId xmlns:a16="http://schemas.microsoft.com/office/drawing/2014/main" id="{2601BA2A-7ACF-50B8-38E8-B15999FFAB1E}"/>
-              </a:ext>
-            </a:extLst>
-          </p:cNvPr>
-          <p:cNvCxnSpPr>
-            <a:cxnSpLocks/>
-          </p:cNvCxnSpPr>
-          <p:nvPr/>
-        </p:nvCxnSpPr>
-        <p:spPr>
-          <a:xfrm flipH="1">
-            <a:off x="1041400" y="6650821"/>
-            <a:ext cx="7770018" cy="0"/>
-          </a:xfrm>
-          <a:prstGeom prst="line">
-            <a:avLst/>
-          </a:prstGeom>
-          <a:ln w="38100">
-            <a:solidFill>
-              <a:srgbClr val="00B0F0"/>
-            </a:solidFill>
-          </a:ln>
-        </p:spPr>
-        <p:style>
-          <a:lnRef idx="2">
-            <a:schemeClr val="accent1"/>
-          </a:lnRef>
-          <a:fillRef idx="0">
-            <a:schemeClr val="accent1"/>
-          </a:fillRef>
-          <a:effectRef idx="1">
-            <a:schemeClr val="accent1"/>
-          </a:effectRef>
-          <a:fontRef idx="minor">
-            <a:schemeClr val="tx1"/>
-          </a:fontRef>
-        </p:style>
-      </p:cxnSp>
-      <p:cxnSp>
-        <p:nvCxnSpPr>
-          <p:cNvPr id="1263" name="Straight Connector 1262">
-            <a:extLst>
-              <a:ext uri="{FF2B5EF4-FFF2-40B4-BE49-F238E27FC236}">
-                <a16:creationId xmlns:a16="http://schemas.microsoft.com/office/drawing/2014/main" id="{2E1AE1E5-576E-9C5B-F857-21F2B657AD1A}"/>
-              </a:ext>
-            </a:extLst>
-          </p:cNvPr>
-          <p:cNvCxnSpPr>
-            <a:cxnSpLocks/>
-          </p:cNvCxnSpPr>
-          <p:nvPr/>
-        </p:nvCxnSpPr>
-        <p:spPr>
-          <a:xfrm flipV="1">
-            <a:off x="8645535" y="5505450"/>
-            <a:ext cx="0" cy="1428750"/>
-          </a:xfrm>
-          <a:prstGeom prst="line">
-            <a:avLst/>
-          </a:prstGeom>
-          <a:ln w="38100">
-            <a:solidFill>
-              <a:srgbClr val="006020"/>
-            </a:solidFill>
-          </a:ln>
-        </p:spPr>
-        <p:style>
-          <a:lnRef idx="2">
-            <a:schemeClr val="accent1"/>
-          </a:lnRef>
-          <a:fillRef idx="0">
-            <a:schemeClr val="accent1"/>
-          </a:fillRef>
-          <a:effectRef idx="1">
-            <a:schemeClr val="accent1"/>
-          </a:effectRef>
-          <a:fontRef idx="minor">
-            <a:schemeClr val="tx1"/>
-          </a:fontRef>
-        </p:style>
-      </p:cxnSp>
-      <p:cxnSp>
-        <p:nvCxnSpPr>
-          <p:cNvPr id="1268" name="Straight Connector 1267">
-            <a:extLst>
-              <a:ext uri="{FF2B5EF4-FFF2-40B4-BE49-F238E27FC236}">
-                <a16:creationId xmlns:a16="http://schemas.microsoft.com/office/drawing/2014/main" id="{44D841F6-9BF4-4426-D9F7-4AD2E5801ED7}"/>
-              </a:ext>
-            </a:extLst>
-          </p:cNvPr>
-          <p:cNvCxnSpPr>
-            <a:cxnSpLocks/>
-          </p:cNvCxnSpPr>
-          <p:nvPr/>
-        </p:nvCxnSpPr>
-        <p:spPr>
-          <a:xfrm flipH="1">
-            <a:off x="875682" y="6922166"/>
-            <a:ext cx="7770018" cy="0"/>
-          </a:xfrm>
-          <a:prstGeom prst="line">
-            <a:avLst/>
-          </a:prstGeom>
-          <a:ln w="38100">
-            <a:solidFill>
-              <a:srgbClr val="006020"/>
-            </a:solidFill>
-          </a:ln>
-        </p:spPr>
-        <p:style>
-          <a:lnRef idx="2">
-            <a:schemeClr val="accent1"/>
-          </a:lnRef>
-          <a:fillRef idx="0">
-            <a:schemeClr val="accent1"/>
-          </a:fillRef>
-          <a:effectRef idx="1">
-            <a:schemeClr val="accent1"/>
-          </a:effectRef>
-          <a:fontRef idx="minor">
-            <a:schemeClr val="tx1"/>
-          </a:fontRef>
-        </p:style>
-      </p:cxnSp>
-      <p:cxnSp>
-        <p:nvCxnSpPr>
-          <p:cNvPr id="1269" name="Straight Connector 1268">
-            <a:extLst>
-              <a:ext uri="{FF2B5EF4-FFF2-40B4-BE49-F238E27FC236}">
-                <a16:creationId xmlns:a16="http://schemas.microsoft.com/office/drawing/2014/main" id="{96014400-274D-11F2-A939-B7D2838AE68A}"/>
-              </a:ext>
-            </a:extLst>
-          </p:cNvPr>
-          <p:cNvCxnSpPr>
-            <a:cxnSpLocks/>
-          </p:cNvCxnSpPr>
-          <p:nvPr/>
-        </p:nvCxnSpPr>
-        <p:spPr>
-          <a:xfrm flipV="1">
-            <a:off x="881888" y="4167769"/>
-            <a:ext cx="0" cy="2770668"/>
-          </a:xfrm>
-          <a:prstGeom prst="line">
-            <a:avLst/>
-          </a:prstGeom>
-          <a:ln w="38100">
-            <a:solidFill>
-              <a:srgbClr val="006020"/>
-            </a:solidFill>
-          </a:ln>
-        </p:spPr>
-        <p:style>
-          <a:lnRef idx="2">
-            <a:schemeClr val="accent1"/>
-          </a:lnRef>
-          <a:fillRef idx="0">
-            <a:schemeClr val="accent1"/>
-          </a:fillRef>
-          <a:effectRef idx="1">
-            <a:schemeClr val="accent1"/>
-          </a:effectRef>
-          <a:fontRef idx="minor">
-            <a:schemeClr val="tx1"/>
-          </a:fontRef>
-        </p:style>
-      </p:cxnSp>
-      <p:cxnSp>
-        <p:nvCxnSpPr>
-          <p:cNvPr id="1271" name="Straight Connector 1270">
-            <a:extLst>
-              <a:ext uri="{FF2B5EF4-FFF2-40B4-BE49-F238E27FC236}">
-                <a16:creationId xmlns:a16="http://schemas.microsoft.com/office/drawing/2014/main" id="{53C14AC3-0E8D-266F-F606-2800919F2CA9}"/>
-              </a:ext>
-            </a:extLst>
-          </p:cNvPr>
-          <p:cNvCxnSpPr>
-            <a:cxnSpLocks/>
-          </p:cNvCxnSpPr>
-          <p:nvPr/>
-        </p:nvCxnSpPr>
-        <p:spPr>
-          <a:xfrm flipH="1">
-            <a:off x="869188" y="4157541"/>
-            <a:ext cx="2238902" cy="0"/>
-          </a:xfrm>
-          <a:prstGeom prst="line">
-            <a:avLst/>
-          </a:prstGeom>
-          <a:ln w="38100">
-            <a:solidFill>
-              <a:srgbClr val="006020"/>
-            </a:solidFill>
-          </a:ln>
-        </p:spPr>
-        <p:style>
-          <a:lnRef idx="2">
-            <a:schemeClr val="accent1"/>
-          </a:lnRef>
-          <a:fillRef idx="0">
-            <a:schemeClr val="accent1"/>
-          </a:fillRef>
-          <a:effectRef idx="1">
-            <a:schemeClr val="accent1"/>
-          </a:effectRef>
-          <a:fontRef idx="minor">
-            <a:schemeClr val="tx1"/>
-          </a:fontRef>
-        </p:style>
-      </p:cxnSp>
-      <p:cxnSp>
-        <p:nvCxnSpPr>
           <p:cNvPr id="1272" name="Straight Connector 1271">
             <a:extLst>
               <a:ext uri="{FF2B5EF4-FFF2-40B4-BE49-F238E27FC236}">
@@ -8533,15 +8398,18 @@
         </p:nvCxnSpPr>
         <p:spPr>
           <a:xfrm flipH="1">
-            <a:off x="7804150" y="5825144"/>
-            <a:ext cx="654050" cy="0"/>
+            <a:off x="7994931" y="5825144"/>
+            <a:ext cx="463269" cy="0"/>
           </a:xfrm>
           <a:prstGeom prst="line">
             <a:avLst/>
           </a:prstGeom>
           <a:ln w="38100">
             <a:solidFill>
-              <a:srgbClr val="006020"/>
+              <a:schemeClr val="accent3">
+                <a:lumMod val="60000"/>
+                <a:lumOff val="40000"/>
+              </a:schemeClr>
             </a:solidFill>
           </a:ln>
         </p:spPr>
@@ -8576,15 +8444,18 @@
         </p:nvCxnSpPr>
         <p:spPr>
           <a:xfrm flipV="1">
-            <a:off x="7823742" y="5807444"/>
-            <a:ext cx="0" cy="317131"/>
+            <a:off x="8011777" y="5825144"/>
+            <a:ext cx="0" cy="294669"/>
           </a:xfrm>
           <a:prstGeom prst="line">
             <a:avLst/>
           </a:prstGeom>
           <a:ln w="38100">
             <a:solidFill>
-              <a:srgbClr val="006020"/>
+              <a:schemeClr val="accent3">
+                <a:lumMod val="60000"/>
+                <a:lumOff val="40000"/>
+              </a:schemeClr>
             </a:solidFill>
           </a:ln>
         </p:spPr>
@@ -8620,14 +8491,17 @@
         <p:spPr>
           <a:xfrm flipH="1">
             <a:off x="3482975" y="6104854"/>
-            <a:ext cx="4348339" cy="0"/>
+            <a:ext cx="4539456" cy="0"/>
           </a:xfrm>
           <a:prstGeom prst="line">
             <a:avLst/>
           </a:prstGeom>
           <a:ln w="38100">
             <a:solidFill>
-              <a:srgbClr val="006020"/>
+              <a:schemeClr val="accent3">
+                <a:lumMod val="60000"/>
+                <a:lumOff val="40000"/>
+              </a:schemeClr>
             </a:solidFill>
           </a:ln>
         </p:spPr>
@@ -8760,7 +8634,96 @@
           </a:prstGeom>
           <a:ln w="38100">
             <a:solidFill>
-              <a:srgbClr val="006020"/>
+              <a:schemeClr val="accent3">
+                <a:lumMod val="60000"/>
+                <a:lumOff val="40000"/>
+              </a:schemeClr>
+            </a:solidFill>
+          </a:ln>
+        </p:spPr>
+        <p:style>
+          <a:lnRef idx="2">
+            <a:schemeClr val="accent1"/>
+          </a:lnRef>
+          <a:fillRef idx="0">
+            <a:schemeClr val="accent1"/>
+          </a:fillRef>
+          <a:effectRef idx="1">
+            <a:schemeClr val="accent1"/>
+          </a:effectRef>
+          <a:fontRef idx="minor">
+            <a:schemeClr val="tx1"/>
+          </a:fontRef>
+        </p:style>
+      </p:cxnSp>
+      <p:cxnSp>
+        <p:nvCxnSpPr>
+          <p:cNvPr id="2" name="Straight Connector 1">
+            <a:extLst>
+              <a:ext uri="{FF2B5EF4-FFF2-40B4-BE49-F238E27FC236}">
+                <a16:creationId xmlns:a16="http://schemas.microsoft.com/office/drawing/2014/main" id="{F9EB1C9F-9FB1-A58F-1180-9EB99DF952A5}"/>
+              </a:ext>
+            </a:extLst>
+          </p:cNvPr>
+          <p:cNvCxnSpPr>
+            <a:cxnSpLocks/>
+          </p:cNvCxnSpPr>
+          <p:nvPr/>
+        </p:nvCxnSpPr>
+        <p:spPr>
+          <a:xfrm flipH="1">
+            <a:off x="2978073" y="5667375"/>
+            <a:ext cx="4274992" cy="0"/>
+          </a:xfrm>
+          <a:prstGeom prst="line">
+            <a:avLst/>
+          </a:prstGeom>
+          <a:ln w="38100">
+            <a:solidFill>
+              <a:srgbClr val="FFFF00"/>
+            </a:solidFill>
+          </a:ln>
+        </p:spPr>
+        <p:style>
+          <a:lnRef idx="2">
+            <a:schemeClr val="accent1"/>
+          </a:lnRef>
+          <a:fillRef idx="0">
+            <a:schemeClr val="accent1"/>
+          </a:fillRef>
+          <a:effectRef idx="1">
+            <a:schemeClr val="accent1"/>
+          </a:effectRef>
+          <a:fontRef idx="minor">
+            <a:schemeClr val="tx1"/>
+          </a:fontRef>
+        </p:style>
+      </p:cxnSp>
+      <p:cxnSp>
+        <p:nvCxnSpPr>
+          <p:cNvPr id="7" name="Straight Connector 6">
+            <a:extLst>
+              <a:ext uri="{FF2B5EF4-FFF2-40B4-BE49-F238E27FC236}">
+                <a16:creationId xmlns:a16="http://schemas.microsoft.com/office/drawing/2014/main" id="{CBD084FD-2405-4778-51FE-92334AA8EC19}"/>
+              </a:ext>
+            </a:extLst>
+          </p:cNvPr>
+          <p:cNvCxnSpPr>
+            <a:cxnSpLocks/>
+          </p:cNvCxnSpPr>
+          <p:nvPr/>
+        </p:nvCxnSpPr>
+        <p:spPr>
+          <a:xfrm flipH="1">
+            <a:off x="2624138" y="5825757"/>
+            <a:ext cx="4480105" cy="0"/>
+          </a:xfrm>
+          <a:prstGeom prst="line">
+            <a:avLst/>
+          </a:prstGeom>
+          <a:ln w="38100">
+            <a:solidFill>
+              <a:srgbClr val="002060"/>
             </a:solidFill>
           </a:ln>
         </p:spPr>

</xml_diff>